<commit_message>
update the nutrometer deck
</commit_message>
<xml_diff>
--- a/Nutrometer.pptx
+++ b/Nutrometer.pptx
@@ -12,6 +12,8 @@
     <p:sldId id="260" r:id="rId6"/>
     <p:sldId id="262" r:id="rId7"/>
     <p:sldId id="261" r:id="rId8"/>
+    <p:sldId id="263" r:id="rId9"/>
+    <p:sldId id="264" r:id="rId10"/>
   </p:sldIdLst>
   <p:sldSz cx="12192000" cy="6858000"/>
   <p:notesSz cx="6858000" cy="9144000"/>
@@ -4048,7 +4050,7 @@
 <dgm:dataModel xmlns:dgm="http://schemas.openxmlformats.org/drawingml/2006/diagram" xmlns:a="http://schemas.openxmlformats.org/drawingml/2006/main">
   <dgm:ptLst>
     <dgm:pt modelId="{BE027591-71A5-4FEA-A186-01959D094141}" type="doc">
-      <dgm:prSet loTypeId="urn:microsoft.com/office/officeart/2018/2/layout/IconVerticalSolidList" loCatId="icon" qsTypeId="urn:microsoft.com/office/officeart/2005/8/quickstyle/simple1" qsCatId="simple" csTypeId="urn:microsoft.com/office/officeart/2018/5/colors/Iconchunking_neutralbg_colorful5" csCatId="colorful" phldr="1"/>
+      <dgm:prSet loTypeId="urn:microsoft.com/office/officeart/2018/2/layout/IconVerticalSolidList" loCatId="icon" qsTypeId="urn:microsoft.com/office/officeart/2005/8/quickstyle/simple2" qsCatId="simple" csTypeId="urn:microsoft.com/office/officeart/2018/5/colors/Iconchunking_neutralbg_colorful5" csCatId="colorful" phldr="1"/>
       <dgm:spPr/>
       <dgm:t>
         <a:bodyPr/>
@@ -4153,8 +4155,28 @@
             </a:lnSpc>
           </a:pPr>
           <a:r>
-            <a:rPr lang="en-US"/>
-            <a:t>FrontEnd-HTML, Javascript, Jinja, D3, Plotly, CSS</a:t>
+            <a:rPr lang="en-US" dirty="0" err="1"/>
+            <a:t>FrontEnd</a:t>
+          </a:r>
+          <a:r>
+            <a:rPr lang="en-US" dirty="0"/>
+            <a:t>-HTML, </a:t>
+          </a:r>
+          <a:r>
+            <a:rPr lang="en-US" dirty="0" err="1"/>
+            <a:t>Javascript</a:t>
+          </a:r>
+          <a:r>
+            <a:rPr lang="en-US" dirty="0"/>
+            <a:t>, Jinja, D3, </a:t>
+          </a:r>
+          <a:r>
+            <a:rPr lang="en-US" dirty="0" err="1"/>
+            <a:t>Plotly</a:t>
+          </a:r>
+          <a:r>
+            <a:rPr lang="en-US" dirty="0"/>
+            <a:t>, CSS</a:t>
           </a:r>
         </a:p>
       </dgm:t>
@@ -4194,7 +4216,7 @@
             </a:lnSpc>
           </a:pPr>
           <a:r>
-            <a:rPr lang="en-US"/>
+            <a:rPr lang="en-US" dirty="0"/>
             <a:t>Backend-Python</a:t>
           </a:r>
         </a:p>
@@ -4307,6 +4329,85 @@
         </a:p>
       </dgm:t>
     </dgm:pt>
+    <dgm:pt modelId="{7E54C747-3DE0-4A3E-B552-1435180E335C}">
+      <dgm:prSet/>
+      <dgm:spPr/>
+      <dgm:t>
+        <a:bodyPr/>
+        <a:lstStyle/>
+        <a:p>
+          <a:pPr>
+            <a:lnSpc>
+              <a:spcPct val="100000"/>
+            </a:lnSpc>
+          </a:pPr>
+          <a:r>
+            <a:rPr lang="en-US" dirty="0"/>
+            <a:t>Machine Learning models used: K-Means, hill climbing algorithm, NLP , cosine similarity</a:t>
+          </a:r>
+        </a:p>
+      </dgm:t>
+    </dgm:pt>
+    <dgm:pt modelId="{5834263A-D304-4709-A4F8-A02E72963DFE}" type="parTrans" cxnId="{D3CA1862-1BA3-4A98-8AC1-F417BB7E65AE}">
+      <dgm:prSet/>
+      <dgm:spPr/>
+      <dgm:t>
+        <a:bodyPr/>
+        <a:lstStyle/>
+        <a:p>
+          <a:endParaRPr lang="en-US"/>
+        </a:p>
+      </dgm:t>
+    </dgm:pt>
+    <dgm:pt modelId="{579842BE-0208-49A2-9236-249FFFCE5DF3}" type="sibTrans" cxnId="{D3CA1862-1BA3-4A98-8AC1-F417BB7E65AE}">
+      <dgm:prSet/>
+      <dgm:spPr/>
+      <dgm:t>
+        <a:bodyPr/>
+        <a:lstStyle/>
+        <a:p>
+          <a:endParaRPr lang="en-US"/>
+        </a:p>
+      </dgm:t>
+    </dgm:pt>
+    <dgm:pt modelId="{D67943B9-9288-478C-BAC8-2EC90FDA8EE8}">
+      <dgm:prSet/>
+      <dgm:spPr/>
+      <dgm:t>
+        <a:bodyPr/>
+        <a:lstStyle/>
+        <a:p>
+          <a:pPr>
+            <a:lnSpc>
+              <a:spcPct val="100000"/>
+            </a:lnSpc>
+          </a:pPr>
+          <a:endParaRPr lang="en-US" dirty="0"/>
+        </a:p>
+      </dgm:t>
+    </dgm:pt>
+    <dgm:pt modelId="{31EF91C0-F777-4DC7-8371-86CEDF123819}" type="parTrans" cxnId="{948EBFFE-F49F-407A-8E0E-D2C560E2E042}">
+      <dgm:prSet/>
+      <dgm:spPr/>
+      <dgm:t>
+        <a:bodyPr/>
+        <a:lstStyle/>
+        <a:p>
+          <a:endParaRPr lang="en-US"/>
+        </a:p>
+      </dgm:t>
+    </dgm:pt>
+    <dgm:pt modelId="{59E3D9B6-2955-4D2D-BFFA-785010048A67}" type="sibTrans" cxnId="{948EBFFE-F49F-407A-8E0E-D2C560E2E042}">
+      <dgm:prSet/>
+      <dgm:spPr/>
+      <dgm:t>
+        <a:bodyPr/>
+        <a:lstStyle/>
+        <a:p>
+          <a:endParaRPr lang="en-US"/>
+        </a:p>
+      </dgm:t>
+    </dgm:pt>
     <dgm:pt modelId="{389A2C24-8E70-4FA1-9548-96FAD26428E4}" type="pres">
       <dgm:prSet presAssocID="{BE027591-71A5-4FEA-A186-01959D094141}" presName="root" presStyleCnt="0">
         <dgm:presLayoutVars>
@@ -4321,11 +4422,11 @@
       <dgm:spPr/>
     </dgm:pt>
     <dgm:pt modelId="{784AA4E4-3C60-458B-B099-3A9978BA15A4}" type="pres">
-      <dgm:prSet presAssocID="{5DBE6E11-A766-4F0F-AD95-50751BE2D84D}" presName="bgRect" presStyleLbl="bgShp" presStyleIdx="0" presStyleCnt="6"/>
+      <dgm:prSet presAssocID="{5DBE6E11-A766-4F0F-AD95-50751BE2D84D}" presName="bgRect" presStyleLbl="bgShp" presStyleIdx="0" presStyleCnt="8"/>
       <dgm:spPr/>
     </dgm:pt>
     <dgm:pt modelId="{BBFF6DD5-2B4B-4582-AB77-3BB375791746}" type="pres">
-      <dgm:prSet presAssocID="{5DBE6E11-A766-4F0F-AD95-50751BE2D84D}" presName="iconRect" presStyleLbl="node1" presStyleIdx="0" presStyleCnt="6"/>
+      <dgm:prSet presAssocID="{5DBE6E11-A766-4F0F-AD95-50751BE2D84D}" presName="iconRect" presStyleLbl="node1" presStyleIdx="0" presStyleCnt="8"/>
       <dgm:spPr>
         <a:blipFill>
           <a:blip xmlns:r="http://schemas.openxmlformats.org/officeDocument/2006/relationships" r:embed="rId2">
@@ -4342,9 +4443,6 @@
             <a:fillRect/>
           </a:stretch>
         </a:blipFill>
-        <a:ln>
-          <a:noFill/>
-        </a:ln>
       </dgm:spPr>
       <dgm:extLst>
         <a:ext uri="{E40237B7-FDA0-4F09-8148-C483321AD2D9}">
@@ -4357,7 +4455,7 @@
       <dgm:spPr/>
     </dgm:pt>
     <dgm:pt modelId="{019BBF64-DBB8-4151-834D-5B350D40F2A2}" type="pres">
-      <dgm:prSet presAssocID="{5DBE6E11-A766-4F0F-AD95-50751BE2D84D}" presName="parTx" presStyleLbl="revTx" presStyleIdx="0" presStyleCnt="6">
+      <dgm:prSet presAssocID="{5DBE6E11-A766-4F0F-AD95-50751BE2D84D}" presName="parTx" presStyleLbl="revTx" presStyleIdx="0" presStyleCnt="8">
         <dgm:presLayoutVars>
           <dgm:chMax val="0"/>
           <dgm:chPref val="0"/>
@@ -4374,11 +4472,11 @@
       <dgm:spPr/>
     </dgm:pt>
     <dgm:pt modelId="{1231876F-1B78-4BAA-B4A4-8E9BD9748F6D}" type="pres">
-      <dgm:prSet presAssocID="{AC2A012C-0413-426A-9006-AE82A199EE1F}" presName="bgRect" presStyleLbl="bgShp" presStyleIdx="1" presStyleCnt="6"/>
+      <dgm:prSet presAssocID="{AC2A012C-0413-426A-9006-AE82A199EE1F}" presName="bgRect" presStyleLbl="bgShp" presStyleIdx="1" presStyleCnt="8"/>
       <dgm:spPr/>
     </dgm:pt>
     <dgm:pt modelId="{14B3D24D-868B-4370-8B6A-BB38C76116EC}" type="pres">
-      <dgm:prSet presAssocID="{AC2A012C-0413-426A-9006-AE82A199EE1F}" presName="iconRect" presStyleLbl="node1" presStyleIdx="1" presStyleCnt="6"/>
+      <dgm:prSet presAssocID="{AC2A012C-0413-426A-9006-AE82A199EE1F}" presName="iconRect" presStyleLbl="node1" presStyleIdx="1" presStyleCnt="8"/>
       <dgm:spPr>
         <a:blipFill>
           <a:blip xmlns:r="http://schemas.openxmlformats.org/officeDocument/2006/relationships" r:embed="rId4">
@@ -4395,9 +4493,6 @@
             <a:fillRect/>
           </a:stretch>
         </a:blipFill>
-        <a:ln>
-          <a:noFill/>
-        </a:ln>
       </dgm:spPr>
       <dgm:extLst>
         <a:ext uri="{E40237B7-FDA0-4F09-8148-C483321AD2D9}">
@@ -4410,7 +4505,7 @@
       <dgm:spPr/>
     </dgm:pt>
     <dgm:pt modelId="{258E9943-732D-45E6-B34C-1DED30B63188}" type="pres">
-      <dgm:prSet presAssocID="{AC2A012C-0413-426A-9006-AE82A199EE1F}" presName="parTx" presStyleLbl="revTx" presStyleIdx="1" presStyleCnt="6">
+      <dgm:prSet presAssocID="{AC2A012C-0413-426A-9006-AE82A199EE1F}" presName="parTx" presStyleLbl="revTx" presStyleIdx="1" presStyleCnt="8">
         <dgm:presLayoutVars>
           <dgm:chMax val="0"/>
           <dgm:chPref val="0"/>
@@ -4427,11 +4522,11 @@
       <dgm:spPr/>
     </dgm:pt>
     <dgm:pt modelId="{20BE625A-490A-43EB-8A8E-3C835D2D6F5F}" type="pres">
-      <dgm:prSet presAssocID="{C7E9F372-8B75-4CC7-A997-5842EE3039F3}" presName="bgRect" presStyleLbl="bgShp" presStyleIdx="2" presStyleCnt="6"/>
+      <dgm:prSet presAssocID="{C7E9F372-8B75-4CC7-A997-5842EE3039F3}" presName="bgRect" presStyleLbl="bgShp" presStyleIdx="2" presStyleCnt="8"/>
       <dgm:spPr/>
     </dgm:pt>
     <dgm:pt modelId="{1168C0E8-770C-4DDD-8139-24B36DFE3128}" type="pres">
-      <dgm:prSet presAssocID="{C7E9F372-8B75-4CC7-A997-5842EE3039F3}" presName="iconRect" presStyleLbl="node1" presStyleIdx="2" presStyleCnt="6"/>
+      <dgm:prSet presAssocID="{C7E9F372-8B75-4CC7-A997-5842EE3039F3}" presName="iconRect" presStyleLbl="node1" presStyleIdx="2" presStyleCnt="8"/>
       <dgm:spPr>
         <a:blipFill>
           <a:blip xmlns:r="http://schemas.openxmlformats.org/officeDocument/2006/relationships" r:embed="rId6">
@@ -4448,9 +4543,6 @@
             <a:fillRect/>
           </a:stretch>
         </a:blipFill>
-        <a:ln>
-          <a:noFill/>
-        </a:ln>
       </dgm:spPr>
       <dgm:extLst>
         <a:ext uri="{E40237B7-FDA0-4F09-8148-C483321AD2D9}">
@@ -4463,7 +4555,7 @@
       <dgm:spPr/>
     </dgm:pt>
     <dgm:pt modelId="{E3710687-40E0-47D6-92C2-1FF91C9C6957}" type="pres">
-      <dgm:prSet presAssocID="{C7E9F372-8B75-4CC7-A997-5842EE3039F3}" presName="parTx" presStyleLbl="revTx" presStyleIdx="2" presStyleCnt="6">
+      <dgm:prSet presAssocID="{C7E9F372-8B75-4CC7-A997-5842EE3039F3}" presName="parTx" presStyleLbl="revTx" presStyleIdx="2" presStyleCnt="8">
         <dgm:presLayoutVars>
           <dgm:chMax val="0"/>
           <dgm:chPref val="0"/>
@@ -4475,16 +4567,74 @@
       <dgm:prSet presAssocID="{6BEE15A0-7D9B-4C83-B0A8-CF2157F49F07}" presName="sibTrans" presStyleCnt="0"/>
       <dgm:spPr/>
     </dgm:pt>
+    <dgm:pt modelId="{8D39264C-856B-408F-8CC4-9CDCD74D89E6}" type="pres">
+      <dgm:prSet presAssocID="{7E54C747-3DE0-4A3E-B552-1435180E335C}" presName="compNode" presStyleCnt="0"/>
+      <dgm:spPr/>
+    </dgm:pt>
+    <dgm:pt modelId="{45E74346-E9D5-418F-9DA5-2FE73F7A8A6B}" type="pres">
+      <dgm:prSet presAssocID="{7E54C747-3DE0-4A3E-B552-1435180E335C}" presName="bgRect" presStyleLbl="bgShp" presStyleIdx="3" presStyleCnt="8" custScaleY="205499" custLinFactNeighborX="0" custLinFactNeighborY="42398"/>
+      <dgm:spPr/>
+    </dgm:pt>
+    <dgm:pt modelId="{58E54AAF-3FD7-46A5-8067-B0DF0868DBEA}" type="pres">
+      <dgm:prSet presAssocID="{7E54C747-3DE0-4A3E-B552-1435180E335C}" presName="iconRect" presStyleLbl="node1" presStyleIdx="3" presStyleCnt="8"/>
+      <dgm:spPr/>
+    </dgm:pt>
+    <dgm:pt modelId="{2C08788C-7DC6-474F-82AB-FDEE025E2D0B}" type="pres">
+      <dgm:prSet presAssocID="{7E54C747-3DE0-4A3E-B552-1435180E335C}" presName="spaceRect" presStyleCnt="0"/>
+      <dgm:spPr/>
+    </dgm:pt>
+    <dgm:pt modelId="{DFD96584-8BBA-4F7C-9C0E-EC8F6BA60DDA}" type="pres">
+      <dgm:prSet presAssocID="{7E54C747-3DE0-4A3E-B552-1435180E335C}" presName="parTx" presStyleLbl="revTx" presStyleIdx="3" presStyleCnt="8" custScaleX="103305" custScaleY="213831">
+        <dgm:presLayoutVars>
+          <dgm:chMax val="0"/>
+          <dgm:chPref val="0"/>
+        </dgm:presLayoutVars>
+      </dgm:prSet>
+      <dgm:spPr/>
+    </dgm:pt>
+    <dgm:pt modelId="{21680508-46DC-476B-A188-475555A5402B}" type="pres">
+      <dgm:prSet presAssocID="{579842BE-0208-49A2-9236-249FFFCE5DF3}" presName="sibTrans" presStyleCnt="0"/>
+      <dgm:spPr/>
+    </dgm:pt>
+    <dgm:pt modelId="{19FC4476-5FA7-4E82-8DD4-1E68A7CF94F3}" type="pres">
+      <dgm:prSet presAssocID="{D67943B9-9288-478C-BAC8-2EC90FDA8EE8}" presName="compNode" presStyleCnt="0"/>
+      <dgm:spPr/>
+    </dgm:pt>
+    <dgm:pt modelId="{B21B12C1-A436-4945-A7B8-F795C926DF35}" type="pres">
+      <dgm:prSet presAssocID="{D67943B9-9288-478C-BAC8-2EC90FDA8EE8}" presName="bgRect" presStyleLbl="bgShp" presStyleIdx="4" presStyleCnt="8" custScaleY="84129"/>
+      <dgm:spPr/>
+    </dgm:pt>
+    <dgm:pt modelId="{0DA695FA-05C1-4A5E-8C0C-69938BF3FC46}" type="pres">
+      <dgm:prSet presAssocID="{D67943B9-9288-478C-BAC8-2EC90FDA8EE8}" presName="iconRect" presStyleLbl="node1" presStyleIdx="4" presStyleCnt="8"/>
+      <dgm:spPr/>
+    </dgm:pt>
+    <dgm:pt modelId="{CC48E89B-D20C-4A94-85CA-A79BC0CA0D21}" type="pres">
+      <dgm:prSet presAssocID="{D67943B9-9288-478C-BAC8-2EC90FDA8EE8}" presName="spaceRect" presStyleCnt="0"/>
+      <dgm:spPr/>
+    </dgm:pt>
+    <dgm:pt modelId="{3ACB8E52-3D67-4D9D-875B-7B9BC5839DB7}" type="pres">
+      <dgm:prSet presAssocID="{D67943B9-9288-478C-BAC8-2EC90FDA8EE8}" presName="parTx" presStyleLbl="revTx" presStyleIdx="4" presStyleCnt="8">
+        <dgm:presLayoutVars>
+          <dgm:chMax val="0"/>
+          <dgm:chPref val="0"/>
+        </dgm:presLayoutVars>
+      </dgm:prSet>
+      <dgm:spPr/>
+    </dgm:pt>
+    <dgm:pt modelId="{3A4D3D1F-BF32-4A8A-9A0F-4A81AC657438}" type="pres">
+      <dgm:prSet presAssocID="{59E3D9B6-2955-4D2D-BFFA-785010048A67}" presName="sibTrans" presStyleCnt="0"/>
+      <dgm:spPr/>
+    </dgm:pt>
     <dgm:pt modelId="{9680A8A9-BA6F-406E-90C5-4FC3F21BE3C3}" type="pres">
       <dgm:prSet presAssocID="{0F96D351-01C7-48B9-AB4C-B77360C7B84A}" presName="compNode" presStyleCnt="0"/>
       <dgm:spPr/>
     </dgm:pt>
     <dgm:pt modelId="{F0075E7C-73BA-454F-B59A-FA750A974D20}" type="pres">
-      <dgm:prSet presAssocID="{0F96D351-01C7-48B9-AB4C-B77360C7B84A}" presName="bgRect" presStyleLbl="bgShp" presStyleIdx="3" presStyleCnt="6"/>
+      <dgm:prSet presAssocID="{0F96D351-01C7-48B9-AB4C-B77360C7B84A}" presName="bgRect" presStyleLbl="bgShp" presStyleIdx="5" presStyleCnt="8" custLinFactNeighborX="66569" custLinFactNeighborY="46055"/>
       <dgm:spPr/>
     </dgm:pt>
     <dgm:pt modelId="{F13BB237-87EB-4346-82F5-3B7696F5448F}" type="pres">
-      <dgm:prSet presAssocID="{0F96D351-01C7-48B9-AB4C-B77360C7B84A}" presName="iconRect" presStyleLbl="node1" presStyleIdx="3" presStyleCnt="6"/>
+      <dgm:prSet presAssocID="{0F96D351-01C7-48B9-AB4C-B77360C7B84A}" presName="iconRect" presStyleLbl="node1" presStyleIdx="5" presStyleCnt="8"/>
       <dgm:spPr>
         <a:blipFill>
           <a:blip xmlns:r="http://schemas.openxmlformats.org/officeDocument/2006/relationships" r:embed="rId8">
@@ -4501,9 +4651,6 @@
             <a:fillRect/>
           </a:stretch>
         </a:blipFill>
-        <a:ln>
-          <a:noFill/>
-        </a:ln>
       </dgm:spPr>
       <dgm:extLst>
         <a:ext uri="{E40237B7-FDA0-4F09-8148-C483321AD2D9}">
@@ -4516,7 +4663,7 @@
       <dgm:spPr/>
     </dgm:pt>
     <dgm:pt modelId="{50220493-80AC-4268-9B52-EDF674FCC6D7}" type="pres">
-      <dgm:prSet presAssocID="{0F96D351-01C7-48B9-AB4C-B77360C7B84A}" presName="parTx" presStyleLbl="revTx" presStyleIdx="3" presStyleCnt="6">
+      <dgm:prSet presAssocID="{0F96D351-01C7-48B9-AB4C-B77360C7B84A}" presName="parTx" presStyleLbl="revTx" presStyleIdx="5" presStyleCnt="8">
         <dgm:presLayoutVars>
           <dgm:chMax val="0"/>
           <dgm:chPref val="0"/>
@@ -4533,11 +4680,11 @@
       <dgm:spPr/>
     </dgm:pt>
     <dgm:pt modelId="{C2DF2B10-815A-4EF5-AC32-D5EF4742BEDA}" type="pres">
-      <dgm:prSet presAssocID="{750E050B-AFC9-4D78-ADF0-8D9C732E4518}" presName="bgRect" presStyleLbl="bgShp" presStyleIdx="4" presStyleCnt="6"/>
+      <dgm:prSet presAssocID="{750E050B-AFC9-4D78-ADF0-8D9C732E4518}" presName="bgRect" presStyleLbl="bgShp" presStyleIdx="6" presStyleCnt="8"/>
       <dgm:spPr/>
     </dgm:pt>
     <dgm:pt modelId="{64133F2F-B75E-4B2F-A1FC-058C2AF92E7C}" type="pres">
-      <dgm:prSet presAssocID="{750E050B-AFC9-4D78-ADF0-8D9C732E4518}" presName="iconRect" presStyleLbl="node1" presStyleIdx="4" presStyleCnt="6"/>
+      <dgm:prSet presAssocID="{750E050B-AFC9-4D78-ADF0-8D9C732E4518}" presName="iconRect" presStyleLbl="node1" presStyleIdx="6" presStyleCnt="8"/>
       <dgm:spPr>
         <a:blipFill>
           <a:blip xmlns:r="http://schemas.openxmlformats.org/officeDocument/2006/relationships" r:embed="rId10">
@@ -4554,9 +4701,6 @@
             <a:fillRect/>
           </a:stretch>
         </a:blipFill>
-        <a:ln>
-          <a:noFill/>
-        </a:ln>
       </dgm:spPr>
       <dgm:extLst>
         <a:ext uri="{E40237B7-FDA0-4F09-8148-C483321AD2D9}">
@@ -4569,7 +4713,7 @@
       <dgm:spPr/>
     </dgm:pt>
     <dgm:pt modelId="{6C14DBC8-1152-4BB9-A97F-6453CD3CA6CF}" type="pres">
-      <dgm:prSet presAssocID="{750E050B-AFC9-4D78-ADF0-8D9C732E4518}" presName="parTx" presStyleLbl="revTx" presStyleIdx="4" presStyleCnt="6">
+      <dgm:prSet presAssocID="{750E050B-AFC9-4D78-ADF0-8D9C732E4518}" presName="parTx" presStyleLbl="revTx" presStyleIdx="6" presStyleCnt="8">
         <dgm:presLayoutVars>
           <dgm:chMax val="0"/>
           <dgm:chPref val="0"/>
@@ -4586,11 +4730,11 @@
       <dgm:spPr/>
     </dgm:pt>
     <dgm:pt modelId="{25CEC266-C6C3-456A-9869-47E25FCD6DAD}" type="pres">
-      <dgm:prSet presAssocID="{D2EB1AD8-36C5-4432-A593-2E2F5E6390E9}" presName="bgRect" presStyleLbl="bgShp" presStyleIdx="5" presStyleCnt="6" custLinFactNeighborX="-5818" custLinFactNeighborY="12915"/>
+      <dgm:prSet presAssocID="{D2EB1AD8-36C5-4432-A593-2E2F5E6390E9}" presName="bgRect" presStyleLbl="bgShp" presStyleIdx="7" presStyleCnt="8" custLinFactNeighborX="-5818" custLinFactNeighborY="12915"/>
       <dgm:spPr/>
     </dgm:pt>
     <dgm:pt modelId="{A29DBDA7-506C-4F35-9288-30E5C24B6284}" type="pres">
-      <dgm:prSet presAssocID="{D2EB1AD8-36C5-4432-A593-2E2F5E6390E9}" presName="iconRect" presStyleLbl="node1" presStyleIdx="5" presStyleCnt="6"/>
+      <dgm:prSet presAssocID="{D2EB1AD8-36C5-4432-A593-2E2F5E6390E9}" presName="iconRect" presStyleLbl="node1" presStyleIdx="7" presStyleCnt="8"/>
       <dgm:spPr>
         <a:blipFill>
           <a:blip xmlns:r="http://schemas.openxmlformats.org/officeDocument/2006/relationships" r:embed="rId12">
@@ -4607,9 +4751,6 @@
             <a:fillRect/>
           </a:stretch>
         </a:blipFill>
-        <a:ln>
-          <a:noFill/>
-        </a:ln>
       </dgm:spPr>
       <dgm:extLst>
         <a:ext uri="{E40237B7-FDA0-4F09-8148-C483321AD2D9}">
@@ -4622,7 +4763,7 @@
       <dgm:spPr/>
     </dgm:pt>
     <dgm:pt modelId="{158BA7BB-CBC8-4CA5-8B67-45111751898D}" type="pres">
-      <dgm:prSet presAssocID="{D2EB1AD8-36C5-4432-A593-2E2F5E6390E9}" presName="parTx" presStyleLbl="revTx" presStyleIdx="5" presStyleCnt="6">
+      <dgm:prSet presAssocID="{D2EB1AD8-36C5-4432-A593-2E2F5E6390E9}" presName="parTx" presStyleLbl="revTx" presStyleIdx="7" presStyleCnt="8">
         <dgm:presLayoutVars>
           <dgm:chMax val="0"/>
           <dgm:chPref val="0"/>
@@ -4632,19 +4773,23 @@
     </dgm:pt>
   </dgm:ptLst>
   <dgm:cxnLst>
-    <dgm:cxn modelId="{F5EE5601-8ED4-4B6F-A89B-E87F7F55F2E3}" srcId="{BE027591-71A5-4FEA-A186-01959D094141}" destId="{750E050B-AFC9-4D78-ADF0-8D9C732E4518}" srcOrd="4" destOrd="0" parTransId="{8A1477DE-0C22-44DB-B50B-68860AAFBE39}" sibTransId="{6FE55CC8-756E-44CE-92C5-ADFA66A6BB63}"/>
+    <dgm:cxn modelId="{F5EE5601-8ED4-4B6F-A89B-E87F7F55F2E3}" srcId="{BE027591-71A5-4FEA-A186-01959D094141}" destId="{750E050B-AFC9-4D78-ADF0-8D9C732E4518}" srcOrd="6" destOrd="0" parTransId="{8A1477DE-0C22-44DB-B50B-68860AAFBE39}" sibTransId="{6FE55CC8-756E-44CE-92C5-ADFA66A6BB63}"/>
     <dgm:cxn modelId="{E43B4D08-D30F-437B-9407-2E21FE9A4494}" srcId="{BE027591-71A5-4FEA-A186-01959D094141}" destId="{C7E9F372-8B75-4CC7-A997-5842EE3039F3}" srcOrd="2" destOrd="0" parTransId="{2A765101-E2DD-41DE-ACB7-608AAD53C2C6}" sibTransId="{6BEE15A0-7D9B-4C83-B0A8-CF2157F49F07}"/>
     <dgm:cxn modelId="{D546F10C-F9B1-41D0-9443-122731C15A66}" srcId="{BE027591-71A5-4FEA-A186-01959D094141}" destId="{AC2A012C-0413-426A-9006-AE82A199EE1F}" srcOrd="1" destOrd="0" parTransId="{3C086C8D-65B7-47D4-8868-0E915ED9C2FE}" sibTransId="{E6D68588-5578-4B2C-A904-64516461183D}"/>
-    <dgm:cxn modelId="{F7F09614-2E76-4E28-B40C-BD65FD2A71A2}" srcId="{BE027591-71A5-4FEA-A186-01959D094141}" destId="{0F96D351-01C7-48B9-AB4C-B77360C7B84A}" srcOrd="3" destOrd="0" parTransId="{DE528BFA-D7EE-4737-BFE2-EFCCBA98B99C}" sibTransId="{007D1F86-8EA3-4135-9025-BFD3821D05E1}"/>
+    <dgm:cxn modelId="{F7F09614-2E76-4E28-B40C-BD65FD2A71A2}" srcId="{BE027591-71A5-4FEA-A186-01959D094141}" destId="{0F96D351-01C7-48B9-AB4C-B77360C7B84A}" srcOrd="5" destOrd="0" parTransId="{DE528BFA-D7EE-4737-BFE2-EFCCBA98B99C}" sibTransId="{007D1F86-8EA3-4135-9025-BFD3821D05E1}"/>
     <dgm:cxn modelId="{C62DAA2F-292E-49FE-9385-AC8C12532494}" type="presOf" srcId="{AC2A012C-0413-426A-9006-AE82A199EE1F}" destId="{258E9943-732D-45E6-B34C-1DED30B63188}" srcOrd="0" destOrd="0" presId="urn:microsoft.com/office/officeart/2018/2/layout/IconVerticalSolidList"/>
     <dgm:cxn modelId="{64F7AD3F-1FB0-4079-94AB-8728F4B5E1B2}" type="presOf" srcId="{5DBE6E11-A766-4F0F-AD95-50751BE2D84D}" destId="{019BBF64-DBB8-4151-834D-5B350D40F2A2}" srcOrd="0" destOrd="0" presId="urn:microsoft.com/office/officeart/2018/2/layout/IconVerticalSolidList"/>
+    <dgm:cxn modelId="{D3CA1862-1BA3-4A98-8AC1-F417BB7E65AE}" srcId="{BE027591-71A5-4FEA-A186-01959D094141}" destId="{7E54C747-3DE0-4A3E-B552-1435180E335C}" srcOrd="3" destOrd="0" parTransId="{5834263A-D304-4709-A4F8-A02E72963DFE}" sibTransId="{579842BE-0208-49A2-9236-249FFFCE5DF3}"/>
     <dgm:cxn modelId="{D4EDDE67-AD2C-44A4-BBE9-07D8A7A6AF1F}" type="presOf" srcId="{D2EB1AD8-36C5-4432-A593-2E2F5E6390E9}" destId="{158BA7BB-CBC8-4CA5-8B67-45111751898D}" srcOrd="0" destOrd="0" presId="urn:microsoft.com/office/officeart/2018/2/layout/IconVerticalSolidList"/>
     <dgm:cxn modelId="{D65CF06B-B7FF-4B18-A9B7-40F5635D90A5}" srcId="{BE027591-71A5-4FEA-A186-01959D094141}" destId="{5DBE6E11-A766-4F0F-AD95-50751BE2D84D}" srcOrd="0" destOrd="0" parTransId="{93EA6341-5BF8-47D9-930C-5D46DF7AAACC}" sibTransId="{3F475D48-8CAD-42C9-84C0-51B4285E4625}"/>
     <dgm:cxn modelId="{B6121E55-FEB8-445D-AD0B-19C3C0AC00B1}" type="presOf" srcId="{BE027591-71A5-4FEA-A186-01959D094141}" destId="{389A2C24-8E70-4FA1-9548-96FAD26428E4}" srcOrd="0" destOrd="0" presId="urn:microsoft.com/office/officeart/2018/2/layout/IconVerticalSolidList"/>
+    <dgm:cxn modelId="{D26ED478-6F9E-4844-A854-7DA7C606782A}" type="presOf" srcId="{7E54C747-3DE0-4A3E-B552-1435180E335C}" destId="{DFD96584-8BBA-4F7C-9C0E-EC8F6BA60DDA}" srcOrd="0" destOrd="0" presId="urn:microsoft.com/office/officeart/2018/2/layout/IconVerticalSolidList"/>
     <dgm:cxn modelId="{6D6C558F-2CEF-4938-8B68-65FC439A5912}" type="presOf" srcId="{0F96D351-01C7-48B9-AB4C-B77360C7B84A}" destId="{50220493-80AC-4268-9B52-EDF674FCC6D7}" srcOrd="0" destOrd="0" presId="urn:microsoft.com/office/officeart/2018/2/layout/IconVerticalSolidList"/>
     <dgm:cxn modelId="{617FAE9D-611D-4A51-A2EE-3909C03F466F}" type="presOf" srcId="{C7E9F372-8B75-4CC7-A997-5842EE3039F3}" destId="{E3710687-40E0-47D6-92C2-1FF91C9C6957}" srcOrd="0" destOrd="0" presId="urn:microsoft.com/office/officeart/2018/2/layout/IconVerticalSolidList"/>
-    <dgm:cxn modelId="{8AE6DBBB-7972-4CC5-BF88-8A4D54FC3A0D}" srcId="{BE027591-71A5-4FEA-A186-01959D094141}" destId="{D2EB1AD8-36C5-4432-A593-2E2F5E6390E9}" srcOrd="5" destOrd="0" parTransId="{EEA8550B-EBD5-4733-B090-2EFB750AAF4D}" sibTransId="{95DF1AAD-B2F9-472B-A54A-530B242B59D5}"/>
+    <dgm:cxn modelId="{62674BAB-AEB4-4EF8-9DEF-191D8E02E0DE}" type="presOf" srcId="{D67943B9-9288-478C-BAC8-2EC90FDA8EE8}" destId="{3ACB8E52-3D67-4D9D-875B-7B9BC5839DB7}" srcOrd="0" destOrd="0" presId="urn:microsoft.com/office/officeart/2018/2/layout/IconVerticalSolidList"/>
+    <dgm:cxn modelId="{8AE6DBBB-7972-4CC5-BF88-8A4D54FC3A0D}" srcId="{BE027591-71A5-4FEA-A186-01959D094141}" destId="{D2EB1AD8-36C5-4432-A593-2E2F5E6390E9}" srcOrd="7" destOrd="0" parTransId="{EEA8550B-EBD5-4733-B090-2EFB750AAF4D}" sibTransId="{95DF1AAD-B2F9-472B-A54A-530B242B59D5}"/>
     <dgm:cxn modelId="{E485F6F4-26C0-41B6-B1CE-0F6609680C4A}" type="presOf" srcId="{750E050B-AFC9-4D78-ADF0-8D9C732E4518}" destId="{6C14DBC8-1152-4BB9-A97F-6453CD3CA6CF}" srcOrd="0" destOrd="0" presId="urn:microsoft.com/office/officeart/2018/2/layout/IconVerticalSolidList"/>
+    <dgm:cxn modelId="{948EBFFE-F49F-407A-8E0E-D2C560E2E042}" srcId="{BE027591-71A5-4FEA-A186-01959D094141}" destId="{D67943B9-9288-478C-BAC8-2EC90FDA8EE8}" srcOrd="4" destOrd="0" parTransId="{31EF91C0-F777-4DC7-8371-86CEDF123819}" sibTransId="{59E3D9B6-2955-4D2D-BFFA-785010048A67}"/>
     <dgm:cxn modelId="{CD0A4CCD-83F7-4549-A8A1-643A9BC70E20}" type="presParOf" srcId="{389A2C24-8E70-4FA1-9548-96FAD26428E4}" destId="{791D5EBC-F9F0-41A6-BBBE-FD6C63854888}" srcOrd="0" destOrd="0" presId="urn:microsoft.com/office/officeart/2018/2/layout/IconVerticalSolidList"/>
     <dgm:cxn modelId="{49648D35-2263-47C8-91E6-B09F4BF27B81}" type="presParOf" srcId="{791D5EBC-F9F0-41A6-BBBE-FD6C63854888}" destId="{784AA4E4-3C60-458B-B099-3A9978BA15A4}" srcOrd="0" destOrd="0" presId="urn:microsoft.com/office/officeart/2018/2/layout/IconVerticalSolidList"/>
     <dgm:cxn modelId="{4EAD343E-9E2B-4200-8E15-F75716850C0A}" type="presParOf" srcId="{791D5EBC-F9F0-41A6-BBBE-FD6C63854888}" destId="{BBFF6DD5-2B4B-4582-AB77-3BB375791746}" srcOrd="1" destOrd="0" presId="urn:microsoft.com/office/officeart/2018/2/layout/IconVerticalSolidList"/>
@@ -4663,19 +4808,31 @@
     <dgm:cxn modelId="{9DC740E6-E609-4D5A-99F0-11AAB20DBC3E}" type="presParOf" srcId="{80420510-86A2-4D82-A8A1-35894EEFEA06}" destId="{10E4BA79-968A-45E6-B3C7-F879D0B919FE}" srcOrd="2" destOrd="0" presId="urn:microsoft.com/office/officeart/2018/2/layout/IconVerticalSolidList"/>
     <dgm:cxn modelId="{5D293DC1-0C99-4F4A-9E58-B2C674AADA49}" type="presParOf" srcId="{80420510-86A2-4D82-A8A1-35894EEFEA06}" destId="{E3710687-40E0-47D6-92C2-1FF91C9C6957}" srcOrd="3" destOrd="0" presId="urn:microsoft.com/office/officeart/2018/2/layout/IconVerticalSolidList"/>
     <dgm:cxn modelId="{FD9CCB87-12EF-4AFA-970B-863D41971B0E}" type="presParOf" srcId="{389A2C24-8E70-4FA1-9548-96FAD26428E4}" destId="{6C385402-6484-4A15-AC71-C3D0512D1F07}" srcOrd="5" destOrd="0" presId="urn:microsoft.com/office/officeart/2018/2/layout/IconVerticalSolidList"/>
-    <dgm:cxn modelId="{4C9E4B34-1DFD-4A04-9C6A-FED4A56F211B}" type="presParOf" srcId="{389A2C24-8E70-4FA1-9548-96FAD26428E4}" destId="{9680A8A9-BA6F-406E-90C5-4FC3F21BE3C3}" srcOrd="6" destOrd="0" presId="urn:microsoft.com/office/officeart/2018/2/layout/IconVerticalSolidList"/>
+    <dgm:cxn modelId="{31C9C4F1-2A17-4789-990C-55CA2395DE99}" type="presParOf" srcId="{389A2C24-8E70-4FA1-9548-96FAD26428E4}" destId="{8D39264C-856B-408F-8CC4-9CDCD74D89E6}" srcOrd="6" destOrd="0" presId="urn:microsoft.com/office/officeart/2018/2/layout/IconVerticalSolidList"/>
+    <dgm:cxn modelId="{9EA4DB25-4D7E-4D59-8B8E-084ABE6B2BB0}" type="presParOf" srcId="{8D39264C-856B-408F-8CC4-9CDCD74D89E6}" destId="{45E74346-E9D5-418F-9DA5-2FE73F7A8A6B}" srcOrd="0" destOrd="0" presId="urn:microsoft.com/office/officeart/2018/2/layout/IconVerticalSolidList"/>
+    <dgm:cxn modelId="{DD81BD0F-F6D7-4D47-958D-693E37A029CD}" type="presParOf" srcId="{8D39264C-856B-408F-8CC4-9CDCD74D89E6}" destId="{58E54AAF-3FD7-46A5-8067-B0DF0868DBEA}" srcOrd="1" destOrd="0" presId="urn:microsoft.com/office/officeart/2018/2/layout/IconVerticalSolidList"/>
+    <dgm:cxn modelId="{B37E37B3-7CAE-4476-B4DB-6591202767B0}" type="presParOf" srcId="{8D39264C-856B-408F-8CC4-9CDCD74D89E6}" destId="{2C08788C-7DC6-474F-82AB-FDEE025E2D0B}" srcOrd="2" destOrd="0" presId="urn:microsoft.com/office/officeart/2018/2/layout/IconVerticalSolidList"/>
+    <dgm:cxn modelId="{3D2EB7F9-85B5-4EC4-98F6-2ABC85A2116A}" type="presParOf" srcId="{8D39264C-856B-408F-8CC4-9CDCD74D89E6}" destId="{DFD96584-8BBA-4F7C-9C0E-EC8F6BA60DDA}" srcOrd="3" destOrd="0" presId="urn:microsoft.com/office/officeart/2018/2/layout/IconVerticalSolidList"/>
+    <dgm:cxn modelId="{C9A186A9-927E-4CA2-8737-E70CDA3C6023}" type="presParOf" srcId="{389A2C24-8E70-4FA1-9548-96FAD26428E4}" destId="{21680508-46DC-476B-A188-475555A5402B}" srcOrd="7" destOrd="0" presId="urn:microsoft.com/office/officeart/2018/2/layout/IconVerticalSolidList"/>
+    <dgm:cxn modelId="{DB925F3D-8DF1-4507-BAB8-68E74E3D0904}" type="presParOf" srcId="{389A2C24-8E70-4FA1-9548-96FAD26428E4}" destId="{19FC4476-5FA7-4E82-8DD4-1E68A7CF94F3}" srcOrd="8" destOrd="0" presId="urn:microsoft.com/office/officeart/2018/2/layout/IconVerticalSolidList"/>
+    <dgm:cxn modelId="{4489B644-8912-4F59-99A8-E581B5B12C5B}" type="presParOf" srcId="{19FC4476-5FA7-4E82-8DD4-1E68A7CF94F3}" destId="{B21B12C1-A436-4945-A7B8-F795C926DF35}" srcOrd="0" destOrd="0" presId="urn:microsoft.com/office/officeart/2018/2/layout/IconVerticalSolidList"/>
+    <dgm:cxn modelId="{7A5090F4-9421-4034-A035-AEA6E91CFDC8}" type="presParOf" srcId="{19FC4476-5FA7-4E82-8DD4-1E68A7CF94F3}" destId="{0DA695FA-05C1-4A5E-8C0C-69938BF3FC46}" srcOrd="1" destOrd="0" presId="urn:microsoft.com/office/officeart/2018/2/layout/IconVerticalSolidList"/>
+    <dgm:cxn modelId="{B41033D0-9D52-4EA3-BC56-F0AD4F8600C8}" type="presParOf" srcId="{19FC4476-5FA7-4E82-8DD4-1E68A7CF94F3}" destId="{CC48E89B-D20C-4A94-85CA-A79BC0CA0D21}" srcOrd="2" destOrd="0" presId="urn:microsoft.com/office/officeart/2018/2/layout/IconVerticalSolidList"/>
+    <dgm:cxn modelId="{2BE91D74-A7AB-4C20-A872-04274B416490}" type="presParOf" srcId="{19FC4476-5FA7-4E82-8DD4-1E68A7CF94F3}" destId="{3ACB8E52-3D67-4D9D-875B-7B9BC5839DB7}" srcOrd="3" destOrd="0" presId="urn:microsoft.com/office/officeart/2018/2/layout/IconVerticalSolidList"/>
+    <dgm:cxn modelId="{A8587FE4-0789-4222-A22D-878AE6ABF3D8}" type="presParOf" srcId="{389A2C24-8E70-4FA1-9548-96FAD26428E4}" destId="{3A4D3D1F-BF32-4A8A-9A0F-4A81AC657438}" srcOrd="9" destOrd="0" presId="urn:microsoft.com/office/officeart/2018/2/layout/IconVerticalSolidList"/>
+    <dgm:cxn modelId="{4C9E4B34-1DFD-4A04-9C6A-FED4A56F211B}" type="presParOf" srcId="{389A2C24-8E70-4FA1-9548-96FAD26428E4}" destId="{9680A8A9-BA6F-406E-90C5-4FC3F21BE3C3}" srcOrd="10" destOrd="0" presId="urn:microsoft.com/office/officeart/2018/2/layout/IconVerticalSolidList"/>
     <dgm:cxn modelId="{9AC843FD-5544-4339-8563-2193E985EBE8}" type="presParOf" srcId="{9680A8A9-BA6F-406E-90C5-4FC3F21BE3C3}" destId="{F0075E7C-73BA-454F-B59A-FA750A974D20}" srcOrd="0" destOrd="0" presId="urn:microsoft.com/office/officeart/2018/2/layout/IconVerticalSolidList"/>
     <dgm:cxn modelId="{09C14F4B-9ADA-4A13-930A-BC5E9EF87060}" type="presParOf" srcId="{9680A8A9-BA6F-406E-90C5-4FC3F21BE3C3}" destId="{F13BB237-87EB-4346-82F5-3B7696F5448F}" srcOrd="1" destOrd="0" presId="urn:microsoft.com/office/officeart/2018/2/layout/IconVerticalSolidList"/>
     <dgm:cxn modelId="{D3FE677E-EBD1-4F11-98F0-C873814FBD24}" type="presParOf" srcId="{9680A8A9-BA6F-406E-90C5-4FC3F21BE3C3}" destId="{B7641A2A-474B-44EA-A48D-A1F1C44D89E5}" srcOrd="2" destOrd="0" presId="urn:microsoft.com/office/officeart/2018/2/layout/IconVerticalSolidList"/>
     <dgm:cxn modelId="{FA06A4F5-451F-49AE-8622-CCBB21BAD670}" type="presParOf" srcId="{9680A8A9-BA6F-406E-90C5-4FC3F21BE3C3}" destId="{50220493-80AC-4268-9B52-EDF674FCC6D7}" srcOrd="3" destOrd="0" presId="urn:microsoft.com/office/officeart/2018/2/layout/IconVerticalSolidList"/>
-    <dgm:cxn modelId="{3FAF3FC2-A76F-4959-B48C-64FFD9074CB5}" type="presParOf" srcId="{389A2C24-8E70-4FA1-9548-96FAD26428E4}" destId="{7B15AAE2-1ADC-49FE-A641-8B797581AE58}" srcOrd="7" destOrd="0" presId="urn:microsoft.com/office/officeart/2018/2/layout/IconVerticalSolidList"/>
-    <dgm:cxn modelId="{0235A073-64E4-4004-99DF-286E60615765}" type="presParOf" srcId="{389A2C24-8E70-4FA1-9548-96FAD26428E4}" destId="{9882DC38-B821-4F49-91BF-0AFC4705DEA3}" srcOrd="8" destOrd="0" presId="urn:microsoft.com/office/officeart/2018/2/layout/IconVerticalSolidList"/>
+    <dgm:cxn modelId="{3FAF3FC2-A76F-4959-B48C-64FFD9074CB5}" type="presParOf" srcId="{389A2C24-8E70-4FA1-9548-96FAD26428E4}" destId="{7B15AAE2-1ADC-49FE-A641-8B797581AE58}" srcOrd="11" destOrd="0" presId="urn:microsoft.com/office/officeart/2018/2/layout/IconVerticalSolidList"/>
+    <dgm:cxn modelId="{0235A073-64E4-4004-99DF-286E60615765}" type="presParOf" srcId="{389A2C24-8E70-4FA1-9548-96FAD26428E4}" destId="{9882DC38-B821-4F49-91BF-0AFC4705DEA3}" srcOrd="12" destOrd="0" presId="urn:microsoft.com/office/officeart/2018/2/layout/IconVerticalSolidList"/>
     <dgm:cxn modelId="{39A25571-3E01-4E4B-B42E-5876DFE02D50}" type="presParOf" srcId="{9882DC38-B821-4F49-91BF-0AFC4705DEA3}" destId="{C2DF2B10-815A-4EF5-AC32-D5EF4742BEDA}" srcOrd="0" destOrd="0" presId="urn:microsoft.com/office/officeart/2018/2/layout/IconVerticalSolidList"/>
     <dgm:cxn modelId="{16ADE288-C834-4457-8F78-52EE4B819D5B}" type="presParOf" srcId="{9882DC38-B821-4F49-91BF-0AFC4705DEA3}" destId="{64133F2F-B75E-4B2F-A1FC-058C2AF92E7C}" srcOrd="1" destOrd="0" presId="urn:microsoft.com/office/officeart/2018/2/layout/IconVerticalSolidList"/>
     <dgm:cxn modelId="{60CA2681-A1C2-4110-AC2F-0F67F22BA141}" type="presParOf" srcId="{9882DC38-B821-4F49-91BF-0AFC4705DEA3}" destId="{A0962831-CC55-43F4-B896-751A06A5CA72}" srcOrd="2" destOrd="0" presId="urn:microsoft.com/office/officeart/2018/2/layout/IconVerticalSolidList"/>
     <dgm:cxn modelId="{621D135F-45D6-4CC2-B4DD-C7507FEF54F6}" type="presParOf" srcId="{9882DC38-B821-4F49-91BF-0AFC4705DEA3}" destId="{6C14DBC8-1152-4BB9-A97F-6453CD3CA6CF}" srcOrd="3" destOrd="0" presId="urn:microsoft.com/office/officeart/2018/2/layout/IconVerticalSolidList"/>
-    <dgm:cxn modelId="{62627FA0-33CC-4126-B703-6B6E68BC1A8B}" type="presParOf" srcId="{389A2C24-8E70-4FA1-9548-96FAD26428E4}" destId="{877D17C7-CA4D-485D-A552-7C9BADC232E6}" srcOrd="9" destOrd="0" presId="urn:microsoft.com/office/officeart/2018/2/layout/IconVerticalSolidList"/>
-    <dgm:cxn modelId="{44153E30-1800-429C-A562-32063562A1B9}" type="presParOf" srcId="{389A2C24-8E70-4FA1-9548-96FAD26428E4}" destId="{561EEF66-5727-4CDD-84EA-F128AEED3BEC}" srcOrd="10" destOrd="0" presId="urn:microsoft.com/office/officeart/2018/2/layout/IconVerticalSolidList"/>
+    <dgm:cxn modelId="{62627FA0-33CC-4126-B703-6B6E68BC1A8B}" type="presParOf" srcId="{389A2C24-8E70-4FA1-9548-96FAD26428E4}" destId="{877D17C7-CA4D-485D-A552-7C9BADC232E6}" srcOrd="13" destOrd="0" presId="urn:microsoft.com/office/officeart/2018/2/layout/IconVerticalSolidList"/>
+    <dgm:cxn modelId="{44153E30-1800-429C-A562-32063562A1B9}" type="presParOf" srcId="{389A2C24-8E70-4FA1-9548-96FAD26428E4}" destId="{561EEF66-5727-4CDD-84EA-F128AEED3BEC}" srcOrd="14" destOrd="0" presId="urn:microsoft.com/office/officeart/2018/2/layout/IconVerticalSolidList"/>
     <dgm:cxn modelId="{14B045C7-D62B-4827-910E-4D33534A7E69}" type="presParOf" srcId="{561EEF66-5727-4CDD-84EA-F128AEED3BEC}" destId="{25CEC266-C6C3-456A-9869-47E25FCD6DAD}" srcOrd="0" destOrd="0" presId="urn:microsoft.com/office/officeart/2018/2/layout/IconVerticalSolidList"/>
     <dgm:cxn modelId="{50A3479C-28E2-42D6-A67D-33C21F97B02E}" type="presParOf" srcId="{561EEF66-5727-4CDD-84EA-F128AEED3BEC}" destId="{A29DBDA7-506C-4F35-9288-30E5C24B6284}" srcOrd="1" destOrd="0" presId="urn:microsoft.com/office/officeart/2018/2/layout/IconVerticalSolidList"/>
     <dgm:cxn modelId="{7FBF5CA7-FAD3-4041-81AB-FBA5E22A57D6}" type="presParOf" srcId="{561EEF66-5727-4CDD-84EA-F128AEED3BEC}" destId="{8794C71B-2B74-412A-8334-E34FEE5D6739}" srcOrd="2" destOrd="0" presId="urn:microsoft.com/office/officeart/2018/2/layout/IconVerticalSolidList"/>
@@ -6710,8 +6867,8 @@
       </dsp:nvSpPr>
       <dsp:spPr>
         <a:xfrm>
-          <a:off x="0" y="1903"/>
-          <a:ext cx="6513603" cy="811257"/>
+          <a:off x="-48065" y="13162"/>
+          <a:ext cx="6513603" cy="538109"/>
         </a:xfrm>
         <a:prstGeom prst="roundRect">
           <a:avLst>
@@ -6752,8 +6909,8 @@
       </dsp:nvSpPr>
       <dsp:spPr>
         <a:xfrm>
-          <a:off x="245405" y="184436"/>
-          <a:ext cx="446191" cy="446191"/>
+          <a:off x="114712" y="134236"/>
+          <a:ext cx="295960" cy="295960"/>
         </a:xfrm>
         <a:prstGeom prst="rect">
           <a:avLst/>
@@ -6773,21 +6930,29 @@
             <a:fillRect/>
           </a:stretch>
         </a:blipFill>
-        <a:ln w="12700" cap="flat" cmpd="sng" algn="ctr">
-          <a:noFill/>
+        <a:ln w="19050" cap="flat" cmpd="sng" algn="ctr">
+          <a:solidFill>
+            <a:schemeClr val="lt1">
+              <a:alpha val="0"/>
+              <a:hueOff val="0"/>
+              <a:satOff val="0"/>
+              <a:lumOff val="0"/>
+              <a:alphaOff val="0"/>
+            </a:schemeClr>
+          </a:solidFill>
           <a:prstDash val="solid"/>
           <a:miter lim="800000"/>
         </a:ln>
         <a:effectLst/>
       </dsp:spPr>
       <dsp:style>
-        <a:lnRef idx="2">
+        <a:lnRef idx="3">
           <a:scrgbClr r="0" g="0" b="0"/>
         </a:lnRef>
         <a:fillRef idx="1">
           <a:scrgbClr r="0" g="0" b="0"/>
         </a:fillRef>
-        <a:effectRef idx="0">
+        <a:effectRef idx="1">
           <a:scrgbClr r="0" g="0" b="0"/>
         </a:effectRef>
         <a:fontRef idx="minor">
@@ -6802,8 +6967,8 @@
       </dsp:nvSpPr>
       <dsp:spPr>
         <a:xfrm>
-          <a:off x="937002" y="1903"/>
-          <a:ext cx="5576601" cy="811257"/>
+          <a:off x="573450" y="13162"/>
+          <a:ext cx="5890871" cy="538109"/>
         </a:xfrm>
         <a:prstGeom prst="rect">
           <a:avLst/>
@@ -6827,12 +6992,12 @@
         <a:fontRef idx="minor"/>
       </dsp:style>
       <dsp:txBody>
-        <a:bodyPr spcFirstLastPara="0" vert="horz" wrap="square" lIns="85858" tIns="85858" rIns="85858" bIns="85858" numCol="1" spcCol="1270" anchor="ctr" anchorCtr="0">
+        <a:bodyPr spcFirstLastPara="0" vert="horz" wrap="square" lIns="56950" tIns="56950" rIns="56950" bIns="56950" numCol="1" spcCol="1270" anchor="ctr" anchorCtr="0">
           <a:noAutofit/>
         </a:bodyPr>
         <a:lstStyle/>
         <a:p>
-          <a:pPr marL="0" lvl="0" indent="0" algn="l" defTabSz="844550">
+          <a:pPr marL="0" lvl="0" indent="0" algn="l" defTabSz="622300">
             <a:lnSpc>
               <a:spcPct val="100000"/>
             </a:lnSpc>
@@ -6845,14 +7010,14 @@
             <a:buNone/>
           </a:pPr>
           <a:r>
-            <a:rPr lang="en-US" sz="1900" kern="1200"/>
+            <a:rPr lang="en-US" sz="1400" kern="1200"/>
             <a:t>Database-MySql, JAWSdb</a:t>
           </a:r>
         </a:p>
       </dsp:txBody>
       <dsp:txXfrm>
-        <a:off x="937002" y="1903"/>
-        <a:ext cx="5576601" cy="811257"/>
+        <a:off x="573450" y="13162"/>
+        <a:ext cx="5890871" cy="538109"/>
       </dsp:txXfrm>
     </dsp:sp>
     <dsp:sp modelId="{1231876F-1B78-4BAA-B4A4-8E9BD9748F6D}">
@@ -6862,8 +7027,8 @@
       </dsp:nvSpPr>
       <dsp:spPr>
         <a:xfrm>
-          <a:off x="0" y="1015975"/>
-          <a:ext cx="6513603" cy="811257"/>
+          <a:off x="-48065" y="685798"/>
+          <a:ext cx="6513603" cy="538109"/>
         </a:xfrm>
         <a:prstGeom prst="roundRect">
           <a:avLst>
@@ -6904,8 +7069,8 @@
       </dsp:nvSpPr>
       <dsp:spPr>
         <a:xfrm>
-          <a:off x="245405" y="1198508"/>
-          <a:ext cx="446191" cy="446191"/>
+          <a:off x="114712" y="806873"/>
+          <a:ext cx="295960" cy="295960"/>
         </a:xfrm>
         <a:prstGeom prst="rect">
           <a:avLst/>
@@ -6925,21 +7090,29 @@
             <a:fillRect/>
           </a:stretch>
         </a:blipFill>
-        <a:ln w="12700" cap="flat" cmpd="sng" algn="ctr">
-          <a:noFill/>
+        <a:ln w="19050" cap="flat" cmpd="sng" algn="ctr">
+          <a:solidFill>
+            <a:schemeClr val="lt1">
+              <a:alpha val="0"/>
+              <a:hueOff val="0"/>
+              <a:satOff val="0"/>
+              <a:lumOff val="0"/>
+              <a:alphaOff val="0"/>
+            </a:schemeClr>
+          </a:solidFill>
           <a:prstDash val="solid"/>
           <a:miter lim="800000"/>
         </a:ln>
         <a:effectLst/>
       </dsp:spPr>
       <dsp:style>
-        <a:lnRef idx="2">
+        <a:lnRef idx="3">
           <a:scrgbClr r="0" g="0" b="0"/>
         </a:lnRef>
         <a:fillRef idx="1">
           <a:scrgbClr r="0" g="0" b="0"/>
         </a:fillRef>
-        <a:effectRef idx="0">
+        <a:effectRef idx="1">
           <a:scrgbClr r="0" g="0" b="0"/>
         </a:effectRef>
         <a:fontRef idx="minor">
@@ -6954,8 +7127,8 @@
       </dsp:nvSpPr>
       <dsp:spPr>
         <a:xfrm>
-          <a:off x="937002" y="1015975"/>
-          <a:ext cx="5576601" cy="811257"/>
+          <a:off x="573450" y="685798"/>
+          <a:ext cx="5890871" cy="538109"/>
         </a:xfrm>
         <a:prstGeom prst="rect">
           <a:avLst/>
@@ -6979,12 +7152,12 @@
         <a:fontRef idx="minor"/>
       </dsp:style>
       <dsp:txBody>
-        <a:bodyPr spcFirstLastPara="0" vert="horz" wrap="square" lIns="85858" tIns="85858" rIns="85858" bIns="85858" numCol="1" spcCol="1270" anchor="ctr" anchorCtr="0">
+        <a:bodyPr spcFirstLastPara="0" vert="horz" wrap="square" lIns="56950" tIns="56950" rIns="56950" bIns="56950" numCol="1" spcCol="1270" anchor="ctr" anchorCtr="0">
           <a:noAutofit/>
         </a:bodyPr>
         <a:lstStyle/>
         <a:p>
-          <a:pPr marL="0" lvl="0" indent="0" algn="l" defTabSz="844550">
+          <a:pPr marL="0" lvl="0" indent="0" algn="l" defTabSz="622300">
             <a:lnSpc>
               <a:spcPct val="100000"/>
             </a:lnSpc>
@@ -6997,14 +7170,14 @@
             <a:buNone/>
           </a:pPr>
           <a:r>
-            <a:rPr lang="en-US" sz="1900" kern="1200"/>
+            <a:rPr lang="en-US" sz="1400" kern="1200"/>
             <a:t>Web App-Flask-sqlalchemy, Heroku</a:t>
           </a:r>
         </a:p>
       </dsp:txBody>
       <dsp:txXfrm>
-        <a:off x="937002" y="1015975"/>
-        <a:ext cx="5576601" cy="811257"/>
+        <a:off x="573450" y="685798"/>
+        <a:ext cx="5890871" cy="538109"/>
       </dsp:txXfrm>
     </dsp:sp>
     <dsp:sp modelId="{20BE625A-490A-43EB-8A8E-3C835D2D6F5F}">
@@ -7014,8 +7187,8 @@
       </dsp:nvSpPr>
       <dsp:spPr>
         <a:xfrm>
-          <a:off x="0" y="2030048"/>
-          <a:ext cx="6513603" cy="811257"/>
+          <a:off x="-48065" y="1358435"/>
+          <a:ext cx="6513603" cy="538109"/>
         </a:xfrm>
         <a:prstGeom prst="roundRect">
           <a:avLst>
@@ -7056,8 +7229,8 @@
       </dsp:nvSpPr>
       <dsp:spPr>
         <a:xfrm>
-          <a:off x="245405" y="2212581"/>
-          <a:ext cx="446191" cy="446191"/>
+          <a:off x="114712" y="1479510"/>
+          <a:ext cx="295960" cy="295960"/>
         </a:xfrm>
         <a:prstGeom prst="rect">
           <a:avLst/>
@@ -7077,21 +7250,29 @@
             <a:fillRect/>
           </a:stretch>
         </a:blipFill>
-        <a:ln w="12700" cap="flat" cmpd="sng" algn="ctr">
-          <a:noFill/>
+        <a:ln w="19050" cap="flat" cmpd="sng" algn="ctr">
+          <a:solidFill>
+            <a:schemeClr val="lt1">
+              <a:alpha val="0"/>
+              <a:hueOff val="0"/>
+              <a:satOff val="0"/>
+              <a:lumOff val="0"/>
+              <a:alphaOff val="0"/>
+            </a:schemeClr>
+          </a:solidFill>
           <a:prstDash val="solid"/>
           <a:miter lim="800000"/>
         </a:ln>
         <a:effectLst/>
       </dsp:spPr>
       <dsp:style>
-        <a:lnRef idx="2">
+        <a:lnRef idx="3">
           <a:scrgbClr r="0" g="0" b="0"/>
         </a:lnRef>
         <a:fillRef idx="1">
           <a:scrgbClr r="0" g="0" b="0"/>
         </a:fillRef>
-        <a:effectRef idx="0">
+        <a:effectRef idx="1">
           <a:scrgbClr r="0" g="0" b="0"/>
         </a:effectRef>
         <a:fontRef idx="minor">
@@ -7106,8 +7287,8 @@
       </dsp:nvSpPr>
       <dsp:spPr>
         <a:xfrm>
-          <a:off x="937002" y="2030048"/>
-          <a:ext cx="5576601" cy="811257"/>
+          <a:off x="573450" y="1358435"/>
+          <a:ext cx="5890871" cy="538109"/>
         </a:xfrm>
         <a:prstGeom prst="rect">
           <a:avLst/>
@@ -7131,12 +7312,12 @@
         <a:fontRef idx="minor"/>
       </dsp:style>
       <dsp:txBody>
-        <a:bodyPr spcFirstLastPara="0" vert="horz" wrap="square" lIns="85858" tIns="85858" rIns="85858" bIns="85858" numCol="1" spcCol="1270" anchor="ctr" anchorCtr="0">
+        <a:bodyPr spcFirstLastPara="0" vert="horz" wrap="square" lIns="56950" tIns="56950" rIns="56950" bIns="56950" numCol="1" spcCol="1270" anchor="ctr" anchorCtr="0">
           <a:noAutofit/>
         </a:bodyPr>
         <a:lstStyle/>
         <a:p>
-          <a:pPr marL="0" lvl="0" indent="0" algn="l" defTabSz="844550">
+          <a:pPr marL="0" lvl="0" indent="0" algn="l" defTabSz="622300">
             <a:lnSpc>
               <a:spcPct val="100000"/>
             </a:lnSpc>
@@ -7149,14 +7330,337 @@
             <a:buNone/>
           </a:pPr>
           <a:r>
-            <a:rPr lang="en-US" sz="1900" kern="1200"/>
-            <a:t>FrontEnd-HTML, Javascript, Jinja, D3, Plotly, CSS</a:t>
+            <a:rPr lang="en-US" sz="1400" kern="1200" dirty="0" err="1"/>
+            <a:t>FrontEnd</a:t>
+          </a:r>
+          <a:r>
+            <a:rPr lang="en-US" sz="1400" kern="1200" dirty="0"/>
+            <a:t>-HTML, </a:t>
+          </a:r>
+          <a:r>
+            <a:rPr lang="en-US" sz="1400" kern="1200" dirty="0" err="1"/>
+            <a:t>Javascript</a:t>
+          </a:r>
+          <a:r>
+            <a:rPr lang="en-US" sz="1400" kern="1200" dirty="0"/>
+            <a:t>, Jinja, D3, </a:t>
+          </a:r>
+          <a:r>
+            <a:rPr lang="en-US" sz="1400" kern="1200" dirty="0" err="1"/>
+            <a:t>Plotly</a:t>
+          </a:r>
+          <a:r>
+            <a:rPr lang="en-US" sz="1400" kern="1200" dirty="0"/>
+            <a:t>, CSS</a:t>
           </a:r>
         </a:p>
       </dsp:txBody>
       <dsp:txXfrm>
-        <a:off x="937002" y="2030048"/>
-        <a:ext cx="5576601" cy="811257"/>
+        <a:off x="573450" y="1358435"/>
+        <a:ext cx="5890871" cy="538109"/>
+      </dsp:txXfrm>
+    </dsp:sp>
+    <dsp:sp modelId="{45E74346-E9D5-418F-9DA5-2FE73F7A8A6B}">
+      <dsp:nvSpPr>
+        <dsp:cNvPr id="0" name=""/>
+        <dsp:cNvSpPr/>
+      </dsp:nvSpPr>
+      <dsp:spPr>
+        <a:xfrm>
+          <a:off x="-48065" y="2281637"/>
+          <a:ext cx="6513603" cy="1105809"/>
+        </a:xfrm>
+        <a:prstGeom prst="roundRect">
+          <a:avLst>
+            <a:gd name="adj" fmla="val 10000"/>
+          </a:avLst>
+        </a:prstGeom>
+        <a:solidFill>
+          <a:schemeClr val="bg1">
+            <a:lumMod val="95000"/>
+            <a:hueOff val="0"/>
+            <a:satOff val="0"/>
+            <a:lumOff val="0"/>
+            <a:alphaOff val="0"/>
+          </a:schemeClr>
+        </a:solidFill>
+        <a:ln>
+          <a:noFill/>
+        </a:ln>
+        <a:effectLst/>
+      </dsp:spPr>
+      <dsp:style>
+        <a:lnRef idx="0">
+          <a:scrgbClr r="0" g="0" b="0"/>
+        </a:lnRef>
+        <a:fillRef idx="1">
+          <a:scrgbClr r="0" g="0" b="0"/>
+        </a:fillRef>
+        <a:effectRef idx="0">
+          <a:scrgbClr r="0" g="0" b="0"/>
+        </a:effectRef>
+        <a:fontRef idx="minor"/>
+      </dsp:style>
+    </dsp:sp>
+    <dsp:sp modelId="{58E54AAF-3FD7-46A5-8067-B0DF0868DBEA}">
+      <dsp:nvSpPr>
+        <dsp:cNvPr id="0" name=""/>
+        <dsp:cNvSpPr/>
+      </dsp:nvSpPr>
+      <dsp:spPr>
+        <a:xfrm>
+          <a:off x="114712" y="2458414"/>
+          <a:ext cx="295960" cy="295960"/>
+        </a:xfrm>
+        <a:prstGeom prst="rect">
+          <a:avLst/>
+        </a:prstGeom>
+        <a:solidFill>
+          <a:schemeClr val="accent5">
+            <a:hueOff val="-2896518"/>
+            <a:satOff val="-7465"/>
+            <a:lumOff val="-5042"/>
+            <a:alphaOff val="0"/>
+          </a:schemeClr>
+        </a:solidFill>
+        <a:ln w="19050" cap="flat" cmpd="sng" algn="ctr">
+          <a:solidFill>
+            <a:schemeClr val="lt1">
+              <a:alpha val="0"/>
+              <a:hueOff val="0"/>
+              <a:satOff val="0"/>
+              <a:lumOff val="0"/>
+              <a:alphaOff val="0"/>
+            </a:schemeClr>
+          </a:solidFill>
+          <a:prstDash val="solid"/>
+          <a:miter lim="800000"/>
+        </a:ln>
+        <a:effectLst/>
+      </dsp:spPr>
+      <dsp:style>
+        <a:lnRef idx="3">
+          <a:scrgbClr r="0" g="0" b="0"/>
+        </a:lnRef>
+        <a:fillRef idx="1">
+          <a:scrgbClr r="0" g="0" b="0"/>
+        </a:fillRef>
+        <a:effectRef idx="1">
+          <a:scrgbClr r="0" g="0" b="0"/>
+        </a:effectRef>
+        <a:fontRef idx="minor">
+          <a:schemeClr val="lt1"/>
+        </a:fontRef>
+      </dsp:style>
+    </dsp:sp>
+    <dsp:sp modelId="{DFD96584-8BBA-4F7C-9C0E-EC8F6BA60DDA}">
+      <dsp:nvSpPr>
+        <dsp:cNvPr id="0" name=""/>
+        <dsp:cNvSpPr/>
+      </dsp:nvSpPr>
+      <dsp:spPr>
+        <a:xfrm>
+          <a:off x="476104" y="2031072"/>
+          <a:ext cx="6085565" cy="1150644"/>
+        </a:xfrm>
+        <a:prstGeom prst="rect">
+          <a:avLst/>
+        </a:prstGeom>
+        <a:noFill/>
+        <a:ln>
+          <a:noFill/>
+        </a:ln>
+        <a:effectLst/>
+      </dsp:spPr>
+      <dsp:style>
+        <a:lnRef idx="0">
+          <a:scrgbClr r="0" g="0" b="0"/>
+        </a:lnRef>
+        <a:fillRef idx="0">
+          <a:scrgbClr r="0" g="0" b="0"/>
+        </a:fillRef>
+        <a:effectRef idx="0">
+          <a:scrgbClr r="0" g="0" b="0"/>
+        </a:effectRef>
+        <a:fontRef idx="minor"/>
+      </dsp:style>
+      <dsp:txBody>
+        <a:bodyPr spcFirstLastPara="0" vert="horz" wrap="square" lIns="56950" tIns="56950" rIns="56950" bIns="56950" numCol="1" spcCol="1270" anchor="ctr" anchorCtr="0">
+          <a:noAutofit/>
+        </a:bodyPr>
+        <a:lstStyle/>
+        <a:p>
+          <a:pPr marL="0" lvl="0" indent="0" algn="l" defTabSz="622300">
+            <a:lnSpc>
+              <a:spcPct val="100000"/>
+            </a:lnSpc>
+            <a:spcBef>
+              <a:spcPct val="0"/>
+            </a:spcBef>
+            <a:spcAft>
+              <a:spcPct val="35000"/>
+            </a:spcAft>
+            <a:buNone/>
+          </a:pPr>
+          <a:r>
+            <a:rPr lang="en-US" sz="1400" kern="1200" dirty="0"/>
+            <a:t>Machine Learning models used: K-Means, hill climbing algorithm, NLP , cosine similarity</a:t>
+          </a:r>
+        </a:p>
+      </dsp:txBody>
+      <dsp:txXfrm>
+        <a:off x="476104" y="2031072"/>
+        <a:ext cx="6085565" cy="1150644"/>
+      </dsp:txXfrm>
+    </dsp:sp>
+    <dsp:sp modelId="{B21B12C1-A436-4945-A7B8-F795C926DF35}">
+      <dsp:nvSpPr>
+        <dsp:cNvPr id="0" name=""/>
+        <dsp:cNvSpPr/>
+      </dsp:nvSpPr>
+      <dsp:spPr>
+        <a:xfrm>
+          <a:off x="-48065" y="3352239"/>
+          <a:ext cx="6513603" cy="381602"/>
+        </a:xfrm>
+        <a:prstGeom prst="roundRect">
+          <a:avLst>
+            <a:gd name="adj" fmla="val 10000"/>
+          </a:avLst>
+        </a:prstGeom>
+        <a:solidFill>
+          <a:schemeClr val="bg1">
+            <a:lumMod val="95000"/>
+            <a:hueOff val="0"/>
+            <a:satOff val="0"/>
+            <a:lumOff val="0"/>
+            <a:alphaOff val="0"/>
+          </a:schemeClr>
+        </a:solidFill>
+        <a:ln>
+          <a:noFill/>
+        </a:ln>
+        <a:effectLst/>
+      </dsp:spPr>
+      <dsp:style>
+        <a:lnRef idx="0">
+          <a:scrgbClr r="0" g="0" b="0"/>
+        </a:lnRef>
+        <a:fillRef idx="1">
+          <a:scrgbClr r="0" g="0" b="0"/>
+        </a:fillRef>
+        <a:effectRef idx="0">
+          <a:scrgbClr r="0" g="0" b="0"/>
+        </a:effectRef>
+        <a:fontRef idx="minor"/>
+      </dsp:style>
+    </dsp:sp>
+    <dsp:sp modelId="{0DA695FA-05C1-4A5E-8C0C-69938BF3FC46}">
+      <dsp:nvSpPr>
+        <dsp:cNvPr id="0" name=""/>
+        <dsp:cNvSpPr/>
+      </dsp:nvSpPr>
+      <dsp:spPr>
+        <a:xfrm>
+          <a:off x="114712" y="3395060"/>
+          <a:ext cx="295960" cy="295960"/>
+        </a:xfrm>
+        <a:prstGeom prst="rect">
+          <a:avLst/>
+        </a:prstGeom>
+        <a:solidFill>
+          <a:schemeClr val="accent5">
+            <a:hueOff val="-3862025"/>
+            <a:satOff val="-9954"/>
+            <a:lumOff val="-6723"/>
+            <a:alphaOff val="0"/>
+          </a:schemeClr>
+        </a:solidFill>
+        <a:ln w="19050" cap="flat" cmpd="sng" algn="ctr">
+          <a:solidFill>
+            <a:schemeClr val="lt1">
+              <a:alpha val="0"/>
+              <a:hueOff val="0"/>
+              <a:satOff val="0"/>
+              <a:lumOff val="0"/>
+              <a:alphaOff val="0"/>
+            </a:schemeClr>
+          </a:solidFill>
+          <a:prstDash val="solid"/>
+          <a:miter lim="800000"/>
+        </a:ln>
+        <a:effectLst/>
+      </dsp:spPr>
+      <dsp:style>
+        <a:lnRef idx="3">
+          <a:scrgbClr r="0" g="0" b="0"/>
+        </a:lnRef>
+        <a:fillRef idx="1">
+          <a:scrgbClr r="0" g="0" b="0"/>
+        </a:fillRef>
+        <a:effectRef idx="1">
+          <a:scrgbClr r="0" g="0" b="0"/>
+        </a:effectRef>
+        <a:fontRef idx="minor">
+          <a:schemeClr val="lt1"/>
+        </a:fontRef>
+      </dsp:style>
+    </dsp:sp>
+    <dsp:sp modelId="{3ACB8E52-3D67-4D9D-875B-7B9BC5839DB7}">
+      <dsp:nvSpPr>
+        <dsp:cNvPr id="0" name=""/>
+        <dsp:cNvSpPr/>
+      </dsp:nvSpPr>
+      <dsp:spPr>
+        <a:xfrm>
+          <a:off x="573450" y="3316244"/>
+          <a:ext cx="5890871" cy="538109"/>
+        </a:xfrm>
+        <a:prstGeom prst="rect">
+          <a:avLst/>
+        </a:prstGeom>
+        <a:noFill/>
+        <a:ln>
+          <a:noFill/>
+        </a:ln>
+        <a:effectLst/>
+      </dsp:spPr>
+      <dsp:style>
+        <a:lnRef idx="0">
+          <a:scrgbClr r="0" g="0" b="0"/>
+        </a:lnRef>
+        <a:fillRef idx="0">
+          <a:scrgbClr r="0" g="0" b="0"/>
+        </a:fillRef>
+        <a:effectRef idx="0">
+          <a:scrgbClr r="0" g="0" b="0"/>
+        </a:effectRef>
+        <a:fontRef idx="minor"/>
+      </dsp:style>
+      <dsp:txBody>
+        <a:bodyPr spcFirstLastPara="0" vert="horz" wrap="square" lIns="56950" tIns="56950" rIns="56950" bIns="56950" numCol="1" spcCol="1270" anchor="ctr" anchorCtr="0">
+          <a:noAutofit/>
+        </a:bodyPr>
+        <a:lstStyle/>
+        <a:p>
+          <a:pPr marL="0" lvl="0" indent="0" algn="l" defTabSz="622300">
+            <a:lnSpc>
+              <a:spcPct val="100000"/>
+            </a:lnSpc>
+            <a:spcBef>
+              <a:spcPct val="0"/>
+            </a:spcBef>
+            <a:spcAft>
+              <a:spcPct val="35000"/>
+            </a:spcAft>
+            <a:buNone/>
+          </a:pPr>
+          <a:endParaRPr lang="en-US" sz="1400" kern="1200" dirty="0"/>
+        </a:p>
+      </dsp:txBody>
+      <dsp:txXfrm>
+        <a:off x="573450" y="3316244"/>
+        <a:ext cx="5890871" cy="538109"/>
       </dsp:txXfrm>
     </dsp:sp>
     <dsp:sp modelId="{F0075E7C-73BA-454F-B59A-FA750A974D20}">
@@ -7166,8 +7670,8 @@
       </dsp:nvSpPr>
       <dsp:spPr>
         <a:xfrm>
-          <a:off x="0" y="3044120"/>
-          <a:ext cx="6513603" cy="811257"/>
+          <a:off x="0" y="4236707"/>
+          <a:ext cx="6513603" cy="538109"/>
         </a:xfrm>
         <a:prstGeom prst="roundRect">
           <a:avLst>
@@ -7208,8 +7712,8 @@
       </dsp:nvSpPr>
       <dsp:spPr>
         <a:xfrm>
-          <a:off x="245405" y="3226653"/>
-          <a:ext cx="446191" cy="446191"/>
+          <a:off x="114712" y="4109955"/>
+          <a:ext cx="295960" cy="295960"/>
         </a:xfrm>
         <a:prstGeom prst="rect">
           <a:avLst/>
@@ -7229,21 +7733,29 @@
             <a:fillRect/>
           </a:stretch>
         </a:blipFill>
-        <a:ln w="12700" cap="flat" cmpd="sng" algn="ctr">
-          <a:noFill/>
+        <a:ln w="19050" cap="flat" cmpd="sng" algn="ctr">
+          <a:solidFill>
+            <a:schemeClr val="lt1">
+              <a:alpha val="0"/>
+              <a:hueOff val="0"/>
+              <a:satOff val="0"/>
+              <a:lumOff val="0"/>
+              <a:alphaOff val="0"/>
+            </a:schemeClr>
+          </a:solidFill>
           <a:prstDash val="solid"/>
           <a:miter lim="800000"/>
         </a:ln>
         <a:effectLst/>
       </dsp:spPr>
       <dsp:style>
-        <a:lnRef idx="2">
+        <a:lnRef idx="3">
           <a:scrgbClr r="0" g="0" b="0"/>
         </a:lnRef>
         <a:fillRef idx="1">
           <a:scrgbClr r="0" g="0" b="0"/>
         </a:fillRef>
-        <a:effectRef idx="0">
+        <a:effectRef idx="1">
           <a:scrgbClr r="0" g="0" b="0"/>
         </a:effectRef>
         <a:fontRef idx="minor">
@@ -7258,8 +7770,8 @@
       </dsp:nvSpPr>
       <dsp:spPr>
         <a:xfrm>
-          <a:off x="937002" y="3044120"/>
-          <a:ext cx="5576601" cy="811257"/>
+          <a:off x="573450" y="3988881"/>
+          <a:ext cx="5890871" cy="538109"/>
         </a:xfrm>
         <a:prstGeom prst="rect">
           <a:avLst/>
@@ -7283,12 +7795,12 @@
         <a:fontRef idx="minor"/>
       </dsp:style>
       <dsp:txBody>
-        <a:bodyPr spcFirstLastPara="0" vert="horz" wrap="square" lIns="85858" tIns="85858" rIns="85858" bIns="85858" numCol="1" spcCol="1270" anchor="ctr" anchorCtr="0">
+        <a:bodyPr spcFirstLastPara="0" vert="horz" wrap="square" lIns="56950" tIns="56950" rIns="56950" bIns="56950" numCol="1" spcCol="1270" anchor="ctr" anchorCtr="0">
           <a:noAutofit/>
         </a:bodyPr>
         <a:lstStyle/>
         <a:p>
-          <a:pPr marL="0" lvl="0" indent="0" algn="l" defTabSz="844550">
+          <a:pPr marL="0" lvl="0" indent="0" algn="l" defTabSz="622300">
             <a:lnSpc>
               <a:spcPct val="100000"/>
             </a:lnSpc>
@@ -7301,14 +7813,14 @@
             <a:buNone/>
           </a:pPr>
           <a:r>
-            <a:rPr lang="en-US" sz="1900" kern="1200"/>
+            <a:rPr lang="en-US" sz="1400" kern="1200" dirty="0"/>
             <a:t>Backend-Python</a:t>
           </a:r>
         </a:p>
       </dsp:txBody>
       <dsp:txXfrm>
-        <a:off x="937002" y="3044120"/>
-        <a:ext cx="5576601" cy="811257"/>
+        <a:off x="573450" y="3988881"/>
+        <a:ext cx="5890871" cy="538109"/>
       </dsp:txXfrm>
     </dsp:sp>
     <dsp:sp modelId="{C2DF2B10-815A-4EF5-AC32-D5EF4742BEDA}">
@@ -7318,8 +7830,8 @@
       </dsp:nvSpPr>
       <dsp:spPr>
         <a:xfrm>
-          <a:off x="0" y="4058192"/>
-          <a:ext cx="6513603" cy="811257"/>
+          <a:off x="-48065" y="4661517"/>
+          <a:ext cx="6513603" cy="538109"/>
         </a:xfrm>
         <a:prstGeom prst="roundRect">
           <a:avLst>
@@ -7360,8 +7872,8 @@
       </dsp:nvSpPr>
       <dsp:spPr>
         <a:xfrm>
-          <a:off x="245405" y="4240725"/>
-          <a:ext cx="446191" cy="446191"/>
+          <a:off x="114712" y="4782592"/>
+          <a:ext cx="295960" cy="295960"/>
         </a:xfrm>
         <a:prstGeom prst="rect">
           <a:avLst/>
@@ -7381,21 +7893,29 @@
             <a:fillRect/>
           </a:stretch>
         </a:blipFill>
-        <a:ln w="12700" cap="flat" cmpd="sng" algn="ctr">
-          <a:noFill/>
+        <a:ln w="19050" cap="flat" cmpd="sng" algn="ctr">
+          <a:solidFill>
+            <a:schemeClr val="lt1">
+              <a:alpha val="0"/>
+              <a:hueOff val="0"/>
+              <a:satOff val="0"/>
+              <a:lumOff val="0"/>
+              <a:alphaOff val="0"/>
+            </a:schemeClr>
+          </a:solidFill>
           <a:prstDash val="solid"/>
           <a:miter lim="800000"/>
         </a:ln>
         <a:effectLst/>
       </dsp:spPr>
       <dsp:style>
-        <a:lnRef idx="2">
+        <a:lnRef idx="3">
           <a:scrgbClr r="0" g="0" b="0"/>
         </a:lnRef>
         <a:fillRef idx="1">
           <a:scrgbClr r="0" g="0" b="0"/>
         </a:fillRef>
-        <a:effectRef idx="0">
+        <a:effectRef idx="1">
           <a:scrgbClr r="0" g="0" b="0"/>
         </a:effectRef>
         <a:fontRef idx="minor">
@@ -7410,8 +7930,8 @@
       </dsp:nvSpPr>
       <dsp:spPr>
         <a:xfrm>
-          <a:off x="937002" y="4058192"/>
-          <a:ext cx="5576601" cy="811257"/>
+          <a:off x="573450" y="4661517"/>
+          <a:ext cx="5890871" cy="538109"/>
         </a:xfrm>
         <a:prstGeom prst="rect">
           <a:avLst/>
@@ -7435,12 +7955,12 @@
         <a:fontRef idx="minor"/>
       </dsp:style>
       <dsp:txBody>
-        <a:bodyPr spcFirstLastPara="0" vert="horz" wrap="square" lIns="85858" tIns="85858" rIns="85858" bIns="85858" numCol="1" spcCol="1270" anchor="ctr" anchorCtr="0">
+        <a:bodyPr spcFirstLastPara="0" vert="horz" wrap="square" lIns="56950" tIns="56950" rIns="56950" bIns="56950" numCol="1" spcCol="1270" anchor="ctr" anchorCtr="0">
           <a:noAutofit/>
         </a:bodyPr>
         <a:lstStyle/>
         <a:p>
-          <a:pPr marL="0" lvl="0" indent="0" algn="l" defTabSz="844550">
+          <a:pPr marL="0" lvl="0" indent="0" algn="l" defTabSz="622300">
             <a:lnSpc>
               <a:spcPct val="100000"/>
             </a:lnSpc>
@@ -7453,14 +7973,14 @@
             <a:buNone/>
           </a:pPr>
           <a:r>
-            <a:rPr lang="en-US" sz="1900" kern="1200"/>
+            <a:rPr lang="en-US" sz="1400" kern="1200"/>
             <a:t>All Deployed to Heroku</a:t>
           </a:r>
         </a:p>
       </dsp:txBody>
       <dsp:txXfrm>
-        <a:off x="937002" y="4058192"/>
-        <a:ext cx="5576601" cy="811257"/>
+        <a:off x="573450" y="4661517"/>
+        <a:ext cx="5890871" cy="538109"/>
       </dsp:txXfrm>
     </dsp:sp>
     <dsp:sp modelId="{25CEC266-C6C3-456A-9869-47E25FCD6DAD}">
@@ -7470,8 +7990,8 @@
       </dsp:nvSpPr>
       <dsp:spPr>
         <a:xfrm>
-          <a:off x="0" y="5074168"/>
-          <a:ext cx="6513603" cy="811257"/>
+          <a:off x="-48065" y="5347316"/>
+          <a:ext cx="6513603" cy="538109"/>
         </a:xfrm>
         <a:prstGeom prst="roundRect">
           <a:avLst>
@@ -7512,8 +8032,8 @@
       </dsp:nvSpPr>
       <dsp:spPr>
         <a:xfrm>
-          <a:off x="245405" y="5254797"/>
-          <a:ext cx="446191" cy="446191"/>
+          <a:off x="114712" y="5455229"/>
+          <a:ext cx="295960" cy="295960"/>
         </a:xfrm>
         <a:prstGeom prst="rect">
           <a:avLst/>
@@ -7533,21 +8053,29 @@
             <a:fillRect/>
           </a:stretch>
         </a:blipFill>
-        <a:ln w="12700" cap="flat" cmpd="sng" algn="ctr">
-          <a:noFill/>
+        <a:ln w="19050" cap="flat" cmpd="sng" algn="ctr">
+          <a:solidFill>
+            <a:schemeClr val="lt1">
+              <a:alpha val="0"/>
+              <a:hueOff val="0"/>
+              <a:satOff val="0"/>
+              <a:lumOff val="0"/>
+              <a:alphaOff val="0"/>
+            </a:schemeClr>
+          </a:solidFill>
           <a:prstDash val="solid"/>
           <a:miter lim="800000"/>
         </a:ln>
         <a:effectLst/>
       </dsp:spPr>
       <dsp:style>
-        <a:lnRef idx="2">
+        <a:lnRef idx="3">
           <a:scrgbClr r="0" g="0" b="0"/>
         </a:lnRef>
         <a:fillRef idx="1">
           <a:scrgbClr r="0" g="0" b="0"/>
         </a:fillRef>
-        <a:effectRef idx="0">
+        <a:effectRef idx="1">
           <a:scrgbClr r="0" g="0" b="0"/>
         </a:effectRef>
         <a:fontRef idx="minor">
@@ -7562,8 +8090,8 @@
       </dsp:nvSpPr>
       <dsp:spPr>
         <a:xfrm>
-          <a:off x="937002" y="5072264"/>
-          <a:ext cx="5576601" cy="811257"/>
+          <a:off x="573450" y="5334154"/>
+          <a:ext cx="5890871" cy="538109"/>
         </a:xfrm>
         <a:prstGeom prst="rect">
           <a:avLst/>
@@ -7587,12 +8115,12 @@
         <a:fontRef idx="minor"/>
       </dsp:style>
       <dsp:txBody>
-        <a:bodyPr spcFirstLastPara="0" vert="horz" wrap="square" lIns="85858" tIns="85858" rIns="85858" bIns="85858" numCol="1" spcCol="1270" anchor="ctr" anchorCtr="0">
+        <a:bodyPr spcFirstLastPara="0" vert="horz" wrap="square" lIns="56950" tIns="56950" rIns="56950" bIns="56950" numCol="1" spcCol="1270" anchor="ctr" anchorCtr="0">
           <a:noAutofit/>
         </a:bodyPr>
         <a:lstStyle/>
         <a:p>
-          <a:pPr marL="0" lvl="0" indent="0" algn="l" defTabSz="844550">
+          <a:pPr marL="0" lvl="0" indent="0" algn="l" defTabSz="622300">
             <a:lnSpc>
               <a:spcPct val="100000"/>
             </a:lnSpc>
@@ -7605,17 +8133,17 @@
             <a:buNone/>
           </a:pPr>
           <a:r>
-            <a:rPr lang="en-US" sz="1900" u="sng" kern="1200" dirty="0">
+            <a:rPr lang="en-US" sz="1400" u="sng" kern="1200" dirty="0">
               <a:hlinkClick xmlns:r="http://schemas.openxmlformats.org/officeDocument/2006/relationships" r:id="rId13"/>
             </a:rPr>
             <a:t>https://nutrometer.herokuapp.com/</a:t>
           </a:r>
-          <a:endParaRPr lang="en-US" sz="1900" kern="1200" dirty="0"/>
+          <a:endParaRPr lang="en-US" sz="1400" kern="1200" dirty="0"/>
         </a:p>
       </dsp:txBody>
       <dsp:txXfrm>
-        <a:off x="937002" y="5072264"/>
-        <a:ext cx="5576601" cy="811257"/>
+        <a:off x="573450" y="5334154"/>
+        <a:ext cx="5890871" cy="538109"/>
       </dsp:txXfrm>
     </dsp:sp>
   </dsp:spTree>
@@ -10512,11 +11040,11 @@
 </file>
 
 <file path=ppt/diagrams/quickStyle3.xml><?xml version="1.0" encoding="utf-8"?>
-<dgm:styleDef xmlns:dgm="http://schemas.openxmlformats.org/drawingml/2006/diagram" xmlns:a="http://schemas.openxmlformats.org/drawingml/2006/main" uniqueId="urn:microsoft.com/office/officeart/2005/8/quickstyle/simple1">
+<dgm:styleDef xmlns:dgm="http://schemas.openxmlformats.org/drawingml/2006/diagram" xmlns:a="http://schemas.openxmlformats.org/drawingml/2006/main" uniqueId="urn:microsoft.com/office/officeart/2005/8/quickstyle/simple2">
   <dgm:title val=""/>
   <dgm:desc val=""/>
   <dgm:catLst>
-    <dgm:cat type="simple" pri="10100"/>
+    <dgm:cat type="simple" pri="10200"/>
   </dgm:catLst>
   <dgm:scene3d>
     <a:camera prst="orthographicFront"/>
@@ -10530,13 +11058,13 @@
     <dgm:sp3d/>
     <dgm:txPr/>
     <dgm:style>
-      <a:lnRef idx="2">
+      <a:lnRef idx="3">
         <a:scrgbClr r="0" g="0" b="0"/>
       </a:lnRef>
       <a:fillRef idx="1">
         <a:scrgbClr r="0" g="0" b="0"/>
       </a:fillRef>
-      <a:effectRef idx="0">
+      <a:effectRef idx="1">
         <a:scrgbClr r="0" g="0" b="0"/>
       </a:effectRef>
       <a:fontRef idx="minor">
@@ -10552,13 +11080,13 @@
     <dgm:sp3d/>
     <dgm:txPr/>
     <dgm:style>
-      <a:lnRef idx="2">
+      <a:lnRef idx="3">
         <a:scrgbClr r="0" g="0" b="0"/>
       </a:lnRef>
       <a:fillRef idx="1">
         <a:scrgbClr r="0" g="0" b="0"/>
       </a:fillRef>
-      <a:effectRef idx="0">
+      <a:effectRef idx="1">
         <a:scrgbClr r="0" g="0" b="0"/>
       </a:effectRef>
       <a:fontRef idx="minor">
@@ -10574,7 +11102,7 @@
     <dgm:sp3d/>
     <dgm:txPr/>
     <dgm:style>
-      <a:lnRef idx="2">
+      <a:lnRef idx="3">
         <a:scrgbClr r="0" g="0" b="0"/>
       </a:lnRef>
       <a:fillRef idx="1">
@@ -10602,7 +11130,7 @@
       <a:fillRef idx="1">
         <a:scrgbClr r="0" g="0" b="0"/>
       </a:fillRef>
-      <a:effectRef idx="0">
+      <a:effectRef idx="1">
         <a:scrgbClr r="0" g="0" b="0"/>
       </a:effectRef>
       <a:fontRef idx="minor">
@@ -10618,13 +11146,13 @@
     <dgm:sp3d/>
     <dgm:txPr/>
     <dgm:style>
-      <a:lnRef idx="2">
+      <a:lnRef idx="3">
         <a:scrgbClr r="0" g="0" b="0"/>
       </a:lnRef>
       <a:fillRef idx="1">
         <a:scrgbClr r="0" g="0" b="0"/>
       </a:fillRef>
-      <a:effectRef idx="0">
+      <a:effectRef idx="1">
         <a:scrgbClr r="0" g="0" b="0"/>
       </a:effectRef>
       <a:fontRef idx="minor">
@@ -10640,13 +11168,13 @@
     <dgm:sp3d/>
     <dgm:txPr/>
     <dgm:style>
-      <a:lnRef idx="2">
+      <a:lnRef idx="3">
         <a:scrgbClr r="0" g="0" b="0"/>
       </a:lnRef>
       <a:fillRef idx="1">
         <a:scrgbClr r="0" g="0" b="0"/>
       </a:fillRef>
-      <a:effectRef idx="0">
+      <a:effectRef idx="1">
         <a:scrgbClr r="0" g="0" b="0"/>
       </a:effectRef>
       <a:fontRef idx="minor">
@@ -10662,13 +11190,13 @@
     <dgm:sp3d/>
     <dgm:txPr/>
     <dgm:style>
-      <a:lnRef idx="2">
+      <a:lnRef idx="3">
         <a:scrgbClr r="0" g="0" b="0"/>
       </a:lnRef>
       <a:fillRef idx="1">
         <a:scrgbClr r="0" g="0" b="0"/>
       </a:fillRef>
-      <a:effectRef idx="0">
+      <a:effectRef idx="1">
         <a:scrgbClr r="0" g="0" b="0"/>
       </a:effectRef>
       <a:fontRef idx="minor">
@@ -10684,13 +11212,13 @@
     <dgm:sp3d/>
     <dgm:txPr/>
     <dgm:style>
-      <a:lnRef idx="2">
+      <a:lnRef idx="3">
         <a:scrgbClr r="0" g="0" b="0"/>
       </a:lnRef>
       <a:fillRef idx="1">
         <a:scrgbClr r="0" g="0" b="0"/>
       </a:fillRef>
-      <a:effectRef idx="0">
+      <a:effectRef idx="1">
         <a:scrgbClr r="0" g="0" b="0"/>
       </a:effectRef>
       <a:fontRef idx="minor">
@@ -10706,13 +11234,13 @@
     <dgm:sp3d/>
     <dgm:txPr/>
     <dgm:style>
-      <a:lnRef idx="2">
+      <a:lnRef idx="3">
         <a:scrgbClr r="0" g="0" b="0"/>
       </a:lnRef>
       <a:fillRef idx="1">
         <a:scrgbClr r="0" g="0" b="0"/>
       </a:fillRef>
-      <a:effectRef idx="0">
+      <a:effectRef idx="1">
         <a:scrgbClr r="0" g="0" b="0"/>
       </a:effectRef>
       <a:fontRef idx="minor"/>
@@ -10726,13 +11254,13 @@
     <dgm:sp3d/>
     <dgm:txPr/>
     <dgm:style>
-      <a:lnRef idx="2">
+      <a:lnRef idx="3">
         <a:scrgbClr r="0" g="0" b="0"/>
       </a:lnRef>
       <a:fillRef idx="1">
         <a:scrgbClr r="0" g="0" b="0"/>
       </a:fillRef>
-      <a:effectRef idx="0">
+      <a:effectRef idx="1">
         <a:scrgbClr r="0" g="0" b="0"/>
       </a:effectRef>
       <a:fontRef idx="minor"/>
@@ -10746,13 +11274,13 @@
     <dgm:sp3d/>
     <dgm:txPr/>
     <dgm:style>
-      <a:lnRef idx="2">
+      <a:lnRef idx="3">
         <a:scrgbClr r="0" g="0" b="0"/>
       </a:lnRef>
       <a:fillRef idx="1">
         <a:scrgbClr r="0" g="0" b="0"/>
       </a:fillRef>
-      <a:effectRef idx="0">
+      <a:effectRef idx="1">
         <a:scrgbClr r="0" g="0" b="0"/>
       </a:effectRef>
       <a:fontRef idx="minor"/>
@@ -10772,7 +11300,7 @@
       <a:fillRef idx="1">
         <a:scrgbClr r="0" g="0" b="0"/>
       </a:fillRef>
-      <a:effectRef idx="0">
+      <a:effectRef idx="1">
         <a:scrgbClr r="0" g="0" b="0"/>
       </a:effectRef>
       <a:fontRef idx="minor">
@@ -10794,7 +11322,7 @@
       <a:fillRef idx="1">
         <a:scrgbClr r="0" g="0" b="0"/>
       </a:fillRef>
-      <a:effectRef idx="0">
+      <a:effectRef idx="1">
         <a:scrgbClr r="0" g="0" b="0"/>
       </a:effectRef>
       <a:fontRef idx="minor">
@@ -10816,7 +11344,7 @@
       <a:fillRef idx="1">
         <a:scrgbClr r="0" g="0" b="0"/>
       </a:fillRef>
-      <a:effectRef idx="0">
+      <a:effectRef idx="1">
         <a:scrgbClr r="0" g="0" b="0"/>
       </a:effectRef>
       <a:fontRef idx="minor">
@@ -10858,7 +11386,7 @@
       <a:fillRef idx="1">
         <a:scrgbClr r="0" g="0" b="0"/>
       </a:fillRef>
-      <a:effectRef idx="0">
+      <a:effectRef idx="1">
         <a:scrgbClr r="0" g="0" b="0"/>
       </a:effectRef>
       <a:fontRef idx="minor"/>
@@ -10872,13 +11400,13 @@
     <dgm:sp3d/>
     <dgm:txPr/>
     <dgm:style>
-      <a:lnRef idx="2">
+      <a:lnRef idx="3">
         <a:scrgbClr r="0" g="0" b="0"/>
       </a:lnRef>
       <a:fillRef idx="1">
         <a:scrgbClr r="0" g="0" b="0"/>
       </a:fillRef>
-      <a:effectRef idx="0">
+      <a:effectRef idx="1">
         <a:scrgbClr r="0" g="0" b="0"/>
       </a:effectRef>
       <a:fontRef idx="minor">
@@ -10894,13 +11422,13 @@
     <dgm:sp3d/>
     <dgm:txPr/>
     <dgm:style>
-      <a:lnRef idx="2">
+      <a:lnRef idx="3">
         <a:scrgbClr r="0" g="0" b="0"/>
       </a:lnRef>
       <a:fillRef idx="1">
         <a:scrgbClr r="0" g="0" b="0"/>
       </a:fillRef>
-      <a:effectRef idx="0">
+      <a:effectRef idx="1">
         <a:scrgbClr r="0" g="0" b="0"/>
       </a:effectRef>
       <a:fontRef idx="minor">
@@ -10916,13 +11444,13 @@
     <dgm:sp3d/>
     <dgm:txPr/>
     <dgm:style>
-      <a:lnRef idx="2">
+      <a:lnRef idx="3">
         <a:scrgbClr r="0" g="0" b="0"/>
       </a:lnRef>
       <a:fillRef idx="1">
         <a:scrgbClr r="0" g="0" b="0"/>
       </a:fillRef>
-      <a:effectRef idx="0">
+      <a:effectRef idx="1">
         <a:scrgbClr r="0" g="0" b="0"/>
       </a:effectRef>
       <a:fontRef idx="minor">
@@ -10938,13 +11466,13 @@
     <dgm:sp3d/>
     <dgm:txPr/>
     <dgm:style>
-      <a:lnRef idx="2">
+      <a:lnRef idx="3">
         <a:scrgbClr r="0" g="0" b="0"/>
       </a:lnRef>
       <a:fillRef idx="1">
         <a:scrgbClr r="0" g="0" b="0"/>
       </a:fillRef>
-      <a:effectRef idx="0">
+      <a:effectRef idx="1">
         <a:scrgbClr r="0" g="0" b="0"/>
       </a:effectRef>
       <a:fontRef idx="minor">
@@ -10960,13 +11488,13 @@
     <dgm:sp3d/>
     <dgm:txPr/>
     <dgm:style>
-      <a:lnRef idx="2">
+      <a:lnRef idx="3">
         <a:scrgbClr r="0" g="0" b="0"/>
       </a:lnRef>
       <a:fillRef idx="1">
         <a:scrgbClr r="0" g="0" b="0"/>
       </a:fillRef>
-      <a:effectRef idx="0">
+      <a:effectRef idx="1">
         <a:scrgbClr r="0" g="0" b="0"/>
       </a:effectRef>
       <a:fontRef idx="minor">
@@ -10982,13 +11510,13 @@
     <dgm:sp3d/>
     <dgm:txPr/>
     <dgm:style>
-      <a:lnRef idx="2">
+      <a:lnRef idx="3">
         <a:scrgbClr r="0" g="0" b="0"/>
       </a:lnRef>
       <a:fillRef idx="1">
         <a:scrgbClr r="0" g="0" b="0"/>
       </a:fillRef>
-      <a:effectRef idx="0">
+      <a:effectRef idx="1">
         <a:scrgbClr r="0" g="0" b="0"/>
       </a:effectRef>
       <a:fontRef idx="minor">
@@ -11004,13 +11532,13 @@
     <dgm:sp3d/>
     <dgm:txPr/>
     <dgm:style>
-      <a:lnRef idx="2">
+      <a:lnRef idx="3">
         <a:scrgbClr r="0" g="0" b="0"/>
       </a:lnRef>
       <a:fillRef idx="1">
         <a:scrgbClr r="0" g="0" b="0"/>
       </a:fillRef>
-      <a:effectRef idx="0">
+      <a:effectRef idx="1">
         <a:scrgbClr r="0" g="0" b="0"/>
       </a:effectRef>
       <a:fontRef idx="minor">
@@ -11026,13 +11554,13 @@
     <dgm:sp3d/>
     <dgm:txPr/>
     <dgm:style>
-      <a:lnRef idx="2">
+      <a:lnRef idx="3">
         <a:scrgbClr r="0" g="0" b="0"/>
       </a:lnRef>
       <a:fillRef idx="1">
         <a:scrgbClr r="0" g="0" b="0"/>
       </a:fillRef>
-      <a:effectRef idx="0">
+      <a:effectRef idx="1">
         <a:scrgbClr r="0" g="0" b="0"/>
       </a:effectRef>
       <a:fontRef idx="minor">
@@ -11048,13 +11576,13 @@
     <dgm:sp3d/>
     <dgm:txPr/>
     <dgm:style>
-      <a:lnRef idx="2">
+      <a:lnRef idx="3">
         <a:scrgbClr r="0" g="0" b="0"/>
       </a:lnRef>
       <a:fillRef idx="1">
         <a:scrgbClr r="0" g="0" b="0"/>
       </a:fillRef>
-      <a:effectRef idx="0">
+      <a:effectRef idx="1">
         <a:scrgbClr r="0" g="0" b="0"/>
       </a:effectRef>
       <a:fontRef idx="minor">
@@ -11510,13 +12038,13 @@
     <dgm:sp3d/>
     <dgm:txPr/>
     <dgm:style>
-      <a:lnRef idx="2">
+      <a:lnRef idx="3">
         <a:scrgbClr r="0" g="0" b="0"/>
       </a:lnRef>
       <a:fillRef idx="1">
         <a:scrgbClr r="0" g="0" b="0"/>
       </a:fillRef>
-      <a:effectRef idx="0">
+      <a:effectRef idx="1">
         <a:scrgbClr r="0" g="0" b="0"/>
       </a:effectRef>
       <a:fontRef idx="minor"/>
@@ -11692,7 +12220,7 @@
           <a:p>
             <a:fld id="{EEEA44A8-A57A-4AA4-A777-3A2AF2BB8C74}" type="datetimeFigureOut">
               <a:rPr lang="en-US" smtClean="0"/>
-              <a:t>5/21/2020</a:t>
+              <a:t>5/22/2020</a:t>
             </a:fld>
             <a:endParaRPr lang="en-US"/>
           </a:p>
@@ -11890,7 +12418,7 @@
           <a:p>
             <a:fld id="{EEEA44A8-A57A-4AA4-A777-3A2AF2BB8C74}" type="datetimeFigureOut">
               <a:rPr lang="en-US" smtClean="0"/>
-              <a:t>5/21/2020</a:t>
+              <a:t>5/22/2020</a:t>
             </a:fld>
             <a:endParaRPr lang="en-US"/>
           </a:p>
@@ -12098,7 +12626,7 @@
           <a:p>
             <a:fld id="{EEEA44A8-A57A-4AA4-A777-3A2AF2BB8C74}" type="datetimeFigureOut">
               <a:rPr lang="en-US" smtClean="0"/>
-              <a:t>5/21/2020</a:t>
+              <a:t>5/22/2020</a:t>
             </a:fld>
             <a:endParaRPr lang="en-US"/>
           </a:p>
@@ -12296,7 +12824,7 @@
           <a:p>
             <a:fld id="{EEEA44A8-A57A-4AA4-A777-3A2AF2BB8C74}" type="datetimeFigureOut">
               <a:rPr lang="en-US" smtClean="0"/>
-              <a:t>5/21/2020</a:t>
+              <a:t>5/22/2020</a:t>
             </a:fld>
             <a:endParaRPr lang="en-US"/>
           </a:p>
@@ -12571,7 +13099,7 @@
           <a:p>
             <a:fld id="{EEEA44A8-A57A-4AA4-A777-3A2AF2BB8C74}" type="datetimeFigureOut">
               <a:rPr lang="en-US" smtClean="0"/>
-              <a:t>5/21/2020</a:t>
+              <a:t>5/22/2020</a:t>
             </a:fld>
             <a:endParaRPr lang="en-US"/>
           </a:p>
@@ -12836,7 +13364,7 @@
           <a:p>
             <a:fld id="{EEEA44A8-A57A-4AA4-A777-3A2AF2BB8C74}" type="datetimeFigureOut">
               <a:rPr lang="en-US" smtClean="0"/>
-              <a:t>5/21/2020</a:t>
+              <a:t>5/22/2020</a:t>
             </a:fld>
             <a:endParaRPr lang="en-US"/>
           </a:p>
@@ -13248,7 +13776,7 @@
           <a:p>
             <a:fld id="{EEEA44A8-A57A-4AA4-A777-3A2AF2BB8C74}" type="datetimeFigureOut">
               <a:rPr lang="en-US" smtClean="0"/>
-              <a:t>5/21/2020</a:t>
+              <a:t>5/22/2020</a:t>
             </a:fld>
             <a:endParaRPr lang="en-US"/>
           </a:p>
@@ -13389,7 +13917,7 @@
           <a:p>
             <a:fld id="{EEEA44A8-A57A-4AA4-A777-3A2AF2BB8C74}" type="datetimeFigureOut">
               <a:rPr lang="en-US" smtClean="0"/>
-              <a:t>5/21/2020</a:t>
+              <a:t>5/22/2020</a:t>
             </a:fld>
             <a:endParaRPr lang="en-US"/>
           </a:p>
@@ -13502,7 +14030,7 @@
           <a:p>
             <a:fld id="{EEEA44A8-A57A-4AA4-A777-3A2AF2BB8C74}" type="datetimeFigureOut">
               <a:rPr lang="en-US" smtClean="0"/>
-              <a:t>5/21/2020</a:t>
+              <a:t>5/22/2020</a:t>
             </a:fld>
             <a:endParaRPr lang="en-US"/>
           </a:p>
@@ -13813,7 +14341,7 @@
           <a:p>
             <a:fld id="{EEEA44A8-A57A-4AA4-A777-3A2AF2BB8C74}" type="datetimeFigureOut">
               <a:rPr lang="en-US" smtClean="0"/>
-              <a:t>5/21/2020</a:t>
+              <a:t>5/22/2020</a:t>
             </a:fld>
             <a:endParaRPr lang="en-US"/>
           </a:p>
@@ -14101,7 +14629,7 @@
           <a:p>
             <a:fld id="{EEEA44A8-A57A-4AA4-A777-3A2AF2BB8C74}" type="datetimeFigureOut">
               <a:rPr lang="en-US" smtClean="0"/>
-              <a:t>5/21/2020</a:t>
+              <a:t>5/22/2020</a:t>
             </a:fld>
             <a:endParaRPr lang="en-US"/>
           </a:p>
@@ -14342,7 +14870,7 @@
           <a:p>
             <a:fld id="{EEEA44A8-A57A-4AA4-A777-3A2AF2BB8C74}" type="datetimeFigureOut">
               <a:rPr lang="en-US" smtClean="0"/>
-              <a:t>5/21/2020</a:t>
+              <a:t>5/22/2020</a:t>
             </a:fld>
             <a:endParaRPr lang="en-US"/>
           </a:p>
@@ -16843,7 +17371,7 @@
             <p:ph idx="1"/>
             <p:extLst>
               <p:ext uri="{D42A27DB-BD31-4B8C-83A1-F6EECF244321}">
-                <p14:modId xmlns:p14="http://schemas.microsoft.com/office/powerpoint/2010/main" val="599762273"/>
+                <p14:modId xmlns:p14="http://schemas.microsoft.com/office/powerpoint/2010/main" val="1928301424"/>
               </p:ext>
             </p:extLst>
           </p:nvPr>
@@ -22987,6 +23515,1444 @@
 </p:sld>
 </file>
 
+<file path=ppt/slides/slide8.xml><?xml version="1.0" encoding="utf-8"?>
+<p:sld xmlns:a="http://schemas.openxmlformats.org/drawingml/2006/main" xmlns:r="http://schemas.openxmlformats.org/officeDocument/2006/relationships" xmlns:p="http://schemas.openxmlformats.org/presentationml/2006/main">
+  <p:cSld>
+    <p:bg>
+      <p:bgPr>
+        <a:solidFill>
+          <a:schemeClr val="bg1"/>
+        </a:solidFill>
+        <a:effectLst/>
+      </p:bgPr>
+    </p:bg>
+    <p:spTree>
+      <p:nvGrpSpPr>
+        <p:cNvPr id="1" name=""/>
+        <p:cNvGrpSpPr/>
+        <p:nvPr/>
+      </p:nvGrpSpPr>
+      <p:grpSpPr>
+        <a:xfrm>
+          <a:off x="0" y="0"/>
+          <a:ext cx="0" cy="0"/>
+          <a:chOff x="0" y="0"/>
+          <a:chExt cx="0" cy="0"/>
+        </a:xfrm>
+      </p:grpSpPr>
+      <p:sp>
+        <p:nvSpPr>
+          <p:cNvPr id="18" name="Freeform: Shape 15">
+            <a:extLst>
+              <a:ext uri="{FF2B5EF4-FFF2-40B4-BE49-F238E27FC236}">
+                <a16:creationId xmlns:a16="http://schemas.microsoft.com/office/drawing/2014/main" id="{46C2E80F-49A6-4372-B103-219D417A55ED}"/>
+              </a:ext>
+              <a:ext uri="{C183D7F6-B498-43B3-948B-1728B52AA6E4}">
+                <adec:decorative xmlns:adec="http://schemas.microsoft.com/office/drawing/2017/decorative" val="1"/>
+              </a:ext>
+            </a:extLst>
+          </p:cNvPr>
+          <p:cNvSpPr>
+            <a:spLocks noGrp="1" noRot="1" noChangeAspect="1" noMove="1" noResize="1" noEditPoints="1" noAdjustHandles="1" noChangeArrowheads="1" noChangeShapeType="1" noTextEdit="1"/>
+          </p:cNvSpPr>
+          <p:nvPr>
+            <p:extLst>
+              <p:ext uri="{386F3935-93C4-4BCD-93E2-E3B085C9AB24}">
+                <p16:designElem xmlns:p16="http://schemas.microsoft.com/office/powerpoint/2015/main" val="1"/>
+              </p:ext>
+            </p:extLst>
+          </p:nvPr>
+        </p:nvSpPr>
+        <p:spPr>
+          <a:xfrm>
+            <a:off x="484096" y="470925"/>
+            <a:ext cx="4381009" cy="5892104"/>
+          </a:xfrm>
+          <a:custGeom>
+            <a:avLst/>
+            <a:gdLst>
+              <a:gd name="connsiteX0" fmla="*/ 0 w 4381009"/>
+              <a:gd name="connsiteY0" fmla="*/ 0 h 5892104"/>
+              <a:gd name="connsiteX1" fmla="*/ 4157628 w 4381009"/>
+              <a:gd name="connsiteY1" fmla="*/ 0 h 5892104"/>
+              <a:gd name="connsiteX2" fmla="*/ 4169302 w 4381009"/>
+              <a:gd name="connsiteY2" fmla="*/ 68659 h 5892104"/>
+              <a:gd name="connsiteX3" fmla="*/ 4191571 w 4381009"/>
+              <a:gd name="connsiteY3" fmla="*/ 205472 h 5892104"/>
+              <a:gd name="connsiteX4" fmla="*/ 4213368 w 4381009"/>
+              <a:gd name="connsiteY4" fmla="*/ 342890 h 5892104"/>
+              <a:gd name="connsiteX5" fmla="*/ 4232030 w 4381009"/>
+              <a:gd name="connsiteY5" fmla="*/ 480913 h 5892104"/>
+              <a:gd name="connsiteX6" fmla="*/ 4250848 w 4381009"/>
+              <a:gd name="connsiteY6" fmla="*/ 618332 h 5892104"/>
+              <a:gd name="connsiteX7" fmla="*/ 4268412 w 4381009"/>
+              <a:gd name="connsiteY7" fmla="*/ 756355 h 5892104"/>
+              <a:gd name="connsiteX8" fmla="*/ 4283467 w 4381009"/>
+              <a:gd name="connsiteY8" fmla="*/ 892563 h 5892104"/>
+              <a:gd name="connsiteX9" fmla="*/ 4297737 w 4381009"/>
+              <a:gd name="connsiteY9" fmla="*/ 1030587 h 5892104"/>
+              <a:gd name="connsiteX10" fmla="*/ 4310754 w 4381009"/>
+              <a:gd name="connsiteY10" fmla="*/ 1168005 h 5892104"/>
+              <a:gd name="connsiteX11" fmla="*/ 4322045 w 4381009"/>
+              <a:gd name="connsiteY11" fmla="*/ 1303002 h 5892104"/>
+              <a:gd name="connsiteX12" fmla="*/ 4333336 w 4381009"/>
+              <a:gd name="connsiteY12" fmla="*/ 1439815 h 5892104"/>
+              <a:gd name="connsiteX13" fmla="*/ 4342745 w 4381009"/>
+              <a:gd name="connsiteY13" fmla="*/ 1574812 h 5892104"/>
+              <a:gd name="connsiteX14" fmla="*/ 4350115 w 4381009"/>
+              <a:gd name="connsiteY14" fmla="*/ 1709808 h 5892104"/>
+              <a:gd name="connsiteX15" fmla="*/ 4357799 w 4381009"/>
+              <a:gd name="connsiteY15" fmla="*/ 1844200 h 5892104"/>
+              <a:gd name="connsiteX16" fmla="*/ 4364229 w 4381009"/>
+              <a:gd name="connsiteY16" fmla="*/ 1977381 h 5892104"/>
+              <a:gd name="connsiteX17" fmla="*/ 4368777 w 4381009"/>
+              <a:gd name="connsiteY17" fmla="*/ 2109351 h 5892104"/>
+              <a:gd name="connsiteX18" fmla="*/ 4372697 w 4381009"/>
+              <a:gd name="connsiteY18" fmla="*/ 2241321 h 5892104"/>
+              <a:gd name="connsiteX19" fmla="*/ 4376461 w 4381009"/>
+              <a:gd name="connsiteY19" fmla="*/ 2372080 h 5892104"/>
+              <a:gd name="connsiteX20" fmla="*/ 4378186 w 4381009"/>
+              <a:gd name="connsiteY20" fmla="*/ 2501023 h 5892104"/>
+              <a:gd name="connsiteX21" fmla="*/ 4380068 w 4381009"/>
+              <a:gd name="connsiteY21" fmla="*/ 2629966 h 5892104"/>
+              <a:gd name="connsiteX22" fmla="*/ 4381009 w 4381009"/>
+              <a:gd name="connsiteY22" fmla="*/ 2757093 h 5892104"/>
+              <a:gd name="connsiteX23" fmla="*/ 4380068 w 4381009"/>
+              <a:gd name="connsiteY23" fmla="*/ 2883010 h 5892104"/>
+              <a:gd name="connsiteX24" fmla="*/ 4380068 w 4381009"/>
+              <a:gd name="connsiteY24" fmla="*/ 3007715 h 5892104"/>
+              <a:gd name="connsiteX25" fmla="*/ 4378186 w 4381009"/>
+              <a:gd name="connsiteY25" fmla="*/ 3131210 h 5892104"/>
+              <a:gd name="connsiteX26" fmla="*/ 4375363 w 4381009"/>
+              <a:gd name="connsiteY26" fmla="*/ 3252283 h 5892104"/>
+              <a:gd name="connsiteX27" fmla="*/ 4372697 w 4381009"/>
+              <a:gd name="connsiteY27" fmla="*/ 3372146 h 5892104"/>
+              <a:gd name="connsiteX28" fmla="*/ 4369718 w 4381009"/>
+              <a:gd name="connsiteY28" fmla="*/ 3489587 h 5892104"/>
+              <a:gd name="connsiteX29" fmla="*/ 4365170 w 4381009"/>
+              <a:gd name="connsiteY29" fmla="*/ 3606423 h 5892104"/>
+              <a:gd name="connsiteX30" fmla="*/ 4360309 w 4381009"/>
+              <a:gd name="connsiteY30" fmla="*/ 3721443 h 5892104"/>
+              <a:gd name="connsiteX31" fmla="*/ 4355918 w 4381009"/>
+              <a:gd name="connsiteY31" fmla="*/ 3834041 h 5892104"/>
+              <a:gd name="connsiteX32" fmla="*/ 4343529 w 4381009"/>
+              <a:gd name="connsiteY32" fmla="*/ 4053789 h 5892104"/>
+              <a:gd name="connsiteX33" fmla="*/ 4330356 w 4381009"/>
+              <a:gd name="connsiteY33" fmla="*/ 4264457 h 5892104"/>
+              <a:gd name="connsiteX34" fmla="*/ 4316556 w 4381009"/>
+              <a:gd name="connsiteY34" fmla="*/ 4466650 h 5892104"/>
+              <a:gd name="connsiteX35" fmla="*/ 4301344 w 4381009"/>
+              <a:gd name="connsiteY35" fmla="*/ 4657946 h 5892104"/>
+              <a:gd name="connsiteX36" fmla="*/ 4285506 w 4381009"/>
+              <a:gd name="connsiteY36" fmla="*/ 4840767 h 5892104"/>
+              <a:gd name="connsiteX37" fmla="*/ 4268412 w 4381009"/>
+              <a:gd name="connsiteY37" fmla="*/ 5010269 h 5892104"/>
+              <a:gd name="connsiteX38" fmla="*/ 4251633 w 4381009"/>
+              <a:gd name="connsiteY38" fmla="*/ 5169481 h 5892104"/>
+              <a:gd name="connsiteX39" fmla="*/ 4234853 w 4381009"/>
+              <a:gd name="connsiteY39" fmla="*/ 5315980 h 5892104"/>
+              <a:gd name="connsiteX40" fmla="*/ 4219014 w 4381009"/>
+              <a:gd name="connsiteY40" fmla="*/ 5450371 h 5892104"/>
+              <a:gd name="connsiteX41" fmla="*/ 4203959 w 4381009"/>
+              <a:gd name="connsiteY41" fmla="*/ 5569628 h 5892104"/>
+              <a:gd name="connsiteX42" fmla="*/ 4189689 w 4381009"/>
+              <a:gd name="connsiteY42" fmla="*/ 5677384 h 5892104"/>
+              <a:gd name="connsiteX43" fmla="*/ 4177770 w 4381009"/>
+              <a:gd name="connsiteY43" fmla="*/ 5768189 h 5892104"/>
+              <a:gd name="connsiteX44" fmla="*/ 4166479 w 4381009"/>
+              <a:gd name="connsiteY44" fmla="*/ 5844465 h 5892104"/>
+              <a:gd name="connsiteX45" fmla="*/ 4159132 w 4381009"/>
+              <a:gd name="connsiteY45" fmla="*/ 5892104 h 5892104"/>
+              <a:gd name="connsiteX46" fmla="*/ 0 w 4381009"/>
+              <a:gd name="connsiteY46" fmla="*/ 5892104 h 5892104"/>
+            </a:gdLst>
+            <a:ahLst/>
+            <a:cxnLst>
+              <a:cxn ang="0">
+                <a:pos x="connsiteX0" y="connsiteY0"/>
+              </a:cxn>
+              <a:cxn ang="0">
+                <a:pos x="connsiteX1" y="connsiteY1"/>
+              </a:cxn>
+              <a:cxn ang="0">
+                <a:pos x="connsiteX2" y="connsiteY2"/>
+              </a:cxn>
+              <a:cxn ang="0">
+                <a:pos x="connsiteX3" y="connsiteY3"/>
+              </a:cxn>
+              <a:cxn ang="0">
+                <a:pos x="connsiteX4" y="connsiteY4"/>
+              </a:cxn>
+              <a:cxn ang="0">
+                <a:pos x="connsiteX5" y="connsiteY5"/>
+              </a:cxn>
+              <a:cxn ang="0">
+                <a:pos x="connsiteX6" y="connsiteY6"/>
+              </a:cxn>
+              <a:cxn ang="0">
+                <a:pos x="connsiteX7" y="connsiteY7"/>
+              </a:cxn>
+              <a:cxn ang="0">
+                <a:pos x="connsiteX8" y="connsiteY8"/>
+              </a:cxn>
+              <a:cxn ang="0">
+                <a:pos x="connsiteX9" y="connsiteY9"/>
+              </a:cxn>
+              <a:cxn ang="0">
+                <a:pos x="connsiteX10" y="connsiteY10"/>
+              </a:cxn>
+              <a:cxn ang="0">
+                <a:pos x="connsiteX11" y="connsiteY11"/>
+              </a:cxn>
+              <a:cxn ang="0">
+                <a:pos x="connsiteX12" y="connsiteY12"/>
+              </a:cxn>
+              <a:cxn ang="0">
+                <a:pos x="connsiteX13" y="connsiteY13"/>
+              </a:cxn>
+              <a:cxn ang="0">
+                <a:pos x="connsiteX14" y="connsiteY14"/>
+              </a:cxn>
+              <a:cxn ang="0">
+                <a:pos x="connsiteX15" y="connsiteY15"/>
+              </a:cxn>
+              <a:cxn ang="0">
+                <a:pos x="connsiteX16" y="connsiteY16"/>
+              </a:cxn>
+              <a:cxn ang="0">
+                <a:pos x="connsiteX17" y="connsiteY17"/>
+              </a:cxn>
+              <a:cxn ang="0">
+                <a:pos x="connsiteX18" y="connsiteY18"/>
+              </a:cxn>
+              <a:cxn ang="0">
+                <a:pos x="connsiteX19" y="connsiteY19"/>
+              </a:cxn>
+              <a:cxn ang="0">
+                <a:pos x="connsiteX20" y="connsiteY20"/>
+              </a:cxn>
+              <a:cxn ang="0">
+                <a:pos x="connsiteX21" y="connsiteY21"/>
+              </a:cxn>
+              <a:cxn ang="0">
+                <a:pos x="connsiteX22" y="connsiteY22"/>
+              </a:cxn>
+              <a:cxn ang="0">
+                <a:pos x="connsiteX23" y="connsiteY23"/>
+              </a:cxn>
+              <a:cxn ang="0">
+                <a:pos x="connsiteX24" y="connsiteY24"/>
+              </a:cxn>
+              <a:cxn ang="0">
+                <a:pos x="connsiteX25" y="connsiteY25"/>
+              </a:cxn>
+              <a:cxn ang="0">
+                <a:pos x="connsiteX26" y="connsiteY26"/>
+              </a:cxn>
+              <a:cxn ang="0">
+                <a:pos x="connsiteX27" y="connsiteY27"/>
+              </a:cxn>
+              <a:cxn ang="0">
+                <a:pos x="connsiteX28" y="connsiteY28"/>
+              </a:cxn>
+              <a:cxn ang="0">
+                <a:pos x="connsiteX29" y="connsiteY29"/>
+              </a:cxn>
+              <a:cxn ang="0">
+                <a:pos x="connsiteX30" y="connsiteY30"/>
+              </a:cxn>
+              <a:cxn ang="0">
+                <a:pos x="connsiteX31" y="connsiteY31"/>
+              </a:cxn>
+              <a:cxn ang="0">
+                <a:pos x="connsiteX32" y="connsiteY32"/>
+              </a:cxn>
+              <a:cxn ang="0">
+                <a:pos x="connsiteX33" y="connsiteY33"/>
+              </a:cxn>
+              <a:cxn ang="0">
+                <a:pos x="connsiteX34" y="connsiteY34"/>
+              </a:cxn>
+              <a:cxn ang="0">
+                <a:pos x="connsiteX35" y="connsiteY35"/>
+              </a:cxn>
+              <a:cxn ang="0">
+                <a:pos x="connsiteX36" y="connsiteY36"/>
+              </a:cxn>
+              <a:cxn ang="0">
+                <a:pos x="connsiteX37" y="connsiteY37"/>
+              </a:cxn>
+              <a:cxn ang="0">
+                <a:pos x="connsiteX38" y="connsiteY38"/>
+              </a:cxn>
+              <a:cxn ang="0">
+                <a:pos x="connsiteX39" y="connsiteY39"/>
+              </a:cxn>
+              <a:cxn ang="0">
+                <a:pos x="connsiteX40" y="connsiteY40"/>
+              </a:cxn>
+              <a:cxn ang="0">
+                <a:pos x="connsiteX41" y="connsiteY41"/>
+              </a:cxn>
+              <a:cxn ang="0">
+                <a:pos x="connsiteX42" y="connsiteY42"/>
+              </a:cxn>
+              <a:cxn ang="0">
+                <a:pos x="connsiteX43" y="connsiteY43"/>
+              </a:cxn>
+              <a:cxn ang="0">
+                <a:pos x="connsiteX44" y="connsiteY44"/>
+              </a:cxn>
+              <a:cxn ang="0">
+                <a:pos x="connsiteX45" y="connsiteY45"/>
+              </a:cxn>
+              <a:cxn ang="0">
+                <a:pos x="connsiteX46" y="connsiteY46"/>
+              </a:cxn>
+            </a:cxnLst>
+            <a:rect l="l" t="t" r="r" b="b"/>
+            <a:pathLst>
+              <a:path w="4381009" h="5892104">
+                <a:moveTo>
+                  <a:pt x="0" y="0"/>
+                </a:moveTo>
+                <a:lnTo>
+                  <a:pt x="4157628" y="0"/>
+                </a:lnTo>
+                <a:lnTo>
+                  <a:pt x="4169302" y="68659"/>
+                </a:lnTo>
+                <a:lnTo>
+                  <a:pt x="4191571" y="205472"/>
+                </a:lnTo>
+                <a:lnTo>
+                  <a:pt x="4213368" y="342890"/>
+                </a:lnTo>
+                <a:lnTo>
+                  <a:pt x="4232030" y="480913"/>
+                </a:lnTo>
+                <a:lnTo>
+                  <a:pt x="4250848" y="618332"/>
+                </a:lnTo>
+                <a:lnTo>
+                  <a:pt x="4268412" y="756355"/>
+                </a:lnTo>
+                <a:lnTo>
+                  <a:pt x="4283467" y="892563"/>
+                </a:lnTo>
+                <a:lnTo>
+                  <a:pt x="4297737" y="1030587"/>
+                </a:lnTo>
+                <a:lnTo>
+                  <a:pt x="4310754" y="1168005"/>
+                </a:lnTo>
+                <a:lnTo>
+                  <a:pt x="4322045" y="1303002"/>
+                </a:lnTo>
+                <a:lnTo>
+                  <a:pt x="4333336" y="1439815"/>
+                </a:lnTo>
+                <a:lnTo>
+                  <a:pt x="4342745" y="1574812"/>
+                </a:lnTo>
+                <a:lnTo>
+                  <a:pt x="4350115" y="1709808"/>
+                </a:lnTo>
+                <a:lnTo>
+                  <a:pt x="4357799" y="1844200"/>
+                </a:lnTo>
+                <a:lnTo>
+                  <a:pt x="4364229" y="1977381"/>
+                </a:lnTo>
+                <a:lnTo>
+                  <a:pt x="4368777" y="2109351"/>
+                </a:lnTo>
+                <a:lnTo>
+                  <a:pt x="4372697" y="2241321"/>
+                </a:lnTo>
+                <a:lnTo>
+                  <a:pt x="4376461" y="2372080"/>
+                </a:lnTo>
+                <a:lnTo>
+                  <a:pt x="4378186" y="2501023"/>
+                </a:lnTo>
+                <a:lnTo>
+                  <a:pt x="4380068" y="2629966"/>
+                </a:lnTo>
+                <a:lnTo>
+                  <a:pt x="4381009" y="2757093"/>
+                </a:lnTo>
+                <a:lnTo>
+                  <a:pt x="4380068" y="2883010"/>
+                </a:lnTo>
+                <a:lnTo>
+                  <a:pt x="4380068" y="3007715"/>
+                </a:lnTo>
+                <a:lnTo>
+                  <a:pt x="4378186" y="3131210"/>
+                </a:lnTo>
+                <a:lnTo>
+                  <a:pt x="4375363" y="3252283"/>
+                </a:lnTo>
+                <a:lnTo>
+                  <a:pt x="4372697" y="3372146"/>
+                </a:lnTo>
+                <a:lnTo>
+                  <a:pt x="4369718" y="3489587"/>
+                </a:lnTo>
+                <a:lnTo>
+                  <a:pt x="4365170" y="3606423"/>
+                </a:lnTo>
+                <a:lnTo>
+                  <a:pt x="4360309" y="3721443"/>
+                </a:lnTo>
+                <a:lnTo>
+                  <a:pt x="4355918" y="3834041"/>
+                </a:lnTo>
+                <a:lnTo>
+                  <a:pt x="4343529" y="4053789"/>
+                </a:lnTo>
+                <a:lnTo>
+                  <a:pt x="4330356" y="4264457"/>
+                </a:lnTo>
+                <a:lnTo>
+                  <a:pt x="4316556" y="4466650"/>
+                </a:lnTo>
+                <a:lnTo>
+                  <a:pt x="4301344" y="4657946"/>
+                </a:lnTo>
+                <a:lnTo>
+                  <a:pt x="4285506" y="4840767"/>
+                </a:lnTo>
+                <a:lnTo>
+                  <a:pt x="4268412" y="5010269"/>
+                </a:lnTo>
+                <a:lnTo>
+                  <a:pt x="4251633" y="5169481"/>
+                </a:lnTo>
+                <a:lnTo>
+                  <a:pt x="4234853" y="5315980"/>
+                </a:lnTo>
+                <a:lnTo>
+                  <a:pt x="4219014" y="5450371"/>
+                </a:lnTo>
+                <a:lnTo>
+                  <a:pt x="4203959" y="5569628"/>
+                </a:lnTo>
+                <a:lnTo>
+                  <a:pt x="4189689" y="5677384"/>
+                </a:lnTo>
+                <a:lnTo>
+                  <a:pt x="4177770" y="5768189"/>
+                </a:lnTo>
+                <a:lnTo>
+                  <a:pt x="4166479" y="5844465"/>
+                </a:lnTo>
+                <a:lnTo>
+                  <a:pt x="4159132" y="5892104"/>
+                </a:lnTo>
+                <a:lnTo>
+                  <a:pt x="0" y="5892104"/>
+                </a:lnTo>
+                <a:close/>
+              </a:path>
+            </a:pathLst>
+          </a:custGeom>
+          <a:solidFill>
+            <a:srgbClr val="404040"/>
+          </a:solidFill>
+          <a:ln>
+            <a:noFill/>
+          </a:ln>
+        </p:spPr>
+        <p:style>
+          <a:lnRef idx="2">
+            <a:schemeClr val="accent1">
+              <a:shade val="50000"/>
+            </a:schemeClr>
+          </a:lnRef>
+          <a:fillRef idx="1">
+            <a:schemeClr val="accent1"/>
+          </a:fillRef>
+          <a:effectRef idx="0">
+            <a:schemeClr val="accent1"/>
+          </a:effectRef>
+          <a:fontRef idx="minor">
+            <a:schemeClr val="lt1"/>
+          </a:fontRef>
+        </p:style>
+        <p:txBody>
+          <a:bodyPr wrap="square" rtlCol="0" anchor="ctr">
+            <a:noAutofit/>
+          </a:bodyPr>
+          <a:lstStyle/>
+          <a:p>
+            <a:pPr marL="0" marR="0" lvl="0" indent="0" algn="ctr" defTabSz="457200" rtl="0" eaLnBrk="1" fontAlgn="auto" latinLnBrk="0" hangingPunct="1">
+              <a:lnSpc>
+                <a:spcPct val="100000"/>
+              </a:lnSpc>
+              <a:spcBef>
+                <a:spcPts val="0"/>
+              </a:spcBef>
+              <a:spcAft>
+                <a:spcPts val="0"/>
+              </a:spcAft>
+              <a:buClrTx/>
+              <a:buSzTx/>
+              <a:buFontTx/>
+              <a:buNone/>
+              <a:tabLst/>
+              <a:defRPr/>
+            </a:pPr>
+            <a:endParaRPr kumimoji="0" lang="en-US" sz="1800" b="0" i="0" u="none" strike="noStrike" kern="1200" cap="none" spc="0" normalizeH="0" baseline="0" noProof="0">
+              <a:ln>
+                <a:noFill/>
+              </a:ln>
+              <a:solidFill>
+                <a:prstClr val="white"/>
+              </a:solidFill>
+              <a:effectLst/>
+              <a:uLnTx/>
+              <a:uFillTx/>
+              <a:latin typeface="Calibri" panose="020F0502020204030204"/>
+              <a:ea typeface="+mn-ea"/>
+              <a:cs typeface="+mn-cs"/>
+            </a:endParaRPr>
+          </a:p>
+        </p:txBody>
+      </p:sp>
+      <p:sp>
+        <p:nvSpPr>
+          <p:cNvPr id="2" name="Title 1">
+            <a:extLst>
+              <a:ext uri="{FF2B5EF4-FFF2-40B4-BE49-F238E27FC236}">
+                <a16:creationId xmlns:a16="http://schemas.microsoft.com/office/drawing/2014/main" id="{9BD9ED5B-7300-499A-BBF6-AE5D925DB064}"/>
+              </a:ext>
+            </a:extLst>
+          </p:cNvPr>
+          <p:cNvSpPr>
+            <a:spLocks noGrp="1"/>
+          </p:cNvSpPr>
+          <p:nvPr>
+            <p:ph type="title"/>
+          </p:nvPr>
+        </p:nvSpPr>
+        <p:spPr>
+          <a:xfrm>
+            <a:off x="863029" y="1012004"/>
+            <a:ext cx="3416158" cy="4795408"/>
+          </a:xfrm>
+        </p:spPr>
+        <p:txBody>
+          <a:bodyPr>
+            <a:normAutofit/>
+          </a:bodyPr>
+          <a:lstStyle/>
+          <a:p>
+            <a:r>
+              <a:rPr lang="en-US" sz="3200" dirty="0">
+                <a:solidFill>
+                  <a:srgbClr val="FFFFFF"/>
+                </a:solidFill>
+              </a:rPr>
+              <a:t>Recommendation Mode1 (Machine Learning)</a:t>
+            </a:r>
+          </a:p>
+        </p:txBody>
+      </p:sp>
+      <p:sp>
+        <p:nvSpPr>
+          <p:cNvPr id="10" name="Content Placeholder 9">
+            <a:extLst>
+              <a:ext uri="{FF2B5EF4-FFF2-40B4-BE49-F238E27FC236}">
+                <a16:creationId xmlns:a16="http://schemas.microsoft.com/office/drawing/2014/main" id="{A511560A-4AF4-4FC0-A53C-E0E41F2E37DD}"/>
+              </a:ext>
+            </a:extLst>
+          </p:cNvPr>
+          <p:cNvSpPr>
+            <a:spLocks noGrp="1"/>
+          </p:cNvSpPr>
+          <p:nvPr>
+            <p:ph idx="1"/>
+          </p:nvPr>
+        </p:nvSpPr>
+        <p:spPr>
+          <a:xfrm>
+            <a:off x="4948806" y="542109"/>
+            <a:ext cx="6938394" cy="5892104"/>
+          </a:xfrm>
+        </p:spPr>
+        <p:txBody>
+          <a:bodyPr>
+            <a:normAutofit lnSpcReduction="10000"/>
+          </a:bodyPr>
+          <a:lstStyle/>
+          <a:p>
+            <a:r>
+              <a:rPr lang="en-US" dirty="0"/>
+              <a:t>Advance Search </a:t>
+            </a:r>
+          </a:p>
+          <a:p>
+            <a:pPr marL="0" indent="0">
+              <a:buNone/>
+            </a:pPr>
+            <a:r>
+              <a:rPr lang="en-US" sz="2200" dirty="0"/>
+              <a:t>Recommend similar food items based on NLP model. This model lets user enter text in the advance search box and displays a list of top 10 food items with closest food name match.</a:t>
+            </a:r>
+          </a:p>
+          <a:p>
+            <a:pPr marL="0" indent="0">
+              <a:buNone/>
+            </a:pPr>
+            <a:r>
+              <a:rPr lang="en-US" sz="2200" dirty="0"/>
+              <a:t>This enables user to find similar items which are not in database or if a user doesn’t type the exact name in search box.</a:t>
+            </a:r>
+          </a:p>
+          <a:p>
+            <a:r>
+              <a:rPr lang="en-US" dirty="0"/>
+              <a:t>Logic used for this algorithm</a:t>
+            </a:r>
+          </a:p>
+          <a:p>
+            <a:pPr lvl="1"/>
+            <a:r>
+              <a:rPr lang="en-US" dirty="0"/>
+              <a:t>1. Convert the food item name in the database to a matrix form.</a:t>
+            </a:r>
+          </a:p>
+          <a:p>
+            <a:pPr lvl="1"/>
+            <a:r>
+              <a:rPr lang="en-US" dirty="0"/>
+              <a:t>2. Calculate cosine similarity between the text entered by user and matrix.</a:t>
+            </a:r>
+          </a:p>
+          <a:p>
+            <a:pPr lvl="1"/>
+            <a:r>
+              <a:rPr lang="en-US" dirty="0"/>
+              <a:t>3. Return a list of top 10 similarities.</a:t>
+            </a:r>
+          </a:p>
+          <a:p>
+            <a:pPr lvl="1"/>
+            <a:r>
+              <a:rPr lang="en-US" dirty="0"/>
+              <a:t>4. Sort the items by max id and display the list in the required format (item name + weight of the items)</a:t>
+            </a:r>
+          </a:p>
+          <a:p>
+            <a:pPr lvl="1"/>
+            <a:endParaRPr lang="en-US" dirty="0"/>
+          </a:p>
+          <a:p>
+            <a:pPr lvl="1"/>
+            <a:endParaRPr lang="en-US" dirty="0"/>
+          </a:p>
+          <a:p>
+            <a:pPr lvl="1"/>
+            <a:endParaRPr lang="en-US" dirty="0"/>
+          </a:p>
+        </p:txBody>
+      </p:sp>
+      <p:sp>
+        <p:nvSpPr>
+          <p:cNvPr id="3" name="Right Brace 2">
+            <a:extLst>
+              <a:ext uri="{FF2B5EF4-FFF2-40B4-BE49-F238E27FC236}">
+                <a16:creationId xmlns:a16="http://schemas.microsoft.com/office/drawing/2014/main" id="{A1A1D9EA-DBDE-46DB-8B7A-A0CF52BCF990}"/>
+              </a:ext>
+            </a:extLst>
+          </p:cNvPr>
+          <p:cNvSpPr/>
+          <p:nvPr/>
+        </p:nvSpPr>
+        <p:spPr>
+          <a:xfrm>
+            <a:off x="12762271" y="7325032"/>
+            <a:ext cx="155448" cy="914400"/>
+          </a:xfrm>
+          <a:prstGeom prst="rightBrace">
+            <a:avLst/>
+          </a:prstGeom>
+        </p:spPr>
+        <p:style>
+          <a:lnRef idx="1">
+            <a:schemeClr val="accent1"/>
+          </a:lnRef>
+          <a:fillRef idx="0">
+            <a:schemeClr val="accent1"/>
+          </a:fillRef>
+          <a:effectRef idx="0">
+            <a:schemeClr val="accent1"/>
+          </a:effectRef>
+          <a:fontRef idx="minor">
+            <a:schemeClr val="tx1"/>
+          </a:fontRef>
+        </p:style>
+        <p:txBody>
+          <a:bodyPr rtlCol="0" anchor="ctr"/>
+          <a:lstStyle/>
+          <a:p>
+            <a:pPr algn="ctr"/>
+            <a:endParaRPr lang="en-US"/>
+          </a:p>
+        </p:txBody>
+      </p:sp>
+    </p:spTree>
+    <p:extLst>
+      <p:ext uri="{BB962C8B-B14F-4D97-AF65-F5344CB8AC3E}">
+        <p14:creationId xmlns:p14="http://schemas.microsoft.com/office/powerpoint/2010/main" val="1381335327"/>
+      </p:ext>
+    </p:extLst>
+  </p:cSld>
+  <p:clrMapOvr>
+    <a:masterClrMapping/>
+  </p:clrMapOvr>
+</p:sld>
+</file>
+
+<file path=ppt/slides/slide9.xml><?xml version="1.0" encoding="utf-8"?>
+<p:sld xmlns:a="http://schemas.openxmlformats.org/drawingml/2006/main" xmlns:r="http://schemas.openxmlformats.org/officeDocument/2006/relationships" xmlns:p="http://schemas.openxmlformats.org/presentationml/2006/main">
+  <p:cSld>
+    <p:bg>
+      <p:bgPr>
+        <a:solidFill>
+          <a:schemeClr val="bg1"/>
+        </a:solidFill>
+        <a:effectLst/>
+      </p:bgPr>
+    </p:bg>
+    <p:spTree>
+      <p:nvGrpSpPr>
+        <p:cNvPr id="1" name=""/>
+        <p:cNvGrpSpPr/>
+        <p:nvPr/>
+      </p:nvGrpSpPr>
+      <p:grpSpPr>
+        <a:xfrm>
+          <a:off x="0" y="0"/>
+          <a:ext cx="0" cy="0"/>
+          <a:chOff x="0" y="0"/>
+          <a:chExt cx="0" cy="0"/>
+        </a:xfrm>
+      </p:grpSpPr>
+      <p:sp>
+        <p:nvSpPr>
+          <p:cNvPr id="18" name="Freeform: Shape 15">
+            <a:extLst>
+              <a:ext uri="{FF2B5EF4-FFF2-40B4-BE49-F238E27FC236}">
+                <a16:creationId xmlns:a16="http://schemas.microsoft.com/office/drawing/2014/main" id="{46C2E80F-49A6-4372-B103-219D417A55ED}"/>
+              </a:ext>
+              <a:ext uri="{C183D7F6-B498-43B3-948B-1728B52AA6E4}">
+                <adec:decorative xmlns:adec="http://schemas.microsoft.com/office/drawing/2017/decorative" val="1"/>
+              </a:ext>
+            </a:extLst>
+          </p:cNvPr>
+          <p:cNvSpPr>
+            <a:spLocks noGrp="1" noRot="1" noChangeAspect="1" noMove="1" noResize="1" noEditPoints="1" noAdjustHandles="1" noChangeArrowheads="1" noChangeShapeType="1" noTextEdit="1"/>
+          </p:cNvSpPr>
+          <p:nvPr>
+            <p:extLst>
+              <p:ext uri="{386F3935-93C4-4BCD-93E2-E3B085C9AB24}">
+                <p16:designElem xmlns:p16="http://schemas.microsoft.com/office/powerpoint/2015/main" val="1"/>
+              </p:ext>
+            </p:extLst>
+          </p:nvPr>
+        </p:nvSpPr>
+        <p:spPr>
+          <a:xfrm>
+            <a:off x="484096" y="470925"/>
+            <a:ext cx="4381009" cy="5892104"/>
+          </a:xfrm>
+          <a:custGeom>
+            <a:avLst/>
+            <a:gdLst>
+              <a:gd name="connsiteX0" fmla="*/ 0 w 4381009"/>
+              <a:gd name="connsiteY0" fmla="*/ 0 h 5892104"/>
+              <a:gd name="connsiteX1" fmla="*/ 4157628 w 4381009"/>
+              <a:gd name="connsiteY1" fmla="*/ 0 h 5892104"/>
+              <a:gd name="connsiteX2" fmla="*/ 4169302 w 4381009"/>
+              <a:gd name="connsiteY2" fmla="*/ 68659 h 5892104"/>
+              <a:gd name="connsiteX3" fmla="*/ 4191571 w 4381009"/>
+              <a:gd name="connsiteY3" fmla="*/ 205472 h 5892104"/>
+              <a:gd name="connsiteX4" fmla="*/ 4213368 w 4381009"/>
+              <a:gd name="connsiteY4" fmla="*/ 342890 h 5892104"/>
+              <a:gd name="connsiteX5" fmla="*/ 4232030 w 4381009"/>
+              <a:gd name="connsiteY5" fmla="*/ 480913 h 5892104"/>
+              <a:gd name="connsiteX6" fmla="*/ 4250848 w 4381009"/>
+              <a:gd name="connsiteY6" fmla="*/ 618332 h 5892104"/>
+              <a:gd name="connsiteX7" fmla="*/ 4268412 w 4381009"/>
+              <a:gd name="connsiteY7" fmla="*/ 756355 h 5892104"/>
+              <a:gd name="connsiteX8" fmla="*/ 4283467 w 4381009"/>
+              <a:gd name="connsiteY8" fmla="*/ 892563 h 5892104"/>
+              <a:gd name="connsiteX9" fmla="*/ 4297737 w 4381009"/>
+              <a:gd name="connsiteY9" fmla="*/ 1030587 h 5892104"/>
+              <a:gd name="connsiteX10" fmla="*/ 4310754 w 4381009"/>
+              <a:gd name="connsiteY10" fmla="*/ 1168005 h 5892104"/>
+              <a:gd name="connsiteX11" fmla="*/ 4322045 w 4381009"/>
+              <a:gd name="connsiteY11" fmla="*/ 1303002 h 5892104"/>
+              <a:gd name="connsiteX12" fmla="*/ 4333336 w 4381009"/>
+              <a:gd name="connsiteY12" fmla="*/ 1439815 h 5892104"/>
+              <a:gd name="connsiteX13" fmla="*/ 4342745 w 4381009"/>
+              <a:gd name="connsiteY13" fmla="*/ 1574812 h 5892104"/>
+              <a:gd name="connsiteX14" fmla="*/ 4350115 w 4381009"/>
+              <a:gd name="connsiteY14" fmla="*/ 1709808 h 5892104"/>
+              <a:gd name="connsiteX15" fmla="*/ 4357799 w 4381009"/>
+              <a:gd name="connsiteY15" fmla="*/ 1844200 h 5892104"/>
+              <a:gd name="connsiteX16" fmla="*/ 4364229 w 4381009"/>
+              <a:gd name="connsiteY16" fmla="*/ 1977381 h 5892104"/>
+              <a:gd name="connsiteX17" fmla="*/ 4368777 w 4381009"/>
+              <a:gd name="connsiteY17" fmla="*/ 2109351 h 5892104"/>
+              <a:gd name="connsiteX18" fmla="*/ 4372697 w 4381009"/>
+              <a:gd name="connsiteY18" fmla="*/ 2241321 h 5892104"/>
+              <a:gd name="connsiteX19" fmla="*/ 4376461 w 4381009"/>
+              <a:gd name="connsiteY19" fmla="*/ 2372080 h 5892104"/>
+              <a:gd name="connsiteX20" fmla="*/ 4378186 w 4381009"/>
+              <a:gd name="connsiteY20" fmla="*/ 2501023 h 5892104"/>
+              <a:gd name="connsiteX21" fmla="*/ 4380068 w 4381009"/>
+              <a:gd name="connsiteY21" fmla="*/ 2629966 h 5892104"/>
+              <a:gd name="connsiteX22" fmla="*/ 4381009 w 4381009"/>
+              <a:gd name="connsiteY22" fmla="*/ 2757093 h 5892104"/>
+              <a:gd name="connsiteX23" fmla="*/ 4380068 w 4381009"/>
+              <a:gd name="connsiteY23" fmla="*/ 2883010 h 5892104"/>
+              <a:gd name="connsiteX24" fmla="*/ 4380068 w 4381009"/>
+              <a:gd name="connsiteY24" fmla="*/ 3007715 h 5892104"/>
+              <a:gd name="connsiteX25" fmla="*/ 4378186 w 4381009"/>
+              <a:gd name="connsiteY25" fmla="*/ 3131210 h 5892104"/>
+              <a:gd name="connsiteX26" fmla="*/ 4375363 w 4381009"/>
+              <a:gd name="connsiteY26" fmla="*/ 3252283 h 5892104"/>
+              <a:gd name="connsiteX27" fmla="*/ 4372697 w 4381009"/>
+              <a:gd name="connsiteY27" fmla="*/ 3372146 h 5892104"/>
+              <a:gd name="connsiteX28" fmla="*/ 4369718 w 4381009"/>
+              <a:gd name="connsiteY28" fmla="*/ 3489587 h 5892104"/>
+              <a:gd name="connsiteX29" fmla="*/ 4365170 w 4381009"/>
+              <a:gd name="connsiteY29" fmla="*/ 3606423 h 5892104"/>
+              <a:gd name="connsiteX30" fmla="*/ 4360309 w 4381009"/>
+              <a:gd name="connsiteY30" fmla="*/ 3721443 h 5892104"/>
+              <a:gd name="connsiteX31" fmla="*/ 4355918 w 4381009"/>
+              <a:gd name="connsiteY31" fmla="*/ 3834041 h 5892104"/>
+              <a:gd name="connsiteX32" fmla="*/ 4343529 w 4381009"/>
+              <a:gd name="connsiteY32" fmla="*/ 4053789 h 5892104"/>
+              <a:gd name="connsiteX33" fmla="*/ 4330356 w 4381009"/>
+              <a:gd name="connsiteY33" fmla="*/ 4264457 h 5892104"/>
+              <a:gd name="connsiteX34" fmla="*/ 4316556 w 4381009"/>
+              <a:gd name="connsiteY34" fmla="*/ 4466650 h 5892104"/>
+              <a:gd name="connsiteX35" fmla="*/ 4301344 w 4381009"/>
+              <a:gd name="connsiteY35" fmla="*/ 4657946 h 5892104"/>
+              <a:gd name="connsiteX36" fmla="*/ 4285506 w 4381009"/>
+              <a:gd name="connsiteY36" fmla="*/ 4840767 h 5892104"/>
+              <a:gd name="connsiteX37" fmla="*/ 4268412 w 4381009"/>
+              <a:gd name="connsiteY37" fmla="*/ 5010269 h 5892104"/>
+              <a:gd name="connsiteX38" fmla="*/ 4251633 w 4381009"/>
+              <a:gd name="connsiteY38" fmla="*/ 5169481 h 5892104"/>
+              <a:gd name="connsiteX39" fmla="*/ 4234853 w 4381009"/>
+              <a:gd name="connsiteY39" fmla="*/ 5315980 h 5892104"/>
+              <a:gd name="connsiteX40" fmla="*/ 4219014 w 4381009"/>
+              <a:gd name="connsiteY40" fmla="*/ 5450371 h 5892104"/>
+              <a:gd name="connsiteX41" fmla="*/ 4203959 w 4381009"/>
+              <a:gd name="connsiteY41" fmla="*/ 5569628 h 5892104"/>
+              <a:gd name="connsiteX42" fmla="*/ 4189689 w 4381009"/>
+              <a:gd name="connsiteY42" fmla="*/ 5677384 h 5892104"/>
+              <a:gd name="connsiteX43" fmla="*/ 4177770 w 4381009"/>
+              <a:gd name="connsiteY43" fmla="*/ 5768189 h 5892104"/>
+              <a:gd name="connsiteX44" fmla="*/ 4166479 w 4381009"/>
+              <a:gd name="connsiteY44" fmla="*/ 5844465 h 5892104"/>
+              <a:gd name="connsiteX45" fmla="*/ 4159132 w 4381009"/>
+              <a:gd name="connsiteY45" fmla="*/ 5892104 h 5892104"/>
+              <a:gd name="connsiteX46" fmla="*/ 0 w 4381009"/>
+              <a:gd name="connsiteY46" fmla="*/ 5892104 h 5892104"/>
+            </a:gdLst>
+            <a:ahLst/>
+            <a:cxnLst>
+              <a:cxn ang="0">
+                <a:pos x="connsiteX0" y="connsiteY0"/>
+              </a:cxn>
+              <a:cxn ang="0">
+                <a:pos x="connsiteX1" y="connsiteY1"/>
+              </a:cxn>
+              <a:cxn ang="0">
+                <a:pos x="connsiteX2" y="connsiteY2"/>
+              </a:cxn>
+              <a:cxn ang="0">
+                <a:pos x="connsiteX3" y="connsiteY3"/>
+              </a:cxn>
+              <a:cxn ang="0">
+                <a:pos x="connsiteX4" y="connsiteY4"/>
+              </a:cxn>
+              <a:cxn ang="0">
+                <a:pos x="connsiteX5" y="connsiteY5"/>
+              </a:cxn>
+              <a:cxn ang="0">
+                <a:pos x="connsiteX6" y="connsiteY6"/>
+              </a:cxn>
+              <a:cxn ang="0">
+                <a:pos x="connsiteX7" y="connsiteY7"/>
+              </a:cxn>
+              <a:cxn ang="0">
+                <a:pos x="connsiteX8" y="connsiteY8"/>
+              </a:cxn>
+              <a:cxn ang="0">
+                <a:pos x="connsiteX9" y="connsiteY9"/>
+              </a:cxn>
+              <a:cxn ang="0">
+                <a:pos x="connsiteX10" y="connsiteY10"/>
+              </a:cxn>
+              <a:cxn ang="0">
+                <a:pos x="connsiteX11" y="connsiteY11"/>
+              </a:cxn>
+              <a:cxn ang="0">
+                <a:pos x="connsiteX12" y="connsiteY12"/>
+              </a:cxn>
+              <a:cxn ang="0">
+                <a:pos x="connsiteX13" y="connsiteY13"/>
+              </a:cxn>
+              <a:cxn ang="0">
+                <a:pos x="connsiteX14" y="connsiteY14"/>
+              </a:cxn>
+              <a:cxn ang="0">
+                <a:pos x="connsiteX15" y="connsiteY15"/>
+              </a:cxn>
+              <a:cxn ang="0">
+                <a:pos x="connsiteX16" y="connsiteY16"/>
+              </a:cxn>
+              <a:cxn ang="0">
+                <a:pos x="connsiteX17" y="connsiteY17"/>
+              </a:cxn>
+              <a:cxn ang="0">
+                <a:pos x="connsiteX18" y="connsiteY18"/>
+              </a:cxn>
+              <a:cxn ang="0">
+                <a:pos x="connsiteX19" y="connsiteY19"/>
+              </a:cxn>
+              <a:cxn ang="0">
+                <a:pos x="connsiteX20" y="connsiteY20"/>
+              </a:cxn>
+              <a:cxn ang="0">
+                <a:pos x="connsiteX21" y="connsiteY21"/>
+              </a:cxn>
+              <a:cxn ang="0">
+                <a:pos x="connsiteX22" y="connsiteY22"/>
+              </a:cxn>
+              <a:cxn ang="0">
+                <a:pos x="connsiteX23" y="connsiteY23"/>
+              </a:cxn>
+              <a:cxn ang="0">
+                <a:pos x="connsiteX24" y="connsiteY24"/>
+              </a:cxn>
+              <a:cxn ang="0">
+                <a:pos x="connsiteX25" y="connsiteY25"/>
+              </a:cxn>
+              <a:cxn ang="0">
+                <a:pos x="connsiteX26" y="connsiteY26"/>
+              </a:cxn>
+              <a:cxn ang="0">
+                <a:pos x="connsiteX27" y="connsiteY27"/>
+              </a:cxn>
+              <a:cxn ang="0">
+                <a:pos x="connsiteX28" y="connsiteY28"/>
+              </a:cxn>
+              <a:cxn ang="0">
+                <a:pos x="connsiteX29" y="connsiteY29"/>
+              </a:cxn>
+              <a:cxn ang="0">
+                <a:pos x="connsiteX30" y="connsiteY30"/>
+              </a:cxn>
+              <a:cxn ang="0">
+                <a:pos x="connsiteX31" y="connsiteY31"/>
+              </a:cxn>
+              <a:cxn ang="0">
+                <a:pos x="connsiteX32" y="connsiteY32"/>
+              </a:cxn>
+              <a:cxn ang="0">
+                <a:pos x="connsiteX33" y="connsiteY33"/>
+              </a:cxn>
+              <a:cxn ang="0">
+                <a:pos x="connsiteX34" y="connsiteY34"/>
+              </a:cxn>
+              <a:cxn ang="0">
+                <a:pos x="connsiteX35" y="connsiteY35"/>
+              </a:cxn>
+              <a:cxn ang="0">
+                <a:pos x="connsiteX36" y="connsiteY36"/>
+              </a:cxn>
+              <a:cxn ang="0">
+                <a:pos x="connsiteX37" y="connsiteY37"/>
+              </a:cxn>
+              <a:cxn ang="0">
+                <a:pos x="connsiteX38" y="connsiteY38"/>
+              </a:cxn>
+              <a:cxn ang="0">
+                <a:pos x="connsiteX39" y="connsiteY39"/>
+              </a:cxn>
+              <a:cxn ang="0">
+                <a:pos x="connsiteX40" y="connsiteY40"/>
+              </a:cxn>
+              <a:cxn ang="0">
+                <a:pos x="connsiteX41" y="connsiteY41"/>
+              </a:cxn>
+              <a:cxn ang="0">
+                <a:pos x="connsiteX42" y="connsiteY42"/>
+              </a:cxn>
+              <a:cxn ang="0">
+                <a:pos x="connsiteX43" y="connsiteY43"/>
+              </a:cxn>
+              <a:cxn ang="0">
+                <a:pos x="connsiteX44" y="connsiteY44"/>
+              </a:cxn>
+              <a:cxn ang="0">
+                <a:pos x="connsiteX45" y="connsiteY45"/>
+              </a:cxn>
+              <a:cxn ang="0">
+                <a:pos x="connsiteX46" y="connsiteY46"/>
+              </a:cxn>
+            </a:cxnLst>
+            <a:rect l="l" t="t" r="r" b="b"/>
+            <a:pathLst>
+              <a:path w="4381009" h="5892104">
+                <a:moveTo>
+                  <a:pt x="0" y="0"/>
+                </a:moveTo>
+                <a:lnTo>
+                  <a:pt x="4157628" y="0"/>
+                </a:lnTo>
+                <a:lnTo>
+                  <a:pt x="4169302" y="68659"/>
+                </a:lnTo>
+                <a:lnTo>
+                  <a:pt x="4191571" y="205472"/>
+                </a:lnTo>
+                <a:lnTo>
+                  <a:pt x="4213368" y="342890"/>
+                </a:lnTo>
+                <a:lnTo>
+                  <a:pt x="4232030" y="480913"/>
+                </a:lnTo>
+                <a:lnTo>
+                  <a:pt x="4250848" y="618332"/>
+                </a:lnTo>
+                <a:lnTo>
+                  <a:pt x="4268412" y="756355"/>
+                </a:lnTo>
+                <a:lnTo>
+                  <a:pt x="4283467" y="892563"/>
+                </a:lnTo>
+                <a:lnTo>
+                  <a:pt x="4297737" y="1030587"/>
+                </a:lnTo>
+                <a:lnTo>
+                  <a:pt x="4310754" y="1168005"/>
+                </a:lnTo>
+                <a:lnTo>
+                  <a:pt x="4322045" y="1303002"/>
+                </a:lnTo>
+                <a:lnTo>
+                  <a:pt x="4333336" y="1439815"/>
+                </a:lnTo>
+                <a:lnTo>
+                  <a:pt x="4342745" y="1574812"/>
+                </a:lnTo>
+                <a:lnTo>
+                  <a:pt x="4350115" y="1709808"/>
+                </a:lnTo>
+                <a:lnTo>
+                  <a:pt x="4357799" y="1844200"/>
+                </a:lnTo>
+                <a:lnTo>
+                  <a:pt x="4364229" y="1977381"/>
+                </a:lnTo>
+                <a:lnTo>
+                  <a:pt x="4368777" y="2109351"/>
+                </a:lnTo>
+                <a:lnTo>
+                  <a:pt x="4372697" y="2241321"/>
+                </a:lnTo>
+                <a:lnTo>
+                  <a:pt x="4376461" y="2372080"/>
+                </a:lnTo>
+                <a:lnTo>
+                  <a:pt x="4378186" y="2501023"/>
+                </a:lnTo>
+                <a:lnTo>
+                  <a:pt x="4380068" y="2629966"/>
+                </a:lnTo>
+                <a:lnTo>
+                  <a:pt x="4381009" y="2757093"/>
+                </a:lnTo>
+                <a:lnTo>
+                  <a:pt x="4380068" y="2883010"/>
+                </a:lnTo>
+                <a:lnTo>
+                  <a:pt x="4380068" y="3007715"/>
+                </a:lnTo>
+                <a:lnTo>
+                  <a:pt x="4378186" y="3131210"/>
+                </a:lnTo>
+                <a:lnTo>
+                  <a:pt x="4375363" y="3252283"/>
+                </a:lnTo>
+                <a:lnTo>
+                  <a:pt x="4372697" y="3372146"/>
+                </a:lnTo>
+                <a:lnTo>
+                  <a:pt x="4369718" y="3489587"/>
+                </a:lnTo>
+                <a:lnTo>
+                  <a:pt x="4365170" y="3606423"/>
+                </a:lnTo>
+                <a:lnTo>
+                  <a:pt x="4360309" y="3721443"/>
+                </a:lnTo>
+                <a:lnTo>
+                  <a:pt x="4355918" y="3834041"/>
+                </a:lnTo>
+                <a:lnTo>
+                  <a:pt x="4343529" y="4053789"/>
+                </a:lnTo>
+                <a:lnTo>
+                  <a:pt x="4330356" y="4264457"/>
+                </a:lnTo>
+                <a:lnTo>
+                  <a:pt x="4316556" y="4466650"/>
+                </a:lnTo>
+                <a:lnTo>
+                  <a:pt x="4301344" y="4657946"/>
+                </a:lnTo>
+                <a:lnTo>
+                  <a:pt x="4285506" y="4840767"/>
+                </a:lnTo>
+                <a:lnTo>
+                  <a:pt x="4268412" y="5010269"/>
+                </a:lnTo>
+                <a:lnTo>
+                  <a:pt x="4251633" y="5169481"/>
+                </a:lnTo>
+                <a:lnTo>
+                  <a:pt x="4234853" y="5315980"/>
+                </a:lnTo>
+                <a:lnTo>
+                  <a:pt x="4219014" y="5450371"/>
+                </a:lnTo>
+                <a:lnTo>
+                  <a:pt x="4203959" y="5569628"/>
+                </a:lnTo>
+                <a:lnTo>
+                  <a:pt x="4189689" y="5677384"/>
+                </a:lnTo>
+                <a:lnTo>
+                  <a:pt x="4177770" y="5768189"/>
+                </a:lnTo>
+                <a:lnTo>
+                  <a:pt x="4166479" y="5844465"/>
+                </a:lnTo>
+                <a:lnTo>
+                  <a:pt x="4159132" y="5892104"/>
+                </a:lnTo>
+                <a:lnTo>
+                  <a:pt x="0" y="5892104"/>
+                </a:lnTo>
+                <a:close/>
+              </a:path>
+            </a:pathLst>
+          </a:custGeom>
+          <a:solidFill>
+            <a:srgbClr val="404040"/>
+          </a:solidFill>
+          <a:ln>
+            <a:noFill/>
+          </a:ln>
+        </p:spPr>
+        <p:style>
+          <a:lnRef idx="2">
+            <a:schemeClr val="accent1">
+              <a:shade val="50000"/>
+            </a:schemeClr>
+          </a:lnRef>
+          <a:fillRef idx="1">
+            <a:schemeClr val="accent1"/>
+          </a:fillRef>
+          <a:effectRef idx="0">
+            <a:schemeClr val="accent1"/>
+          </a:effectRef>
+          <a:fontRef idx="minor">
+            <a:schemeClr val="lt1"/>
+          </a:fontRef>
+        </p:style>
+        <p:txBody>
+          <a:bodyPr wrap="square" rtlCol="0" anchor="ctr">
+            <a:noAutofit/>
+          </a:bodyPr>
+          <a:lstStyle/>
+          <a:p>
+            <a:pPr marL="0" marR="0" lvl="0" indent="0" algn="ctr" defTabSz="457200" rtl="0" eaLnBrk="1" fontAlgn="auto" latinLnBrk="0" hangingPunct="1">
+              <a:lnSpc>
+                <a:spcPct val="100000"/>
+              </a:lnSpc>
+              <a:spcBef>
+                <a:spcPts val="0"/>
+              </a:spcBef>
+              <a:spcAft>
+                <a:spcPts val="0"/>
+              </a:spcAft>
+              <a:buClrTx/>
+              <a:buSzTx/>
+              <a:buFontTx/>
+              <a:buNone/>
+              <a:tabLst/>
+              <a:defRPr/>
+            </a:pPr>
+            <a:endParaRPr kumimoji="0" lang="en-US" sz="1800" b="0" i="0" u="none" strike="noStrike" kern="1200" cap="none" spc="0" normalizeH="0" baseline="0" noProof="0">
+              <a:ln>
+                <a:noFill/>
+              </a:ln>
+              <a:solidFill>
+                <a:prstClr val="white"/>
+              </a:solidFill>
+              <a:effectLst/>
+              <a:uLnTx/>
+              <a:uFillTx/>
+              <a:latin typeface="Calibri" panose="020F0502020204030204"/>
+              <a:ea typeface="+mn-ea"/>
+              <a:cs typeface="+mn-cs"/>
+            </a:endParaRPr>
+          </a:p>
+        </p:txBody>
+      </p:sp>
+      <p:sp>
+        <p:nvSpPr>
+          <p:cNvPr id="2" name="Title 1">
+            <a:extLst>
+              <a:ext uri="{FF2B5EF4-FFF2-40B4-BE49-F238E27FC236}">
+                <a16:creationId xmlns:a16="http://schemas.microsoft.com/office/drawing/2014/main" id="{9BD9ED5B-7300-499A-BBF6-AE5D925DB064}"/>
+              </a:ext>
+            </a:extLst>
+          </p:cNvPr>
+          <p:cNvSpPr>
+            <a:spLocks noGrp="1"/>
+          </p:cNvSpPr>
+          <p:nvPr>
+            <p:ph type="title"/>
+          </p:nvPr>
+        </p:nvSpPr>
+        <p:spPr>
+          <a:xfrm>
+            <a:off x="863029" y="1012004"/>
+            <a:ext cx="3416158" cy="4795408"/>
+          </a:xfrm>
+        </p:spPr>
+        <p:txBody>
+          <a:bodyPr>
+            <a:normAutofit/>
+          </a:bodyPr>
+          <a:lstStyle/>
+          <a:p>
+            <a:r>
+              <a:rPr lang="en-US" sz="3200" dirty="0">
+                <a:solidFill>
+                  <a:srgbClr val="FFFFFF"/>
+                </a:solidFill>
+              </a:rPr>
+              <a:t>Recommendation Model 2(Machine Learning)</a:t>
+            </a:r>
+          </a:p>
+        </p:txBody>
+      </p:sp>
+      <p:sp>
+        <p:nvSpPr>
+          <p:cNvPr id="10" name="Content Placeholder 9">
+            <a:extLst>
+              <a:ext uri="{FF2B5EF4-FFF2-40B4-BE49-F238E27FC236}">
+                <a16:creationId xmlns:a16="http://schemas.microsoft.com/office/drawing/2014/main" id="{A511560A-4AF4-4FC0-A53C-E0E41F2E37DD}"/>
+              </a:ext>
+            </a:extLst>
+          </p:cNvPr>
+          <p:cNvSpPr>
+            <a:spLocks noGrp="1"/>
+          </p:cNvSpPr>
+          <p:nvPr>
+            <p:ph idx="1"/>
+          </p:nvPr>
+        </p:nvSpPr>
+        <p:spPr>
+          <a:xfrm>
+            <a:off x="4948806" y="542109"/>
+            <a:ext cx="6938394" cy="5892104"/>
+          </a:xfrm>
+        </p:spPr>
+        <p:txBody>
+          <a:bodyPr>
+            <a:normAutofit fontScale="92500" lnSpcReduction="10000"/>
+          </a:bodyPr>
+          <a:lstStyle/>
+          <a:p>
+            <a:r>
+              <a:rPr lang="en-US" dirty="0"/>
+              <a:t>Recommending similar food items</a:t>
+            </a:r>
+          </a:p>
+          <a:p>
+            <a:pPr marL="0" indent="0">
+              <a:buNone/>
+            </a:pPr>
+            <a:r>
+              <a:rPr lang="en-US" sz="2400" dirty="0"/>
+              <a:t>This model displays a table with top 5 similar food items in composition to the searched food item along with their respective nutrition content </a:t>
+            </a:r>
+          </a:p>
+          <a:p>
+            <a:r>
+              <a:rPr lang="en-US" dirty="0"/>
+              <a:t>Logic used for this algorithm</a:t>
+            </a:r>
+          </a:p>
+          <a:p>
+            <a:pPr lvl="1"/>
+            <a:r>
+              <a:rPr lang="en-US" dirty="0"/>
+              <a:t>1. Select per calorie nutrition information for all the items in the database.</a:t>
+            </a:r>
+          </a:p>
+          <a:p>
+            <a:pPr lvl="1"/>
+            <a:r>
+              <a:rPr lang="en-US" dirty="0"/>
+              <a:t>2. Find a list of nutrition parameters to be compared for similarity. Parameters used in this model are: Proteins, </a:t>
+            </a:r>
+            <a:r>
+              <a:rPr lang="en-US" dirty="0" err="1"/>
+              <a:t>Carbohydrtes</a:t>
+            </a:r>
+            <a:r>
+              <a:rPr lang="en-US" dirty="0"/>
+              <a:t>, </a:t>
+            </a:r>
+            <a:r>
+              <a:rPr lang="en-US" dirty="0" err="1"/>
+              <a:t>Total_fat</a:t>
+            </a:r>
+            <a:r>
+              <a:rPr lang="en-US" dirty="0"/>
+              <a:t>, </a:t>
+            </a:r>
+            <a:r>
+              <a:rPr lang="en-US" dirty="0" err="1"/>
+              <a:t>Total_Sugar</a:t>
+            </a:r>
+            <a:r>
+              <a:rPr lang="en-US" dirty="0"/>
+              <a:t>, Sodium</a:t>
+            </a:r>
+          </a:p>
+          <a:p>
+            <a:pPr lvl="1"/>
+            <a:r>
+              <a:rPr lang="en-US" dirty="0"/>
+              <a:t>3. Find the normalized value of he </a:t>
+            </a:r>
+            <a:r>
+              <a:rPr lang="en-US"/>
+              <a:t>above parameters</a:t>
+            </a:r>
+            <a:r>
+              <a:rPr lang="en-US" dirty="0"/>
+              <a:t>.</a:t>
+            </a:r>
+          </a:p>
+          <a:p>
+            <a:pPr lvl="1"/>
+            <a:r>
+              <a:rPr lang="en-US" dirty="0"/>
+              <a:t>4. Find cosine similarity between the normalized nutrition values for the input text and the food items in database.</a:t>
+            </a:r>
+          </a:p>
+          <a:p>
+            <a:pPr lvl="1"/>
+            <a:r>
+              <a:rPr lang="en-US" dirty="0"/>
+              <a:t>5. Return a list of top 5 similar items in composition based on above algorithm.</a:t>
+            </a:r>
+          </a:p>
+          <a:p>
+            <a:pPr marL="457200" lvl="1" indent="0">
+              <a:buNone/>
+            </a:pPr>
+            <a:endParaRPr lang="en-US" dirty="0"/>
+          </a:p>
+          <a:p>
+            <a:pPr lvl="1"/>
+            <a:endParaRPr lang="en-US" dirty="0"/>
+          </a:p>
+          <a:p>
+            <a:pPr lvl="1"/>
+            <a:endParaRPr lang="en-US" dirty="0"/>
+          </a:p>
+          <a:p>
+            <a:pPr lvl="1"/>
+            <a:endParaRPr lang="en-US" dirty="0"/>
+          </a:p>
+        </p:txBody>
+      </p:sp>
+      <p:sp>
+        <p:nvSpPr>
+          <p:cNvPr id="3" name="Right Brace 2">
+            <a:extLst>
+              <a:ext uri="{FF2B5EF4-FFF2-40B4-BE49-F238E27FC236}">
+                <a16:creationId xmlns:a16="http://schemas.microsoft.com/office/drawing/2014/main" id="{A1A1D9EA-DBDE-46DB-8B7A-A0CF52BCF990}"/>
+              </a:ext>
+            </a:extLst>
+          </p:cNvPr>
+          <p:cNvSpPr/>
+          <p:nvPr/>
+        </p:nvSpPr>
+        <p:spPr>
+          <a:xfrm>
+            <a:off x="12762271" y="7325032"/>
+            <a:ext cx="155448" cy="914400"/>
+          </a:xfrm>
+          <a:prstGeom prst="rightBrace">
+            <a:avLst/>
+          </a:prstGeom>
+        </p:spPr>
+        <p:style>
+          <a:lnRef idx="1">
+            <a:schemeClr val="accent1"/>
+          </a:lnRef>
+          <a:fillRef idx="0">
+            <a:schemeClr val="accent1"/>
+          </a:fillRef>
+          <a:effectRef idx="0">
+            <a:schemeClr val="accent1"/>
+          </a:effectRef>
+          <a:fontRef idx="minor">
+            <a:schemeClr val="tx1"/>
+          </a:fontRef>
+        </p:style>
+        <p:txBody>
+          <a:bodyPr rtlCol="0" anchor="ctr"/>
+          <a:lstStyle/>
+          <a:p>
+            <a:pPr algn="ctr"/>
+            <a:endParaRPr lang="en-US"/>
+          </a:p>
+        </p:txBody>
+      </p:sp>
+    </p:spTree>
+    <p:extLst>
+      <p:ext uri="{BB962C8B-B14F-4D97-AF65-F5344CB8AC3E}">
+        <p14:creationId xmlns:p14="http://schemas.microsoft.com/office/powerpoint/2010/main" val="550714912"/>
+      </p:ext>
+    </p:extLst>
+  </p:cSld>
+  <p:clrMapOvr>
+    <a:masterClrMapping/>
+  </p:clrMapOvr>
+</p:sld>
+</file>
+
 <file path=ppt/theme/theme1.xml><?xml version="1.0" encoding="utf-8"?>
 <a:theme xmlns:a="http://schemas.openxmlformats.org/drawingml/2006/main" name="Office Theme">
   <a:themeElements>

</xml_diff>

<commit_message>
Modified the Left side on two slides
</commit_message>
<xml_diff>
--- a/Nutrometer.pptx
+++ b/Nutrometer.pptx
@@ -4370,44 +4370,6 @@
         </a:p>
       </dgm:t>
     </dgm:pt>
-    <dgm:pt modelId="{D67943B9-9288-478C-BAC8-2EC90FDA8EE8}">
-      <dgm:prSet/>
-      <dgm:spPr/>
-      <dgm:t>
-        <a:bodyPr/>
-        <a:lstStyle/>
-        <a:p>
-          <a:pPr>
-            <a:lnSpc>
-              <a:spcPct val="100000"/>
-            </a:lnSpc>
-          </a:pPr>
-          <a:endParaRPr lang="en-US" dirty="0"/>
-        </a:p>
-      </dgm:t>
-    </dgm:pt>
-    <dgm:pt modelId="{31EF91C0-F777-4DC7-8371-86CEDF123819}" type="parTrans" cxnId="{948EBFFE-F49F-407A-8E0E-D2C560E2E042}">
-      <dgm:prSet/>
-      <dgm:spPr/>
-      <dgm:t>
-        <a:bodyPr/>
-        <a:lstStyle/>
-        <a:p>
-          <a:endParaRPr lang="en-US"/>
-        </a:p>
-      </dgm:t>
-    </dgm:pt>
-    <dgm:pt modelId="{59E3D9B6-2955-4D2D-BFFA-785010048A67}" type="sibTrans" cxnId="{948EBFFE-F49F-407A-8E0E-D2C560E2E042}">
-      <dgm:prSet/>
-      <dgm:spPr/>
-      <dgm:t>
-        <a:bodyPr/>
-        <a:lstStyle/>
-        <a:p>
-          <a:endParaRPr lang="en-US"/>
-        </a:p>
-      </dgm:t>
-    </dgm:pt>
     <dgm:pt modelId="{389A2C24-8E70-4FA1-9548-96FAD26428E4}" type="pres">
       <dgm:prSet presAssocID="{BE027591-71A5-4FEA-A186-01959D094141}" presName="root" presStyleCnt="0">
         <dgm:presLayoutVars>
@@ -4422,11 +4384,11 @@
       <dgm:spPr/>
     </dgm:pt>
     <dgm:pt modelId="{784AA4E4-3C60-458B-B099-3A9978BA15A4}" type="pres">
-      <dgm:prSet presAssocID="{5DBE6E11-A766-4F0F-AD95-50751BE2D84D}" presName="bgRect" presStyleLbl="bgShp" presStyleIdx="0" presStyleCnt="8"/>
+      <dgm:prSet presAssocID="{5DBE6E11-A766-4F0F-AD95-50751BE2D84D}" presName="bgRect" presStyleLbl="bgShp" presStyleIdx="0" presStyleCnt="7"/>
       <dgm:spPr/>
     </dgm:pt>
     <dgm:pt modelId="{BBFF6DD5-2B4B-4582-AB77-3BB375791746}" type="pres">
-      <dgm:prSet presAssocID="{5DBE6E11-A766-4F0F-AD95-50751BE2D84D}" presName="iconRect" presStyleLbl="node1" presStyleIdx="0" presStyleCnt="8"/>
+      <dgm:prSet presAssocID="{5DBE6E11-A766-4F0F-AD95-50751BE2D84D}" presName="iconRect" presStyleLbl="node1" presStyleIdx="0" presStyleCnt="7"/>
       <dgm:spPr>
         <a:blipFill>
           <a:blip xmlns:r="http://schemas.openxmlformats.org/officeDocument/2006/relationships" r:embed="rId2">
@@ -4455,7 +4417,7 @@
       <dgm:spPr/>
     </dgm:pt>
     <dgm:pt modelId="{019BBF64-DBB8-4151-834D-5B350D40F2A2}" type="pres">
-      <dgm:prSet presAssocID="{5DBE6E11-A766-4F0F-AD95-50751BE2D84D}" presName="parTx" presStyleLbl="revTx" presStyleIdx="0" presStyleCnt="8">
+      <dgm:prSet presAssocID="{5DBE6E11-A766-4F0F-AD95-50751BE2D84D}" presName="parTx" presStyleLbl="revTx" presStyleIdx="0" presStyleCnt="7">
         <dgm:presLayoutVars>
           <dgm:chMax val="0"/>
           <dgm:chPref val="0"/>
@@ -4472,11 +4434,11 @@
       <dgm:spPr/>
     </dgm:pt>
     <dgm:pt modelId="{1231876F-1B78-4BAA-B4A4-8E9BD9748F6D}" type="pres">
-      <dgm:prSet presAssocID="{AC2A012C-0413-426A-9006-AE82A199EE1F}" presName="bgRect" presStyleLbl="bgShp" presStyleIdx="1" presStyleCnt="8"/>
+      <dgm:prSet presAssocID="{AC2A012C-0413-426A-9006-AE82A199EE1F}" presName="bgRect" presStyleLbl="bgShp" presStyleIdx="1" presStyleCnt="7"/>
       <dgm:spPr/>
     </dgm:pt>
     <dgm:pt modelId="{14B3D24D-868B-4370-8B6A-BB38C76116EC}" type="pres">
-      <dgm:prSet presAssocID="{AC2A012C-0413-426A-9006-AE82A199EE1F}" presName="iconRect" presStyleLbl="node1" presStyleIdx="1" presStyleCnt="8"/>
+      <dgm:prSet presAssocID="{AC2A012C-0413-426A-9006-AE82A199EE1F}" presName="iconRect" presStyleLbl="node1" presStyleIdx="1" presStyleCnt="7"/>
       <dgm:spPr>
         <a:blipFill>
           <a:blip xmlns:r="http://schemas.openxmlformats.org/officeDocument/2006/relationships" r:embed="rId4">
@@ -4505,7 +4467,7 @@
       <dgm:spPr/>
     </dgm:pt>
     <dgm:pt modelId="{258E9943-732D-45E6-B34C-1DED30B63188}" type="pres">
-      <dgm:prSet presAssocID="{AC2A012C-0413-426A-9006-AE82A199EE1F}" presName="parTx" presStyleLbl="revTx" presStyleIdx="1" presStyleCnt="8">
+      <dgm:prSet presAssocID="{AC2A012C-0413-426A-9006-AE82A199EE1F}" presName="parTx" presStyleLbl="revTx" presStyleIdx="1" presStyleCnt="7">
         <dgm:presLayoutVars>
           <dgm:chMax val="0"/>
           <dgm:chPref val="0"/>
@@ -4522,11 +4484,11 @@
       <dgm:spPr/>
     </dgm:pt>
     <dgm:pt modelId="{20BE625A-490A-43EB-8A8E-3C835D2D6F5F}" type="pres">
-      <dgm:prSet presAssocID="{C7E9F372-8B75-4CC7-A997-5842EE3039F3}" presName="bgRect" presStyleLbl="bgShp" presStyleIdx="2" presStyleCnt="8"/>
+      <dgm:prSet presAssocID="{C7E9F372-8B75-4CC7-A997-5842EE3039F3}" presName="bgRect" presStyleLbl="bgShp" presStyleIdx="2" presStyleCnt="7"/>
       <dgm:spPr/>
     </dgm:pt>
     <dgm:pt modelId="{1168C0E8-770C-4DDD-8139-24B36DFE3128}" type="pres">
-      <dgm:prSet presAssocID="{C7E9F372-8B75-4CC7-A997-5842EE3039F3}" presName="iconRect" presStyleLbl="node1" presStyleIdx="2" presStyleCnt="8"/>
+      <dgm:prSet presAssocID="{C7E9F372-8B75-4CC7-A997-5842EE3039F3}" presName="iconRect" presStyleLbl="node1" presStyleIdx="2" presStyleCnt="7"/>
       <dgm:spPr>
         <a:blipFill>
           <a:blip xmlns:r="http://schemas.openxmlformats.org/officeDocument/2006/relationships" r:embed="rId6">
@@ -4555,7 +4517,7 @@
       <dgm:spPr/>
     </dgm:pt>
     <dgm:pt modelId="{E3710687-40E0-47D6-92C2-1FF91C9C6957}" type="pres">
-      <dgm:prSet presAssocID="{C7E9F372-8B75-4CC7-A997-5842EE3039F3}" presName="parTx" presStyleLbl="revTx" presStyleIdx="2" presStyleCnt="8">
+      <dgm:prSet presAssocID="{C7E9F372-8B75-4CC7-A997-5842EE3039F3}" presName="parTx" presStyleLbl="revTx" presStyleIdx="2" presStyleCnt="7">
         <dgm:presLayoutVars>
           <dgm:chMax val="0"/>
           <dgm:chPref val="0"/>
@@ -4572,11 +4534,11 @@
       <dgm:spPr/>
     </dgm:pt>
     <dgm:pt modelId="{45E74346-E9D5-418F-9DA5-2FE73F7A8A6B}" type="pres">
-      <dgm:prSet presAssocID="{7E54C747-3DE0-4A3E-B552-1435180E335C}" presName="bgRect" presStyleLbl="bgShp" presStyleIdx="3" presStyleCnt="8" custScaleY="205499" custLinFactNeighborX="0" custLinFactNeighborY="42398"/>
+      <dgm:prSet presAssocID="{7E54C747-3DE0-4A3E-B552-1435180E335C}" presName="bgRect" presStyleLbl="bgShp" presStyleIdx="3" presStyleCnt="7" custScaleY="205499" custLinFactNeighborX="0" custLinFactNeighborY="42398"/>
       <dgm:spPr/>
     </dgm:pt>
     <dgm:pt modelId="{58E54AAF-3FD7-46A5-8067-B0DF0868DBEA}" type="pres">
-      <dgm:prSet presAssocID="{7E54C747-3DE0-4A3E-B552-1435180E335C}" presName="iconRect" presStyleLbl="node1" presStyleIdx="3" presStyleCnt="8"/>
+      <dgm:prSet presAssocID="{7E54C747-3DE0-4A3E-B552-1435180E335C}" presName="iconRect" presStyleLbl="node1" presStyleIdx="3" presStyleCnt="7"/>
       <dgm:spPr/>
     </dgm:pt>
     <dgm:pt modelId="{2C08788C-7DC6-474F-82AB-FDEE025E2D0B}" type="pres">
@@ -4584,7 +4546,7 @@
       <dgm:spPr/>
     </dgm:pt>
     <dgm:pt modelId="{DFD96584-8BBA-4F7C-9C0E-EC8F6BA60DDA}" type="pres">
-      <dgm:prSet presAssocID="{7E54C747-3DE0-4A3E-B552-1435180E335C}" presName="parTx" presStyleLbl="revTx" presStyleIdx="3" presStyleCnt="8" custScaleX="103305" custScaleY="213831">
+      <dgm:prSet presAssocID="{7E54C747-3DE0-4A3E-B552-1435180E335C}" presName="parTx" presStyleLbl="revTx" presStyleIdx="3" presStyleCnt="7" custScaleX="103305" custScaleY="213831">
         <dgm:presLayoutVars>
           <dgm:chMax val="0"/>
           <dgm:chPref val="0"/>
@@ -4596,45 +4558,16 @@
       <dgm:prSet presAssocID="{579842BE-0208-49A2-9236-249FFFCE5DF3}" presName="sibTrans" presStyleCnt="0"/>
       <dgm:spPr/>
     </dgm:pt>
-    <dgm:pt modelId="{19FC4476-5FA7-4E82-8DD4-1E68A7CF94F3}" type="pres">
-      <dgm:prSet presAssocID="{D67943B9-9288-478C-BAC8-2EC90FDA8EE8}" presName="compNode" presStyleCnt="0"/>
-      <dgm:spPr/>
-    </dgm:pt>
-    <dgm:pt modelId="{B21B12C1-A436-4945-A7B8-F795C926DF35}" type="pres">
-      <dgm:prSet presAssocID="{D67943B9-9288-478C-BAC8-2EC90FDA8EE8}" presName="bgRect" presStyleLbl="bgShp" presStyleIdx="4" presStyleCnt="8" custScaleY="84129"/>
-      <dgm:spPr/>
-    </dgm:pt>
-    <dgm:pt modelId="{0DA695FA-05C1-4A5E-8C0C-69938BF3FC46}" type="pres">
-      <dgm:prSet presAssocID="{D67943B9-9288-478C-BAC8-2EC90FDA8EE8}" presName="iconRect" presStyleLbl="node1" presStyleIdx="4" presStyleCnt="8"/>
-      <dgm:spPr/>
-    </dgm:pt>
-    <dgm:pt modelId="{CC48E89B-D20C-4A94-85CA-A79BC0CA0D21}" type="pres">
-      <dgm:prSet presAssocID="{D67943B9-9288-478C-BAC8-2EC90FDA8EE8}" presName="spaceRect" presStyleCnt="0"/>
-      <dgm:spPr/>
-    </dgm:pt>
-    <dgm:pt modelId="{3ACB8E52-3D67-4D9D-875B-7B9BC5839DB7}" type="pres">
-      <dgm:prSet presAssocID="{D67943B9-9288-478C-BAC8-2EC90FDA8EE8}" presName="parTx" presStyleLbl="revTx" presStyleIdx="4" presStyleCnt="8">
-        <dgm:presLayoutVars>
-          <dgm:chMax val="0"/>
-          <dgm:chPref val="0"/>
-        </dgm:presLayoutVars>
-      </dgm:prSet>
-      <dgm:spPr/>
-    </dgm:pt>
-    <dgm:pt modelId="{3A4D3D1F-BF32-4A8A-9A0F-4A81AC657438}" type="pres">
-      <dgm:prSet presAssocID="{59E3D9B6-2955-4D2D-BFFA-785010048A67}" presName="sibTrans" presStyleCnt="0"/>
-      <dgm:spPr/>
-    </dgm:pt>
     <dgm:pt modelId="{9680A8A9-BA6F-406E-90C5-4FC3F21BE3C3}" type="pres">
       <dgm:prSet presAssocID="{0F96D351-01C7-48B9-AB4C-B77360C7B84A}" presName="compNode" presStyleCnt="0"/>
       <dgm:spPr/>
     </dgm:pt>
     <dgm:pt modelId="{F0075E7C-73BA-454F-B59A-FA750A974D20}" type="pres">
-      <dgm:prSet presAssocID="{0F96D351-01C7-48B9-AB4C-B77360C7B84A}" presName="bgRect" presStyleLbl="bgShp" presStyleIdx="5" presStyleCnt="8" custLinFactNeighborX="66569" custLinFactNeighborY="46055"/>
+      <dgm:prSet presAssocID="{0F96D351-01C7-48B9-AB4C-B77360C7B84A}" presName="bgRect" presStyleLbl="bgShp" presStyleIdx="4" presStyleCnt="7" custLinFactNeighborX="66569" custLinFactNeighborY="46055"/>
       <dgm:spPr/>
     </dgm:pt>
     <dgm:pt modelId="{F13BB237-87EB-4346-82F5-3B7696F5448F}" type="pres">
-      <dgm:prSet presAssocID="{0F96D351-01C7-48B9-AB4C-B77360C7B84A}" presName="iconRect" presStyleLbl="node1" presStyleIdx="5" presStyleCnt="8"/>
+      <dgm:prSet presAssocID="{0F96D351-01C7-48B9-AB4C-B77360C7B84A}" presName="iconRect" presStyleLbl="node1" presStyleIdx="4" presStyleCnt="7"/>
       <dgm:spPr>
         <a:blipFill>
           <a:blip xmlns:r="http://schemas.openxmlformats.org/officeDocument/2006/relationships" r:embed="rId8">
@@ -4663,7 +4596,7 @@
       <dgm:spPr/>
     </dgm:pt>
     <dgm:pt modelId="{50220493-80AC-4268-9B52-EDF674FCC6D7}" type="pres">
-      <dgm:prSet presAssocID="{0F96D351-01C7-48B9-AB4C-B77360C7B84A}" presName="parTx" presStyleLbl="revTx" presStyleIdx="5" presStyleCnt="8">
+      <dgm:prSet presAssocID="{0F96D351-01C7-48B9-AB4C-B77360C7B84A}" presName="parTx" presStyleLbl="revTx" presStyleIdx="4" presStyleCnt="7">
         <dgm:presLayoutVars>
           <dgm:chMax val="0"/>
           <dgm:chPref val="0"/>
@@ -4680,11 +4613,11 @@
       <dgm:spPr/>
     </dgm:pt>
     <dgm:pt modelId="{C2DF2B10-815A-4EF5-AC32-D5EF4742BEDA}" type="pres">
-      <dgm:prSet presAssocID="{750E050B-AFC9-4D78-ADF0-8D9C732E4518}" presName="bgRect" presStyleLbl="bgShp" presStyleIdx="6" presStyleCnt="8"/>
+      <dgm:prSet presAssocID="{750E050B-AFC9-4D78-ADF0-8D9C732E4518}" presName="bgRect" presStyleLbl="bgShp" presStyleIdx="5" presStyleCnt="7"/>
       <dgm:spPr/>
     </dgm:pt>
     <dgm:pt modelId="{64133F2F-B75E-4B2F-A1FC-058C2AF92E7C}" type="pres">
-      <dgm:prSet presAssocID="{750E050B-AFC9-4D78-ADF0-8D9C732E4518}" presName="iconRect" presStyleLbl="node1" presStyleIdx="6" presStyleCnt="8"/>
+      <dgm:prSet presAssocID="{750E050B-AFC9-4D78-ADF0-8D9C732E4518}" presName="iconRect" presStyleLbl="node1" presStyleIdx="5" presStyleCnt="7"/>
       <dgm:spPr>
         <a:blipFill>
           <a:blip xmlns:r="http://schemas.openxmlformats.org/officeDocument/2006/relationships" r:embed="rId10">
@@ -4713,7 +4646,7 @@
       <dgm:spPr/>
     </dgm:pt>
     <dgm:pt modelId="{6C14DBC8-1152-4BB9-A97F-6453CD3CA6CF}" type="pres">
-      <dgm:prSet presAssocID="{750E050B-AFC9-4D78-ADF0-8D9C732E4518}" presName="parTx" presStyleLbl="revTx" presStyleIdx="6" presStyleCnt="8">
+      <dgm:prSet presAssocID="{750E050B-AFC9-4D78-ADF0-8D9C732E4518}" presName="parTx" presStyleLbl="revTx" presStyleIdx="5" presStyleCnt="7">
         <dgm:presLayoutVars>
           <dgm:chMax val="0"/>
           <dgm:chPref val="0"/>
@@ -4730,11 +4663,11 @@
       <dgm:spPr/>
     </dgm:pt>
     <dgm:pt modelId="{25CEC266-C6C3-456A-9869-47E25FCD6DAD}" type="pres">
-      <dgm:prSet presAssocID="{D2EB1AD8-36C5-4432-A593-2E2F5E6390E9}" presName="bgRect" presStyleLbl="bgShp" presStyleIdx="7" presStyleCnt="8" custLinFactNeighborX="-5818" custLinFactNeighborY="12915"/>
+      <dgm:prSet presAssocID="{D2EB1AD8-36C5-4432-A593-2E2F5E6390E9}" presName="bgRect" presStyleLbl="bgShp" presStyleIdx="6" presStyleCnt="7" custLinFactNeighborX="-5818" custLinFactNeighborY="12915"/>
       <dgm:spPr/>
     </dgm:pt>
     <dgm:pt modelId="{A29DBDA7-506C-4F35-9288-30E5C24B6284}" type="pres">
-      <dgm:prSet presAssocID="{D2EB1AD8-36C5-4432-A593-2E2F5E6390E9}" presName="iconRect" presStyleLbl="node1" presStyleIdx="7" presStyleCnt="8"/>
+      <dgm:prSet presAssocID="{D2EB1AD8-36C5-4432-A593-2E2F5E6390E9}" presName="iconRect" presStyleLbl="node1" presStyleIdx="6" presStyleCnt="7"/>
       <dgm:spPr>
         <a:blipFill>
           <a:blip xmlns:r="http://schemas.openxmlformats.org/officeDocument/2006/relationships" r:embed="rId12">
@@ -4763,7 +4696,7 @@
       <dgm:spPr/>
     </dgm:pt>
     <dgm:pt modelId="{158BA7BB-CBC8-4CA5-8B67-45111751898D}" type="pres">
-      <dgm:prSet presAssocID="{D2EB1AD8-36C5-4432-A593-2E2F5E6390E9}" presName="parTx" presStyleLbl="revTx" presStyleIdx="7" presStyleCnt="8">
+      <dgm:prSet presAssocID="{D2EB1AD8-36C5-4432-A593-2E2F5E6390E9}" presName="parTx" presStyleLbl="revTx" presStyleIdx="6" presStyleCnt="7">
         <dgm:presLayoutVars>
           <dgm:chMax val="0"/>
           <dgm:chPref val="0"/>
@@ -4773,10 +4706,10 @@
     </dgm:pt>
   </dgm:ptLst>
   <dgm:cxnLst>
-    <dgm:cxn modelId="{F5EE5601-8ED4-4B6F-A89B-E87F7F55F2E3}" srcId="{BE027591-71A5-4FEA-A186-01959D094141}" destId="{750E050B-AFC9-4D78-ADF0-8D9C732E4518}" srcOrd="6" destOrd="0" parTransId="{8A1477DE-0C22-44DB-B50B-68860AAFBE39}" sibTransId="{6FE55CC8-756E-44CE-92C5-ADFA66A6BB63}"/>
+    <dgm:cxn modelId="{F5EE5601-8ED4-4B6F-A89B-E87F7F55F2E3}" srcId="{BE027591-71A5-4FEA-A186-01959D094141}" destId="{750E050B-AFC9-4D78-ADF0-8D9C732E4518}" srcOrd="5" destOrd="0" parTransId="{8A1477DE-0C22-44DB-B50B-68860AAFBE39}" sibTransId="{6FE55CC8-756E-44CE-92C5-ADFA66A6BB63}"/>
     <dgm:cxn modelId="{E43B4D08-D30F-437B-9407-2E21FE9A4494}" srcId="{BE027591-71A5-4FEA-A186-01959D094141}" destId="{C7E9F372-8B75-4CC7-A997-5842EE3039F3}" srcOrd="2" destOrd="0" parTransId="{2A765101-E2DD-41DE-ACB7-608AAD53C2C6}" sibTransId="{6BEE15A0-7D9B-4C83-B0A8-CF2157F49F07}"/>
     <dgm:cxn modelId="{D546F10C-F9B1-41D0-9443-122731C15A66}" srcId="{BE027591-71A5-4FEA-A186-01959D094141}" destId="{AC2A012C-0413-426A-9006-AE82A199EE1F}" srcOrd="1" destOrd="0" parTransId="{3C086C8D-65B7-47D4-8868-0E915ED9C2FE}" sibTransId="{E6D68588-5578-4B2C-A904-64516461183D}"/>
-    <dgm:cxn modelId="{F7F09614-2E76-4E28-B40C-BD65FD2A71A2}" srcId="{BE027591-71A5-4FEA-A186-01959D094141}" destId="{0F96D351-01C7-48B9-AB4C-B77360C7B84A}" srcOrd="5" destOrd="0" parTransId="{DE528BFA-D7EE-4737-BFE2-EFCCBA98B99C}" sibTransId="{007D1F86-8EA3-4135-9025-BFD3821D05E1}"/>
+    <dgm:cxn modelId="{F7F09614-2E76-4E28-B40C-BD65FD2A71A2}" srcId="{BE027591-71A5-4FEA-A186-01959D094141}" destId="{0F96D351-01C7-48B9-AB4C-B77360C7B84A}" srcOrd="4" destOrd="0" parTransId="{DE528BFA-D7EE-4737-BFE2-EFCCBA98B99C}" sibTransId="{007D1F86-8EA3-4135-9025-BFD3821D05E1}"/>
     <dgm:cxn modelId="{C62DAA2F-292E-49FE-9385-AC8C12532494}" type="presOf" srcId="{AC2A012C-0413-426A-9006-AE82A199EE1F}" destId="{258E9943-732D-45E6-B34C-1DED30B63188}" srcOrd="0" destOrd="0" presId="urn:microsoft.com/office/officeart/2018/2/layout/IconVerticalSolidList"/>
     <dgm:cxn modelId="{64F7AD3F-1FB0-4079-94AB-8728F4B5E1B2}" type="presOf" srcId="{5DBE6E11-A766-4F0F-AD95-50751BE2D84D}" destId="{019BBF64-DBB8-4151-834D-5B350D40F2A2}" srcOrd="0" destOrd="0" presId="urn:microsoft.com/office/officeart/2018/2/layout/IconVerticalSolidList"/>
     <dgm:cxn modelId="{D3CA1862-1BA3-4A98-8AC1-F417BB7E65AE}" srcId="{BE027591-71A5-4FEA-A186-01959D094141}" destId="{7E54C747-3DE0-4A3E-B552-1435180E335C}" srcOrd="3" destOrd="0" parTransId="{5834263A-D304-4709-A4F8-A02E72963DFE}" sibTransId="{579842BE-0208-49A2-9236-249FFFCE5DF3}"/>
@@ -4786,10 +4719,8 @@
     <dgm:cxn modelId="{D26ED478-6F9E-4844-A854-7DA7C606782A}" type="presOf" srcId="{7E54C747-3DE0-4A3E-B552-1435180E335C}" destId="{DFD96584-8BBA-4F7C-9C0E-EC8F6BA60DDA}" srcOrd="0" destOrd="0" presId="urn:microsoft.com/office/officeart/2018/2/layout/IconVerticalSolidList"/>
     <dgm:cxn modelId="{6D6C558F-2CEF-4938-8B68-65FC439A5912}" type="presOf" srcId="{0F96D351-01C7-48B9-AB4C-B77360C7B84A}" destId="{50220493-80AC-4268-9B52-EDF674FCC6D7}" srcOrd="0" destOrd="0" presId="urn:microsoft.com/office/officeart/2018/2/layout/IconVerticalSolidList"/>
     <dgm:cxn modelId="{617FAE9D-611D-4A51-A2EE-3909C03F466F}" type="presOf" srcId="{C7E9F372-8B75-4CC7-A997-5842EE3039F3}" destId="{E3710687-40E0-47D6-92C2-1FF91C9C6957}" srcOrd="0" destOrd="0" presId="urn:microsoft.com/office/officeart/2018/2/layout/IconVerticalSolidList"/>
-    <dgm:cxn modelId="{62674BAB-AEB4-4EF8-9DEF-191D8E02E0DE}" type="presOf" srcId="{D67943B9-9288-478C-BAC8-2EC90FDA8EE8}" destId="{3ACB8E52-3D67-4D9D-875B-7B9BC5839DB7}" srcOrd="0" destOrd="0" presId="urn:microsoft.com/office/officeart/2018/2/layout/IconVerticalSolidList"/>
-    <dgm:cxn modelId="{8AE6DBBB-7972-4CC5-BF88-8A4D54FC3A0D}" srcId="{BE027591-71A5-4FEA-A186-01959D094141}" destId="{D2EB1AD8-36C5-4432-A593-2E2F5E6390E9}" srcOrd="7" destOrd="0" parTransId="{EEA8550B-EBD5-4733-B090-2EFB750AAF4D}" sibTransId="{95DF1AAD-B2F9-472B-A54A-530B242B59D5}"/>
+    <dgm:cxn modelId="{8AE6DBBB-7972-4CC5-BF88-8A4D54FC3A0D}" srcId="{BE027591-71A5-4FEA-A186-01959D094141}" destId="{D2EB1AD8-36C5-4432-A593-2E2F5E6390E9}" srcOrd="6" destOrd="0" parTransId="{EEA8550B-EBD5-4733-B090-2EFB750AAF4D}" sibTransId="{95DF1AAD-B2F9-472B-A54A-530B242B59D5}"/>
     <dgm:cxn modelId="{E485F6F4-26C0-41B6-B1CE-0F6609680C4A}" type="presOf" srcId="{750E050B-AFC9-4D78-ADF0-8D9C732E4518}" destId="{6C14DBC8-1152-4BB9-A97F-6453CD3CA6CF}" srcOrd="0" destOrd="0" presId="urn:microsoft.com/office/officeart/2018/2/layout/IconVerticalSolidList"/>
-    <dgm:cxn modelId="{948EBFFE-F49F-407A-8E0E-D2C560E2E042}" srcId="{BE027591-71A5-4FEA-A186-01959D094141}" destId="{D67943B9-9288-478C-BAC8-2EC90FDA8EE8}" srcOrd="4" destOrd="0" parTransId="{31EF91C0-F777-4DC7-8371-86CEDF123819}" sibTransId="{59E3D9B6-2955-4D2D-BFFA-785010048A67}"/>
     <dgm:cxn modelId="{CD0A4CCD-83F7-4549-A8A1-643A9BC70E20}" type="presParOf" srcId="{389A2C24-8E70-4FA1-9548-96FAD26428E4}" destId="{791D5EBC-F9F0-41A6-BBBE-FD6C63854888}" srcOrd="0" destOrd="0" presId="urn:microsoft.com/office/officeart/2018/2/layout/IconVerticalSolidList"/>
     <dgm:cxn modelId="{49648D35-2263-47C8-91E6-B09F4BF27B81}" type="presParOf" srcId="{791D5EBC-F9F0-41A6-BBBE-FD6C63854888}" destId="{784AA4E4-3C60-458B-B099-3A9978BA15A4}" srcOrd="0" destOrd="0" presId="urn:microsoft.com/office/officeart/2018/2/layout/IconVerticalSolidList"/>
     <dgm:cxn modelId="{4EAD343E-9E2B-4200-8E15-F75716850C0A}" type="presParOf" srcId="{791D5EBC-F9F0-41A6-BBBE-FD6C63854888}" destId="{BBFF6DD5-2B4B-4582-AB77-3BB375791746}" srcOrd="1" destOrd="0" presId="urn:microsoft.com/office/officeart/2018/2/layout/IconVerticalSolidList"/>
@@ -4814,25 +4745,19 @@
     <dgm:cxn modelId="{B37E37B3-7CAE-4476-B4DB-6591202767B0}" type="presParOf" srcId="{8D39264C-856B-408F-8CC4-9CDCD74D89E6}" destId="{2C08788C-7DC6-474F-82AB-FDEE025E2D0B}" srcOrd="2" destOrd="0" presId="urn:microsoft.com/office/officeart/2018/2/layout/IconVerticalSolidList"/>
     <dgm:cxn modelId="{3D2EB7F9-85B5-4EC4-98F6-2ABC85A2116A}" type="presParOf" srcId="{8D39264C-856B-408F-8CC4-9CDCD74D89E6}" destId="{DFD96584-8BBA-4F7C-9C0E-EC8F6BA60DDA}" srcOrd="3" destOrd="0" presId="urn:microsoft.com/office/officeart/2018/2/layout/IconVerticalSolidList"/>
     <dgm:cxn modelId="{C9A186A9-927E-4CA2-8737-E70CDA3C6023}" type="presParOf" srcId="{389A2C24-8E70-4FA1-9548-96FAD26428E4}" destId="{21680508-46DC-476B-A188-475555A5402B}" srcOrd="7" destOrd="0" presId="urn:microsoft.com/office/officeart/2018/2/layout/IconVerticalSolidList"/>
-    <dgm:cxn modelId="{DB925F3D-8DF1-4507-BAB8-68E74E3D0904}" type="presParOf" srcId="{389A2C24-8E70-4FA1-9548-96FAD26428E4}" destId="{19FC4476-5FA7-4E82-8DD4-1E68A7CF94F3}" srcOrd="8" destOrd="0" presId="urn:microsoft.com/office/officeart/2018/2/layout/IconVerticalSolidList"/>
-    <dgm:cxn modelId="{4489B644-8912-4F59-99A8-E581B5B12C5B}" type="presParOf" srcId="{19FC4476-5FA7-4E82-8DD4-1E68A7CF94F3}" destId="{B21B12C1-A436-4945-A7B8-F795C926DF35}" srcOrd="0" destOrd="0" presId="urn:microsoft.com/office/officeart/2018/2/layout/IconVerticalSolidList"/>
-    <dgm:cxn modelId="{7A5090F4-9421-4034-A035-AEA6E91CFDC8}" type="presParOf" srcId="{19FC4476-5FA7-4E82-8DD4-1E68A7CF94F3}" destId="{0DA695FA-05C1-4A5E-8C0C-69938BF3FC46}" srcOrd="1" destOrd="0" presId="urn:microsoft.com/office/officeart/2018/2/layout/IconVerticalSolidList"/>
-    <dgm:cxn modelId="{B41033D0-9D52-4EA3-BC56-F0AD4F8600C8}" type="presParOf" srcId="{19FC4476-5FA7-4E82-8DD4-1E68A7CF94F3}" destId="{CC48E89B-D20C-4A94-85CA-A79BC0CA0D21}" srcOrd="2" destOrd="0" presId="urn:microsoft.com/office/officeart/2018/2/layout/IconVerticalSolidList"/>
-    <dgm:cxn modelId="{2BE91D74-A7AB-4C20-A872-04274B416490}" type="presParOf" srcId="{19FC4476-5FA7-4E82-8DD4-1E68A7CF94F3}" destId="{3ACB8E52-3D67-4D9D-875B-7B9BC5839DB7}" srcOrd="3" destOrd="0" presId="urn:microsoft.com/office/officeart/2018/2/layout/IconVerticalSolidList"/>
-    <dgm:cxn modelId="{A8587FE4-0789-4222-A22D-878AE6ABF3D8}" type="presParOf" srcId="{389A2C24-8E70-4FA1-9548-96FAD26428E4}" destId="{3A4D3D1F-BF32-4A8A-9A0F-4A81AC657438}" srcOrd="9" destOrd="0" presId="urn:microsoft.com/office/officeart/2018/2/layout/IconVerticalSolidList"/>
-    <dgm:cxn modelId="{4C9E4B34-1DFD-4A04-9C6A-FED4A56F211B}" type="presParOf" srcId="{389A2C24-8E70-4FA1-9548-96FAD26428E4}" destId="{9680A8A9-BA6F-406E-90C5-4FC3F21BE3C3}" srcOrd="10" destOrd="0" presId="urn:microsoft.com/office/officeart/2018/2/layout/IconVerticalSolidList"/>
+    <dgm:cxn modelId="{4C9E4B34-1DFD-4A04-9C6A-FED4A56F211B}" type="presParOf" srcId="{389A2C24-8E70-4FA1-9548-96FAD26428E4}" destId="{9680A8A9-BA6F-406E-90C5-4FC3F21BE3C3}" srcOrd="8" destOrd="0" presId="urn:microsoft.com/office/officeart/2018/2/layout/IconVerticalSolidList"/>
     <dgm:cxn modelId="{9AC843FD-5544-4339-8563-2193E985EBE8}" type="presParOf" srcId="{9680A8A9-BA6F-406E-90C5-4FC3F21BE3C3}" destId="{F0075E7C-73BA-454F-B59A-FA750A974D20}" srcOrd="0" destOrd="0" presId="urn:microsoft.com/office/officeart/2018/2/layout/IconVerticalSolidList"/>
     <dgm:cxn modelId="{09C14F4B-9ADA-4A13-930A-BC5E9EF87060}" type="presParOf" srcId="{9680A8A9-BA6F-406E-90C5-4FC3F21BE3C3}" destId="{F13BB237-87EB-4346-82F5-3B7696F5448F}" srcOrd="1" destOrd="0" presId="urn:microsoft.com/office/officeart/2018/2/layout/IconVerticalSolidList"/>
     <dgm:cxn modelId="{D3FE677E-EBD1-4F11-98F0-C873814FBD24}" type="presParOf" srcId="{9680A8A9-BA6F-406E-90C5-4FC3F21BE3C3}" destId="{B7641A2A-474B-44EA-A48D-A1F1C44D89E5}" srcOrd="2" destOrd="0" presId="urn:microsoft.com/office/officeart/2018/2/layout/IconVerticalSolidList"/>
     <dgm:cxn modelId="{FA06A4F5-451F-49AE-8622-CCBB21BAD670}" type="presParOf" srcId="{9680A8A9-BA6F-406E-90C5-4FC3F21BE3C3}" destId="{50220493-80AC-4268-9B52-EDF674FCC6D7}" srcOrd="3" destOrd="0" presId="urn:microsoft.com/office/officeart/2018/2/layout/IconVerticalSolidList"/>
-    <dgm:cxn modelId="{3FAF3FC2-A76F-4959-B48C-64FFD9074CB5}" type="presParOf" srcId="{389A2C24-8E70-4FA1-9548-96FAD26428E4}" destId="{7B15AAE2-1ADC-49FE-A641-8B797581AE58}" srcOrd="11" destOrd="0" presId="urn:microsoft.com/office/officeart/2018/2/layout/IconVerticalSolidList"/>
-    <dgm:cxn modelId="{0235A073-64E4-4004-99DF-286E60615765}" type="presParOf" srcId="{389A2C24-8E70-4FA1-9548-96FAD26428E4}" destId="{9882DC38-B821-4F49-91BF-0AFC4705DEA3}" srcOrd="12" destOrd="0" presId="urn:microsoft.com/office/officeart/2018/2/layout/IconVerticalSolidList"/>
+    <dgm:cxn modelId="{3FAF3FC2-A76F-4959-B48C-64FFD9074CB5}" type="presParOf" srcId="{389A2C24-8E70-4FA1-9548-96FAD26428E4}" destId="{7B15AAE2-1ADC-49FE-A641-8B797581AE58}" srcOrd="9" destOrd="0" presId="urn:microsoft.com/office/officeart/2018/2/layout/IconVerticalSolidList"/>
+    <dgm:cxn modelId="{0235A073-64E4-4004-99DF-286E60615765}" type="presParOf" srcId="{389A2C24-8E70-4FA1-9548-96FAD26428E4}" destId="{9882DC38-B821-4F49-91BF-0AFC4705DEA3}" srcOrd="10" destOrd="0" presId="urn:microsoft.com/office/officeart/2018/2/layout/IconVerticalSolidList"/>
     <dgm:cxn modelId="{39A25571-3E01-4E4B-B42E-5876DFE02D50}" type="presParOf" srcId="{9882DC38-B821-4F49-91BF-0AFC4705DEA3}" destId="{C2DF2B10-815A-4EF5-AC32-D5EF4742BEDA}" srcOrd="0" destOrd="0" presId="urn:microsoft.com/office/officeart/2018/2/layout/IconVerticalSolidList"/>
     <dgm:cxn modelId="{16ADE288-C834-4457-8F78-52EE4B819D5B}" type="presParOf" srcId="{9882DC38-B821-4F49-91BF-0AFC4705DEA3}" destId="{64133F2F-B75E-4B2F-A1FC-058C2AF92E7C}" srcOrd="1" destOrd="0" presId="urn:microsoft.com/office/officeart/2018/2/layout/IconVerticalSolidList"/>
     <dgm:cxn modelId="{60CA2681-A1C2-4110-AC2F-0F67F22BA141}" type="presParOf" srcId="{9882DC38-B821-4F49-91BF-0AFC4705DEA3}" destId="{A0962831-CC55-43F4-B896-751A06A5CA72}" srcOrd="2" destOrd="0" presId="urn:microsoft.com/office/officeart/2018/2/layout/IconVerticalSolidList"/>
     <dgm:cxn modelId="{621D135F-45D6-4CC2-B4DD-C7507FEF54F6}" type="presParOf" srcId="{9882DC38-B821-4F49-91BF-0AFC4705DEA3}" destId="{6C14DBC8-1152-4BB9-A97F-6453CD3CA6CF}" srcOrd="3" destOrd="0" presId="urn:microsoft.com/office/officeart/2018/2/layout/IconVerticalSolidList"/>
-    <dgm:cxn modelId="{62627FA0-33CC-4126-B703-6B6E68BC1A8B}" type="presParOf" srcId="{389A2C24-8E70-4FA1-9548-96FAD26428E4}" destId="{877D17C7-CA4D-485D-A552-7C9BADC232E6}" srcOrd="13" destOrd="0" presId="urn:microsoft.com/office/officeart/2018/2/layout/IconVerticalSolidList"/>
-    <dgm:cxn modelId="{44153E30-1800-429C-A562-32063562A1B9}" type="presParOf" srcId="{389A2C24-8E70-4FA1-9548-96FAD26428E4}" destId="{561EEF66-5727-4CDD-84EA-F128AEED3BEC}" srcOrd="14" destOrd="0" presId="urn:microsoft.com/office/officeart/2018/2/layout/IconVerticalSolidList"/>
+    <dgm:cxn modelId="{62627FA0-33CC-4126-B703-6B6E68BC1A8B}" type="presParOf" srcId="{389A2C24-8E70-4FA1-9548-96FAD26428E4}" destId="{877D17C7-CA4D-485D-A552-7C9BADC232E6}" srcOrd="11" destOrd="0" presId="urn:microsoft.com/office/officeart/2018/2/layout/IconVerticalSolidList"/>
+    <dgm:cxn modelId="{44153E30-1800-429C-A562-32063562A1B9}" type="presParOf" srcId="{389A2C24-8E70-4FA1-9548-96FAD26428E4}" destId="{561EEF66-5727-4CDD-84EA-F128AEED3BEC}" srcOrd="12" destOrd="0" presId="urn:microsoft.com/office/officeart/2018/2/layout/IconVerticalSolidList"/>
     <dgm:cxn modelId="{14B045C7-D62B-4827-910E-4D33534A7E69}" type="presParOf" srcId="{561EEF66-5727-4CDD-84EA-F128AEED3BEC}" destId="{25CEC266-C6C3-456A-9869-47E25FCD6DAD}" srcOrd="0" destOrd="0" presId="urn:microsoft.com/office/officeart/2018/2/layout/IconVerticalSolidList"/>
     <dgm:cxn modelId="{50A3479C-28E2-42D6-A67D-33C21F97B02E}" type="presParOf" srcId="{561EEF66-5727-4CDD-84EA-F128AEED3BEC}" destId="{A29DBDA7-506C-4F35-9288-30E5C24B6284}" srcOrd="1" destOrd="0" presId="urn:microsoft.com/office/officeart/2018/2/layout/IconVerticalSolidList"/>
     <dgm:cxn modelId="{7FBF5CA7-FAD3-4041-81AB-FBA5E22A57D6}" type="presParOf" srcId="{561EEF66-5727-4CDD-84EA-F128AEED3BEC}" destId="{8794C71B-2B74-412A-8334-E34FEE5D6739}" srcOrd="2" destOrd="0" presId="urn:microsoft.com/office/officeart/2018/2/layout/IconVerticalSolidList"/>
@@ -6867,8 +6792,8 @@
       </dsp:nvSpPr>
       <dsp:spPr>
         <a:xfrm>
-          <a:off x="-48065" y="13162"/>
-          <a:ext cx="6513603" cy="538109"/>
+          <a:off x="-47311" y="9791"/>
+          <a:ext cx="6513603" cy="608596"/>
         </a:xfrm>
         <a:prstGeom prst="roundRect">
           <a:avLst>
@@ -6909,8 +6834,8 @@
       </dsp:nvSpPr>
       <dsp:spPr>
         <a:xfrm>
-          <a:off x="114712" y="134236"/>
-          <a:ext cx="295960" cy="295960"/>
+          <a:off x="136788" y="146726"/>
+          <a:ext cx="334728" cy="334728"/>
         </a:xfrm>
         <a:prstGeom prst="rect">
           <a:avLst/>
@@ -6967,8 +6892,8 @@
       </dsp:nvSpPr>
       <dsp:spPr>
         <a:xfrm>
-          <a:off x="573450" y="13162"/>
-          <a:ext cx="5890871" cy="538109"/>
+          <a:off x="655617" y="9791"/>
+          <a:ext cx="5809300" cy="608596"/>
         </a:xfrm>
         <a:prstGeom prst="rect">
           <a:avLst/>
@@ -6992,12 +6917,12 @@
         <a:fontRef idx="minor"/>
       </dsp:style>
       <dsp:txBody>
-        <a:bodyPr spcFirstLastPara="0" vert="horz" wrap="square" lIns="56950" tIns="56950" rIns="56950" bIns="56950" numCol="1" spcCol="1270" anchor="ctr" anchorCtr="0">
+        <a:bodyPr spcFirstLastPara="0" vert="horz" wrap="square" lIns="64410" tIns="64410" rIns="64410" bIns="64410" numCol="1" spcCol="1270" anchor="ctr" anchorCtr="0">
           <a:noAutofit/>
         </a:bodyPr>
         <a:lstStyle/>
         <a:p>
-          <a:pPr marL="0" lvl="0" indent="0" algn="l" defTabSz="622300">
+          <a:pPr marL="0" lvl="0" indent="0" algn="l" defTabSz="666750">
             <a:lnSpc>
               <a:spcPct val="100000"/>
             </a:lnSpc>
@@ -7010,14 +6935,14 @@
             <a:buNone/>
           </a:pPr>
           <a:r>
-            <a:rPr lang="en-US" sz="1400" kern="1200"/>
+            <a:rPr lang="en-US" sz="1500" kern="1200"/>
             <a:t>Database-MySql, JAWSdb</a:t>
           </a:r>
         </a:p>
       </dsp:txBody>
       <dsp:txXfrm>
-        <a:off x="573450" y="13162"/>
-        <a:ext cx="5890871" cy="538109"/>
+        <a:off x="655617" y="9791"/>
+        <a:ext cx="5809300" cy="608596"/>
       </dsp:txXfrm>
     </dsp:sp>
     <dsp:sp modelId="{1231876F-1B78-4BAA-B4A4-8E9BD9748F6D}">
@@ -7027,8 +6952,8 @@
       </dsp:nvSpPr>
       <dsp:spPr>
         <a:xfrm>
-          <a:off x="-48065" y="685798"/>
-          <a:ext cx="6513603" cy="538109"/>
+          <a:off x="-47311" y="770537"/>
+          <a:ext cx="6513603" cy="608596"/>
         </a:xfrm>
         <a:prstGeom prst="roundRect">
           <a:avLst>
@@ -7069,8 +6994,8 @@
       </dsp:nvSpPr>
       <dsp:spPr>
         <a:xfrm>
-          <a:off x="114712" y="806873"/>
-          <a:ext cx="295960" cy="295960"/>
+          <a:off x="136788" y="907471"/>
+          <a:ext cx="334728" cy="334728"/>
         </a:xfrm>
         <a:prstGeom prst="rect">
           <a:avLst/>
@@ -7127,8 +7052,8 @@
       </dsp:nvSpPr>
       <dsp:spPr>
         <a:xfrm>
-          <a:off x="573450" y="685798"/>
-          <a:ext cx="5890871" cy="538109"/>
+          <a:off x="655617" y="770537"/>
+          <a:ext cx="5809300" cy="608596"/>
         </a:xfrm>
         <a:prstGeom prst="rect">
           <a:avLst/>
@@ -7152,12 +7077,12 @@
         <a:fontRef idx="minor"/>
       </dsp:style>
       <dsp:txBody>
-        <a:bodyPr spcFirstLastPara="0" vert="horz" wrap="square" lIns="56950" tIns="56950" rIns="56950" bIns="56950" numCol="1" spcCol="1270" anchor="ctr" anchorCtr="0">
+        <a:bodyPr spcFirstLastPara="0" vert="horz" wrap="square" lIns="64410" tIns="64410" rIns="64410" bIns="64410" numCol="1" spcCol="1270" anchor="ctr" anchorCtr="0">
           <a:noAutofit/>
         </a:bodyPr>
         <a:lstStyle/>
         <a:p>
-          <a:pPr marL="0" lvl="0" indent="0" algn="l" defTabSz="622300">
+          <a:pPr marL="0" lvl="0" indent="0" algn="l" defTabSz="666750">
             <a:lnSpc>
               <a:spcPct val="100000"/>
             </a:lnSpc>
@@ -7170,14 +7095,14 @@
             <a:buNone/>
           </a:pPr>
           <a:r>
-            <a:rPr lang="en-US" sz="1400" kern="1200"/>
+            <a:rPr lang="en-US" sz="1500" kern="1200"/>
             <a:t>Web App-Flask-sqlalchemy, Heroku</a:t>
           </a:r>
         </a:p>
       </dsp:txBody>
       <dsp:txXfrm>
-        <a:off x="573450" y="685798"/>
-        <a:ext cx="5890871" cy="538109"/>
+        <a:off x="655617" y="770537"/>
+        <a:ext cx="5809300" cy="608596"/>
       </dsp:txXfrm>
     </dsp:sp>
     <dsp:sp modelId="{20BE625A-490A-43EB-8A8E-3C835D2D6F5F}">
@@ -7187,8 +7112,8 @@
       </dsp:nvSpPr>
       <dsp:spPr>
         <a:xfrm>
-          <a:off x="-48065" y="1358435"/>
-          <a:ext cx="6513603" cy="538109"/>
+          <a:off x="-47311" y="1531283"/>
+          <a:ext cx="6513603" cy="608596"/>
         </a:xfrm>
         <a:prstGeom prst="roundRect">
           <a:avLst>
@@ -7229,8 +7154,8 @@
       </dsp:nvSpPr>
       <dsp:spPr>
         <a:xfrm>
-          <a:off x="114712" y="1479510"/>
-          <a:ext cx="295960" cy="295960"/>
+          <a:off x="136788" y="1668217"/>
+          <a:ext cx="334728" cy="334728"/>
         </a:xfrm>
         <a:prstGeom prst="rect">
           <a:avLst/>
@@ -7287,8 +7212,8 @@
       </dsp:nvSpPr>
       <dsp:spPr>
         <a:xfrm>
-          <a:off x="573450" y="1358435"/>
-          <a:ext cx="5890871" cy="538109"/>
+          <a:off x="655617" y="1531283"/>
+          <a:ext cx="5809300" cy="608596"/>
         </a:xfrm>
         <a:prstGeom prst="rect">
           <a:avLst/>
@@ -7312,12 +7237,12 @@
         <a:fontRef idx="minor"/>
       </dsp:style>
       <dsp:txBody>
-        <a:bodyPr spcFirstLastPara="0" vert="horz" wrap="square" lIns="56950" tIns="56950" rIns="56950" bIns="56950" numCol="1" spcCol="1270" anchor="ctr" anchorCtr="0">
+        <a:bodyPr spcFirstLastPara="0" vert="horz" wrap="square" lIns="64410" tIns="64410" rIns="64410" bIns="64410" numCol="1" spcCol="1270" anchor="ctr" anchorCtr="0">
           <a:noAutofit/>
         </a:bodyPr>
         <a:lstStyle/>
         <a:p>
-          <a:pPr marL="0" lvl="0" indent="0" algn="l" defTabSz="622300">
+          <a:pPr marL="0" lvl="0" indent="0" algn="l" defTabSz="666750">
             <a:lnSpc>
               <a:spcPct val="100000"/>
             </a:lnSpc>
@@ -7330,34 +7255,34 @@
             <a:buNone/>
           </a:pPr>
           <a:r>
-            <a:rPr lang="en-US" sz="1400" kern="1200" dirty="0" err="1"/>
+            <a:rPr lang="en-US" sz="1500" kern="1200" dirty="0" err="1"/>
             <a:t>FrontEnd</a:t>
           </a:r>
           <a:r>
-            <a:rPr lang="en-US" sz="1400" kern="1200" dirty="0"/>
+            <a:rPr lang="en-US" sz="1500" kern="1200" dirty="0"/>
             <a:t>-HTML, </a:t>
           </a:r>
           <a:r>
-            <a:rPr lang="en-US" sz="1400" kern="1200" dirty="0" err="1"/>
+            <a:rPr lang="en-US" sz="1500" kern="1200" dirty="0" err="1"/>
             <a:t>Javascript</a:t>
           </a:r>
           <a:r>
-            <a:rPr lang="en-US" sz="1400" kern="1200" dirty="0"/>
+            <a:rPr lang="en-US" sz="1500" kern="1200" dirty="0"/>
             <a:t>, Jinja, D3, </a:t>
           </a:r>
           <a:r>
-            <a:rPr lang="en-US" sz="1400" kern="1200" dirty="0" err="1"/>
+            <a:rPr lang="en-US" sz="1500" kern="1200" dirty="0" err="1"/>
             <a:t>Plotly</a:t>
           </a:r>
           <a:r>
-            <a:rPr lang="en-US" sz="1400" kern="1200" dirty="0"/>
+            <a:rPr lang="en-US" sz="1500" kern="1200" dirty="0"/>
             <a:t>, CSS</a:t>
           </a:r>
         </a:p>
       </dsp:txBody>
       <dsp:txXfrm>
-        <a:off x="573450" y="1358435"/>
-        <a:ext cx="5890871" cy="538109"/>
+        <a:off x="655617" y="1531283"/>
+        <a:ext cx="5809300" cy="608596"/>
       </dsp:txXfrm>
     </dsp:sp>
     <dsp:sp modelId="{45E74346-E9D5-418F-9DA5-2FE73F7A8A6B}">
@@ -7367,8 +7292,8 @@
       </dsp:nvSpPr>
       <dsp:spPr>
         <a:xfrm>
-          <a:off x="-48065" y="2281637"/>
-          <a:ext cx="6513603" cy="1105809"/>
+          <a:off x="-47311" y="2575415"/>
+          <a:ext cx="6513603" cy="1250659"/>
         </a:xfrm>
         <a:prstGeom prst="roundRect">
           <a:avLst>
@@ -7409,17 +7334,17 @@
       </dsp:nvSpPr>
       <dsp:spPr>
         <a:xfrm>
-          <a:off x="114712" y="2458414"/>
-          <a:ext cx="295960" cy="295960"/>
+          <a:off x="136788" y="2775348"/>
+          <a:ext cx="334728" cy="334728"/>
         </a:xfrm>
         <a:prstGeom prst="rect">
           <a:avLst/>
         </a:prstGeom>
         <a:solidFill>
           <a:schemeClr val="accent5">
-            <a:hueOff val="-2896518"/>
-            <a:satOff val="-7465"/>
-            <a:lumOff val="-5042"/>
+            <a:hueOff val="-3379271"/>
+            <a:satOff val="-8710"/>
+            <a:lumOff val="-5883"/>
             <a:alphaOff val="0"/>
           </a:schemeClr>
         </a:solidFill>
@@ -7460,8 +7385,8 @@
       </dsp:nvSpPr>
       <dsp:spPr>
         <a:xfrm>
-          <a:off x="476104" y="2031072"/>
-          <a:ext cx="6085565" cy="1150644"/>
+          <a:off x="559618" y="2292028"/>
+          <a:ext cx="6001297" cy="1301368"/>
         </a:xfrm>
         <a:prstGeom prst="rect">
           <a:avLst/>
@@ -7485,12 +7410,12 @@
         <a:fontRef idx="minor"/>
       </dsp:style>
       <dsp:txBody>
-        <a:bodyPr spcFirstLastPara="0" vert="horz" wrap="square" lIns="56950" tIns="56950" rIns="56950" bIns="56950" numCol="1" spcCol="1270" anchor="ctr" anchorCtr="0">
+        <a:bodyPr spcFirstLastPara="0" vert="horz" wrap="square" lIns="64410" tIns="64410" rIns="64410" bIns="64410" numCol="1" spcCol="1270" anchor="ctr" anchorCtr="0">
           <a:noAutofit/>
         </a:bodyPr>
         <a:lstStyle/>
         <a:p>
-          <a:pPr marL="0" lvl="0" indent="0" algn="l" defTabSz="622300">
+          <a:pPr marL="0" lvl="0" indent="0" algn="l" defTabSz="666750">
             <a:lnSpc>
               <a:spcPct val="100000"/>
             </a:lnSpc>
@@ -7503,164 +7428,14 @@
             <a:buNone/>
           </a:pPr>
           <a:r>
-            <a:rPr lang="en-US" sz="1400" kern="1200" dirty="0"/>
+            <a:rPr lang="en-US" sz="1500" kern="1200" dirty="0"/>
             <a:t>Machine Learning models used: K-Means, hill climbing algorithm, NLP , cosine similarity</a:t>
           </a:r>
         </a:p>
       </dsp:txBody>
       <dsp:txXfrm>
-        <a:off x="476104" y="2031072"/>
-        <a:ext cx="6085565" cy="1150644"/>
-      </dsp:txXfrm>
-    </dsp:sp>
-    <dsp:sp modelId="{B21B12C1-A436-4945-A7B8-F795C926DF35}">
-      <dsp:nvSpPr>
-        <dsp:cNvPr id="0" name=""/>
-        <dsp:cNvSpPr/>
-      </dsp:nvSpPr>
-      <dsp:spPr>
-        <a:xfrm>
-          <a:off x="-48065" y="3352239"/>
-          <a:ext cx="6513603" cy="381602"/>
-        </a:xfrm>
-        <a:prstGeom prst="roundRect">
-          <a:avLst>
-            <a:gd name="adj" fmla="val 10000"/>
-          </a:avLst>
-        </a:prstGeom>
-        <a:solidFill>
-          <a:schemeClr val="bg1">
-            <a:lumMod val="95000"/>
-            <a:hueOff val="0"/>
-            <a:satOff val="0"/>
-            <a:lumOff val="0"/>
-            <a:alphaOff val="0"/>
-          </a:schemeClr>
-        </a:solidFill>
-        <a:ln>
-          <a:noFill/>
-        </a:ln>
-        <a:effectLst/>
-      </dsp:spPr>
-      <dsp:style>
-        <a:lnRef idx="0">
-          <a:scrgbClr r="0" g="0" b="0"/>
-        </a:lnRef>
-        <a:fillRef idx="1">
-          <a:scrgbClr r="0" g="0" b="0"/>
-        </a:fillRef>
-        <a:effectRef idx="0">
-          <a:scrgbClr r="0" g="0" b="0"/>
-        </a:effectRef>
-        <a:fontRef idx="minor"/>
-      </dsp:style>
-    </dsp:sp>
-    <dsp:sp modelId="{0DA695FA-05C1-4A5E-8C0C-69938BF3FC46}">
-      <dsp:nvSpPr>
-        <dsp:cNvPr id="0" name=""/>
-        <dsp:cNvSpPr/>
-      </dsp:nvSpPr>
-      <dsp:spPr>
-        <a:xfrm>
-          <a:off x="114712" y="3395060"/>
-          <a:ext cx="295960" cy="295960"/>
-        </a:xfrm>
-        <a:prstGeom prst="rect">
-          <a:avLst/>
-        </a:prstGeom>
-        <a:solidFill>
-          <a:schemeClr val="accent5">
-            <a:hueOff val="-3862025"/>
-            <a:satOff val="-9954"/>
-            <a:lumOff val="-6723"/>
-            <a:alphaOff val="0"/>
-          </a:schemeClr>
-        </a:solidFill>
-        <a:ln w="19050" cap="flat" cmpd="sng" algn="ctr">
-          <a:solidFill>
-            <a:schemeClr val="lt1">
-              <a:alpha val="0"/>
-              <a:hueOff val="0"/>
-              <a:satOff val="0"/>
-              <a:lumOff val="0"/>
-              <a:alphaOff val="0"/>
-            </a:schemeClr>
-          </a:solidFill>
-          <a:prstDash val="solid"/>
-          <a:miter lim="800000"/>
-        </a:ln>
-        <a:effectLst/>
-      </dsp:spPr>
-      <dsp:style>
-        <a:lnRef idx="3">
-          <a:scrgbClr r="0" g="0" b="0"/>
-        </a:lnRef>
-        <a:fillRef idx="1">
-          <a:scrgbClr r="0" g="0" b="0"/>
-        </a:fillRef>
-        <a:effectRef idx="1">
-          <a:scrgbClr r="0" g="0" b="0"/>
-        </a:effectRef>
-        <a:fontRef idx="minor">
-          <a:schemeClr val="lt1"/>
-        </a:fontRef>
-      </dsp:style>
-    </dsp:sp>
-    <dsp:sp modelId="{3ACB8E52-3D67-4D9D-875B-7B9BC5839DB7}">
-      <dsp:nvSpPr>
-        <dsp:cNvPr id="0" name=""/>
-        <dsp:cNvSpPr/>
-      </dsp:nvSpPr>
-      <dsp:spPr>
-        <a:xfrm>
-          <a:off x="573450" y="3316244"/>
-          <a:ext cx="5890871" cy="538109"/>
-        </a:xfrm>
-        <a:prstGeom prst="rect">
-          <a:avLst/>
-        </a:prstGeom>
-        <a:noFill/>
-        <a:ln>
-          <a:noFill/>
-        </a:ln>
-        <a:effectLst/>
-      </dsp:spPr>
-      <dsp:style>
-        <a:lnRef idx="0">
-          <a:scrgbClr r="0" g="0" b="0"/>
-        </a:lnRef>
-        <a:fillRef idx="0">
-          <a:scrgbClr r="0" g="0" b="0"/>
-        </a:fillRef>
-        <a:effectRef idx="0">
-          <a:scrgbClr r="0" g="0" b="0"/>
-        </a:effectRef>
-        <a:fontRef idx="minor"/>
-      </dsp:style>
-      <dsp:txBody>
-        <a:bodyPr spcFirstLastPara="0" vert="horz" wrap="square" lIns="56950" tIns="56950" rIns="56950" bIns="56950" numCol="1" spcCol="1270" anchor="ctr" anchorCtr="0">
-          <a:noAutofit/>
-        </a:bodyPr>
-        <a:lstStyle/>
-        <a:p>
-          <a:pPr marL="0" lvl="0" indent="0" algn="l" defTabSz="622300">
-            <a:lnSpc>
-              <a:spcPct val="100000"/>
-            </a:lnSpc>
-            <a:spcBef>
-              <a:spcPct val="0"/>
-            </a:spcBef>
-            <a:spcAft>
-              <a:spcPct val="35000"/>
-            </a:spcAft>
-            <a:buNone/>
-          </a:pPr>
-          <a:endParaRPr lang="en-US" sz="1400" kern="1200" dirty="0"/>
-        </a:p>
-      </dsp:txBody>
-      <dsp:txXfrm>
-        <a:off x="573450" y="3316244"/>
-        <a:ext cx="5890871" cy="538109"/>
+        <a:off x="559618" y="2292028"/>
+        <a:ext cx="6001297" cy="1301368"/>
       </dsp:txXfrm>
     </dsp:sp>
     <dsp:sp modelId="{F0075E7C-73BA-454F-B59A-FA750A974D20}">
@@ -7670,8 +7445,8 @@
       </dsp:nvSpPr>
       <dsp:spPr>
         <a:xfrm>
-          <a:off x="0" y="4236707"/>
-          <a:ext cx="6513603" cy="538109"/>
+          <a:off x="0" y="4025835"/>
+          <a:ext cx="6513603" cy="608596"/>
         </a:xfrm>
         <a:prstGeom prst="roundRect">
           <a:avLst>
@@ -7712,8 +7487,8 @@
       </dsp:nvSpPr>
       <dsp:spPr>
         <a:xfrm>
-          <a:off x="114712" y="4109955"/>
-          <a:ext cx="295960" cy="295960"/>
+          <a:off x="136788" y="3882480"/>
+          <a:ext cx="334728" cy="334728"/>
         </a:xfrm>
         <a:prstGeom prst="rect">
           <a:avLst/>
@@ -7770,8 +7545,8 @@
       </dsp:nvSpPr>
       <dsp:spPr>
         <a:xfrm>
-          <a:off x="573450" y="3988881"/>
-          <a:ext cx="5890871" cy="538109"/>
+          <a:off x="655617" y="3745546"/>
+          <a:ext cx="5809300" cy="608596"/>
         </a:xfrm>
         <a:prstGeom prst="rect">
           <a:avLst/>
@@ -7795,12 +7570,12 @@
         <a:fontRef idx="minor"/>
       </dsp:style>
       <dsp:txBody>
-        <a:bodyPr spcFirstLastPara="0" vert="horz" wrap="square" lIns="56950" tIns="56950" rIns="56950" bIns="56950" numCol="1" spcCol="1270" anchor="ctr" anchorCtr="0">
+        <a:bodyPr spcFirstLastPara="0" vert="horz" wrap="square" lIns="64410" tIns="64410" rIns="64410" bIns="64410" numCol="1" spcCol="1270" anchor="ctr" anchorCtr="0">
           <a:noAutofit/>
         </a:bodyPr>
         <a:lstStyle/>
         <a:p>
-          <a:pPr marL="0" lvl="0" indent="0" algn="l" defTabSz="622300">
+          <a:pPr marL="0" lvl="0" indent="0" algn="l" defTabSz="666750">
             <a:lnSpc>
               <a:spcPct val="100000"/>
             </a:lnSpc>
@@ -7813,14 +7588,14 @@
             <a:buNone/>
           </a:pPr>
           <a:r>
-            <a:rPr lang="en-US" sz="1400" kern="1200" dirty="0"/>
+            <a:rPr lang="en-US" sz="1500" kern="1200" dirty="0"/>
             <a:t>Backend-Python</a:t>
           </a:r>
         </a:p>
       </dsp:txBody>
       <dsp:txXfrm>
-        <a:off x="573450" y="3988881"/>
-        <a:ext cx="5890871" cy="538109"/>
+        <a:off x="655617" y="3745546"/>
+        <a:ext cx="5809300" cy="608596"/>
       </dsp:txXfrm>
     </dsp:sp>
     <dsp:sp modelId="{C2DF2B10-815A-4EF5-AC32-D5EF4742BEDA}">
@@ -7830,8 +7605,8 @@
       </dsp:nvSpPr>
       <dsp:spPr>
         <a:xfrm>
-          <a:off x="-48065" y="4661517"/>
-          <a:ext cx="6513603" cy="538109"/>
+          <a:off x="-47311" y="4506291"/>
+          <a:ext cx="6513603" cy="608596"/>
         </a:xfrm>
         <a:prstGeom prst="roundRect">
           <a:avLst>
@@ -7872,8 +7647,8 @@
       </dsp:nvSpPr>
       <dsp:spPr>
         <a:xfrm>
-          <a:off x="114712" y="4782592"/>
-          <a:ext cx="295960" cy="295960"/>
+          <a:off x="136788" y="4643226"/>
+          <a:ext cx="334728" cy="334728"/>
         </a:xfrm>
         <a:prstGeom prst="rect">
           <a:avLst/>
@@ -7930,8 +7705,8 @@
       </dsp:nvSpPr>
       <dsp:spPr>
         <a:xfrm>
-          <a:off x="573450" y="4661517"/>
-          <a:ext cx="5890871" cy="538109"/>
+          <a:off x="655617" y="4506291"/>
+          <a:ext cx="5809300" cy="608596"/>
         </a:xfrm>
         <a:prstGeom prst="rect">
           <a:avLst/>
@@ -7955,12 +7730,12 @@
         <a:fontRef idx="minor"/>
       </dsp:style>
       <dsp:txBody>
-        <a:bodyPr spcFirstLastPara="0" vert="horz" wrap="square" lIns="56950" tIns="56950" rIns="56950" bIns="56950" numCol="1" spcCol="1270" anchor="ctr" anchorCtr="0">
+        <a:bodyPr spcFirstLastPara="0" vert="horz" wrap="square" lIns="64410" tIns="64410" rIns="64410" bIns="64410" numCol="1" spcCol="1270" anchor="ctr" anchorCtr="0">
           <a:noAutofit/>
         </a:bodyPr>
         <a:lstStyle/>
         <a:p>
-          <a:pPr marL="0" lvl="0" indent="0" algn="l" defTabSz="622300">
+          <a:pPr marL="0" lvl="0" indent="0" algn="l" defTabSz="666750">
             <a:lnSpc>
               <a:spcPct val="100000"/>
             </a:lnSpc>
@@ -7973,14 +7748,14 @@
             <a:buNone/>
           </a:pPr>
           <a:r>
-            <a:rPr lang="en-US" sz="1400" kern="1200"/>
+            <a:rPr lang="en-US" sz="1500" kern="1200"/>
             <a:t>All Deployed to Heroku</a:t>
           </a:r>
         </a:p>
       </dsp:txBody>
       <dsp:txXfrm>
-        <a:off x="573450" y="4661517"/>
-        <a:ext cx="5890871" cy="538109"/>
+        <a:off x="655617" y="4506291"/>
+        <a:ext cx="5809300" cy="608596"/>
       </dsp:txXfrm>
     </dsp:sp>
     <dsp:sp modelId="{25CEC266-C6C3-456A-9869-47E25FCD6DAD}">
@@ -7990,8 +7765,8 @@
       </dsp:nvSpPr>
       <dsp:spPr>
         <a:xfrm>
-          <a:off x="-48065" y="5347316"/>
-          <a:ext cx="6513603" cy="538109"/>
+          <a:off x="-47311" y="5276829"/>
+          <a:ext cx="6513603" cy="608596"/>
         </a:xfrm>
         <a:prstGeom prst="roundRect">
           <a:avLst>
@@ -8032,8 +7807,8 @@
       </dsp:nvSpPr>
       <dsp:spPr>
         <a:xfrm>
-          <a:off x="114712" y="5455229"/>
-          <a:ext cx="295960" cy="295960"/>
+          <a:off x="136788" y="5403971"/>
+          <a:ext cx="334728" cy="334728"/>
         </a:xfrm>
         <a:prstGeom prst="rect">
           <a:avLst/>
@@ -8090,8 +7865,8 @@
       </dsp:nvSpPr>
       <dsp:spPr>
         <a:xfrm>
-          <a:off x="573450" y="5334154"/>
-          <a:ext cx="5890871" cy="538109"/>
+          <a:off x="655617" y="5267037"/>
+          <a:ext cx="5809300" cy="608596"/>
         </a:xfrm>
         <a:prstGeom prst="rect">
           <a:avLst/>
@@ -8115,12 +7890,12 @@
         <a:fontRef idx="minor"/>
       </dsp:style>
       <dsp:txBody>
-        <a:bodyPr spcFirstLastPara="0" vert="horz" wrap="square" lIns="56950" tIns="56950" rIns="56950" bIns="56950" numCol="1" spcCol="1270" anchor="ctr" anchorCtr="0">
+        <a:bodyPr spcFirstLastPara="0" vert="horz" wrap="square" lIns="64410" tIns="64410" rIns="64410" bIns="64410" numCol="1" spcCol="1270" anchor="ctr" anchorCtr="0">
           <a:noAutofit/>
         </a:bodyPr>
         <a:lstStyle/>
         <a:p>
-          <a:pPr marL="0" lvl="0" indent="0" algn="l" defTabSz="622300">
+          <a:pPr marL="0" lvl="0" indent="0" algn="l" defTabSz="666750">
             <a:lnSpc>
               <a:spcPct val="100000"/>
             </a:lnSpc>
@@ -8133,17 +7908,17 @@
             <a:buNone/>
           </a:pPr>
           <a:r>
-            <a:rPr lang="en-US" sz="1400" u="sng" kern="1200" dirty="0">
+            <a:rPr lang="en-US" sz="1500" u="sng" kern="1200" dirty="0">
               <a:hlinkClick xmlns:r="http://schemas.openxmlformats.org/officeDocument/2006/relationships" r:id="rId13"/>
             </a:rPr>
             <a:t>https://nutrometer.herokuapp.com/</a:t>
           </a:r>
-          <a:endParaRPr lang="en-US" sz="1400" kern="1200" dirty="0"/>
+          <a:endParaRPr lang="en-US" sz="1500" kern="1200" dirty="0"/>
         </a:p>
       </dsp:txBody>
       <dsp:txXfrm>
-        <a:off x="573450" y="5334154"/>
-        <a:ext cx="5890871" cy="538109"/>
+        <a:off x="655617" y="5267037"/>
+        <a:ext cx="5809300" cy="608596"/>
       </dsp:txXfrm>
     </dsp:sp>
   </dsp:spTree>
@@ -17371,7 +17146,7 @@
             <p:ph idx="1"/>
             <p:extLst>
               <p:ext uri="{D42A27DB-BD31-4B8C-83A1-F6EECF244321}">
-                <p14:modId xmlns:p14="http://schemas.microsoft.com/office/powerpoint/2010/main" val="1928301424"/>
+                <p14:modId xmlns:p14="http://schemas.microsoft.com/office/powerpoint/2010/main" val="4040410359"/>
               </p:ext>
             </p:extLst>
           </p:nvPr>
@@ -19324,12 +19099,12 @@
           <a:lstStyle/>
           <a:p>
             <a:r>
-              <a:rPr lang="en-US">
+              <a:rPr lang="en-US" dirty="0">
                 <a:solidFill>
                   <a:srgbClr val="FFFFFF"/>
                 </a:solidFill>
               </a:rPr>
-              <a:t>Technologies Used</a:t>
+              <a:t>Multiday Nutrition Analysis </a:t>
             </a:r>
           </a:p>
         </p:txBody>
@@ -21354,12 +21129,12 @@
           <a:lstStyle/>
           <a:p>
             <a:r>
-              <a:rPr lang="en-US">
+              <a:rPr lang="en-US" dirty="0">
                 <a:solidFill>
                   <a:srgbClr val="FFFFFF"/>
                 </a:solidFill>
               </a:rPr>
-              <a:t>Technologies Used</a:t>
+              <a:t>Food Recommendation for deficient nutrients</a:t>
             </a:r>
           </a:p>
         </p:txBody>
@@ -23374,12 +23149,12 @@
           <a:lstStyle/>
           <a:p>
             <a:r>
-              <a:rPr lang="en-US">
+              <a:rPr lang="en-US" dirty="0">
                 <a:solidFill>
                   <a:srgbClr val="FFFFFF"/>
                 </a:solidFill>
               </a:rPr>
-              <a:t>Technologies Used</a:t>
+              <a:t>Food Recommendation for deficient nutrients</a:t>
             </a:r>
           </a:p>
         </p:txBody>

</xml_diff>

<commit_message>
Dataset expansion slide added to the ppt
</commit_message>
<xml_diff>
--- a/Nutrometer.pptx
+++ b/Nutrometer.pptx
@@ -14,6 +14,7 @@
     <p:sldId id="261" r:id="rId8"/>
     <p:sldId id="263" r:id="rId9"/>
     <p:sldId id="264" r:id="rId10"/>
+    <p:sldId id="266" r:id="rId11"/>
   </p:sldIdLst>
   <p:sldSz cx="12192000" cy="6858000"/>
   <p:notesSz cx="6858000" cy="9144000"/>
@@ -15407,6 +15408,738 @@
 </p:sld>
 </file>
 
+<file path=ppt/slides/slide10.xml><?xml version="1.0" encoding="utf-8"?>
+<p:sld xmlns:a="http://schemas.openxmlformats.org/drawingml/2006/main" xmlns:r="http://schemas.openxmlformats.org/officeDocument/2006/relationships" xmlns:p="http://schemas.openxmlformats.org/presentationml/2006/main">
+  <p:cSld>
+    <p:bg>
+      <p:bgPr>
+        <a:solidFill>
+          <a:schemeClr val="bg1"/>
+        </a:solidFill>
+        <a:effectLst/>
+      </p:bgPr>
+    </p:bg>
+    <p:spTree>
+      <p:nvGrpSpPr>
+        <p:cNvPr id="1" name=""/>
+        <p:cNvGrpSpPr/>
+        <p:nvPr/>
+      </p:nvGrpSpPr>
+      <p:grpSpPr>
+        <a:xfrm>
+          <a:off x="0" y="0"/>
+          <a:ext cx="0" cy="0"/>
+          <a:chOff x="0" y="0"/>
+          <a:chExt cx="0" cy="0"/>
+        </a:xfrm>
+      </p:grpSpPr>
+      <p:sp>
+        <p:nvSpPr>
+          <p:cNvPr id="18" name="Freeform: Shape 15">
+            <a:extLst>
+              <a:ext uri="{FF2B5EF4-FFF2-40B4-BE49-F238E27FC236}">
+                <a16:creationId xmlns:a16="http://schemas.microsoft.com/office/drawing/2014/main" id="{46C2E80F-49A6-4372-B103-219D417A55ED}"/>
+              </a:ext>
+              <a:ext uri="{C183D7F6-B498-43B3-948B-1728B52AA6E4}">
+                <adec:decorative xmlns:adec="http://schemas.microsoft.com/office/drawing/2017/decorative" val="1"/>
+              </a:ext>
+            </a:extLst>
+          </p:cNvPr>
+          <p:cNvSpPr>
+            <a:spLocks noGrp="1" noRot="1" noChangeAspect="1" noMove="1" noResize="1" noEditPoints="1" noAdjustHandles="1" noChangeArrowheads="1" noChangeShapeType="1" noTextEdit="1"/>
+          </p:cNvSpPr>
+          <p:nvPr>
+            <p:extLst>
+              <p:ext uri="{386F3935-93C4-4BCD-93E2-E3B085C9AB24}">
+                <p16:designElem xmlns:p16="http://schemas.microsoft.com/office/powerpoint/2015/main" val="1"/>
+              </p:ext>
+            </p:extLst>
+          </p:nvPr>
+        </p:nvSpPr>
+        <p:spPr>
+          <a:xfrm>
+            <a:off x="484096" y="470925"/>
+            <a:ext cx="4381009" cy="5892104"/>
+          </a:xfrm>
+          <a:custGeom>
+            <a:avLst/>
+            <a:gdLst>
+              <a:gd name="connsiteX0" fmla="*/ 0 w 4381009"/>
+              <a:gd name="connsiteY0" fmla="*/ 0 h 5892104"/>
+              <a:gd name="connsiteX1" fmla="*/ 4157628 w 4381009"/>
+              <a:gd name="connsiteY1" fmla="*/ 0 h 5892104"/>
+              <a:gd name="connsiteX2" fmla="*/ 4169302 w 4381009"/>
+              <a:gd name="connsiteY2" fmla="*/ 68659 h 5892104"/>
+              <a:gd name="connsiteX3" fmla="*/ 4191571 w 4381009"/>
+              <a:gd name="connsiteY3" fmla="*/ 205472 h 5892104"/>
+              <a:gd name="connsiteX4" fmla="*/ 4213368 w 4381009"/>
+              <a:gd name="connsiteY4" fmla="*/ 342890 h 5892104"/>
+              <a:gd name="connsiteX5" fmla="*/ 4232030 w 4381009"/>
+              <a:gd name="connsiteY5" fmla="*/ 480913 h 5892104"/>
+              <a:gd name="connsiteX6" fmla="*/ 4250848 w 4381009"/>
+              <a:gd name="connsiteY6" fmla="*/ 618332 h 5892104"/>
+              <a:gd name="connsiteX7" fmla="*/ 4268412 w 4381009"/>
+              <a:gd name="connsiteY7" fmla="*/ 756355 h 5892104"/>
+              <a:gd name="connsiteX8" fmla="*/ 4283467 w 4381009"/>
+              <a:gd name="connsiteY8" fmla="*/ 892563 h 5892104"/>
+              <a:gd name="connsiteX9" fmla="*/ 4297737 w 4381009"/>
+              <a:gd name="connsiteY9" fmla="*/ 1030587 h 5892104"/>
+              <a:gd name="connsiteX10" fmla="*/ 4310754 w 4381009"/>
+              <a:gd name="connsiteY10" fmla="*/ 1168005 h 5892104"/>
+              <a:gd name="connsiteX11" fmla="*/ 4322045 w 4381009"/>
+              <a:gd name="connsiteY11" fmla="*/ 1303002 h 5892104"/>
+              <a:gd name="connsiteX12" fmla="*/ 4333336 w 4381009"/>
+              <a:gd name="connsiteY12" fmla="*/ 1439815 h 5892104"/>
+              <a:gd name="connsiteX13" fmla="*/ 4342745 w 4381009"/>
+              <a:gd name="connsiteY13" fmla="*/ 1574812 h 5892104"/>
+              <a:gd name="connsiteX14" fmla="*/ 4350115 w 4381009"/>
+              <a:gd name="connsiteY14" fmla="*/ 1709808 h 5892104"/>
+              <a:gd name="connsiteX15" fmla="*/ 4357799 w 4381009"/>
+              <a:gd name="connsiteY15" fmla="*/ 1844200 h 5892104"/>
+              <a:gd name="connsiteX16" fmla="*/ 4364229 w 4381009"/>
+              <a:gd name="connsiteY16" fmla="*/ 1977381 h 5892104"/>
+              <a:gd name="connsiteX17" fmla="*/ 4368777 w 4381009"/>
+              <a:gd name="connsiteY17" fmla="*/ 2109351 h 5892104"/>
+              <a:gd name="connsiteX18" fmla="*/ 4372697 w 4381009"/>
+              <a:gd name="connsiteY18" fmla="*/ 2241321 h 5892104"/>
+              <a:gd name="connsiteX19" fmla="*/ 4376461 w 4381009"/>
+              <a:gd name="connsiteY19" fmla="*/ 2372080 h 5892104"/>
+              <a:gd name="connsiteX20" fmla="*/ 4378186 w 4381009"/>
+              <a:gd name="connsiteY20" fmla="*/ 2501023 h 5892104"/>
+              <a:gd name="connsiteX21" fmla="*/ 4380068 w 4381009"/>
+              <a:gd name="connsiteY21" fmla="*/ 2629966 h 5892104"/>
+              <a:gd name="connsiteX22" fmla="*/ 4381009 w 4381009"/>
+              <a:gd name="connsiteY22" fmla="*/ 2757093 h 5892104"/>
+              <a:gd name="connsiteX23" fmla="*/ 4380068 w 4381009"/>
+              <a:gd name="connsiteY23" fmla="*/ 2883010 h 5892104"/>
+              <a:gd name="connsiteX24" fmla="*/ 4380068 w 4381009"/>
+              <a:gd name="connsiteY24" fmla="*/ 3007715 h 5892104"/>
+              <a:gd name="connsiteX25" fmla="*/ 4378186 w 4381009"/>
+              <a:gd name="connsiteY25" fmla="*/ 3131210 h 5892104"/>
+              <a:gd name="connsiteX26" fmla="*/ 4375363 w 4381009"/>
+              <a:gd name="connsiteY26" fmla="*/ 3252283 h 5892104"/>
+              <a:gd name="connsiteX27" fmla="*/ 4372697 w 4381009"/>
+              <a:gd name="connsiteY27" fmla="*/ 3372146 h 5892104"/>
+              <a:gd name="connsiteX28" fmla="*/ 4369718 w 4381009"/>
+              <a:gd name="connsiteY28" fmla="*/ 3489587 h 5892104"/>
+              <a:gd name="connsiteX29" fmla="*/ 4365170 w 4381009"/>
+              <a:gd name="connsiteY29" fmla="*/ 3606423 h 5892104"/>
+              <a:gd name="connsiteX30" fmla="*/ 4360309 w 4381009"/>
+              <a:gd name="connsiteY30" fmla="*/ 3721443 h 5892104"/>
+              <a:gd name="connsiteX31" fmla="*/ 4355918 w 4381009"/>
+              <a:gd name="connsiteY31" fmla="*/ 3834041 h 5892104"/>
+              <a:gd name="connsiteX32" fmla="*/ 4343529 w 4381009"/>
+              <a:gd name="connsiteY32" fmla="*/ 4053789 h 5892104"/>
+              <a:gd name="connsiteX33" fmla="*/ 4330356 w 4381009"/>
+              <a:gd name="connsiteY33" fmla="*/ 4264457 h 5892104"/>
+              <a:gd name="connsiteX34" fmla="*/ 4316556 w 4381009"/>
+              <a:gd name="connsiteY34" fmla="*/ 4466650 h 5892104"/>
+              <a:gd name="connsiteX35" fmla="*/ 4301344 w 4381009"/>
+              <a:gd name="connsiteY35" fmla="*/ 4657946 h 5892104"/>
+              <a:gd name="connsiteX36" fmla="*/ 4285506 w 4381009"/>
+              <a:gd name="connsiteY36" fmla="*/ 4840767 h 5892104"/>
+              <a:gd name="connsiteX37" fmla="*/ 4268412 w 4381009"/>
+              <a:gd name="connsiteY37" fmla="*/ 5010269 h 5892104"/>
+              <a:gd name="connsiteX38" fmla="*/ 4251633 w 4381009"/>
+              <a:gd name="connsiteY38" fmla="*/ 5169481 h 5892104"/>
+              <a:gd name="connsiteX39" fmla="*/ 4234853 w 4381009"/>
+              <a:gd name="connsiteY39" fmla="*/ 5315980 h 5892104"/>
+              <a:gd name="connsiteX40" fmla="*/ 4219014 w 4381009"/>
+              <a:gd name="connsiteY40" fmla="*/ 5450371 h 5892104"/>
+              <a:gd name="connsiteX41" fmla="*/ 4203959 w 4381009"/>
+              <a:gd name="connsiteY41" fmla="*/ 5569628 h 5892104"/>
+              <a:gd name="connsiteX42" fmla="*/ 4189689 w 4381009"/>
+              <a:gd name="connsiteY42" fmla="*/ 5677384 h 5892104"/>
+              <a:gd name="connsiteX43" fmla="*/ 4177770 w 4381009"/>
+              <a:gd name="connsiteY43" fmla="*/ 5768189 h 5892104"/>
+              <a:gd name="connsiteX44" fmla="*/ 4166479 w 4381009"/>
+              <a:gd name="connsiteY44" fmla="*/ 5844465 h 5892104"/>
+              <a:gd name="connsiteX45" fmla="*/ 4159132 w 4381009"/>
+              <a:gd name="connsiteY45" fmla="*/ 5892104 h 5892104"/>
+              <a:gd name="connsiteX46" fmla="*/ 0 w 4381009"/>
+              <a:gd name="connsiteY46" fmla="*/ 5892104 h 5892104"/>
+            </a:gdLst>
+            <a:ahLst/>
+            <a:cxnLst>
+              <a:cxn ang="0">
+                <a:pos x="connsiteX0" y="connsiteY0"/>
+              </a:cxn>
+              <a:cxn ang="0">
+                <a:pos x="connsiteX1" y="connsiteY1"/>
+              </a:cxn>
+              <a:cxn ang="0">
+                <a:pos x="connsiteX2" y="connsiteY2"/>
+              </a:cxn>
+              <a:cxn ang="0">
+                <a:pos x="connsiteX3" y="connsiteY3"/>
+              </a:cxn>
+              <a:cxn ang="0">
+                <a:pos x="connsiteX4" y="connsiteY4"/>
+              </a:cxn>
+              <a:cxn ang="0">
+                <a:pos x="connsiteX5" y="connsiteY5"/>
+              </a:cxn>
+              <a:cxn ang="0">
+                <a:pos x="connsiteX6" y="connsiteY6"/>
+              </a:cxn>
+              <a:cxn ang="0">
+                <a:pos x="connsiteX7" y="connsiteY7"/>
+              </a:cxn>
+              <a:cxn ang="0">
+                <a:pos x="connsiteX8" y="connsiteY8"/>
+              </a:cxn>
+              <a:cxn ang="0">
+                <a:pos x="connsiteX9" y="connsiteY9"/>
+              </a:cxn>
+              <a:cxn ang="0">
+                <a:pos x="connsiteX10" y="connsiteY10"/>
+              </a:cxn>
+              <a:cxn ang="0">
+                <a:pos x="connsiteX11" y="connsiteY11"/>
+              </a:cxn>
+              <a:cxn ang="0">
+                <a:pos x="connsiteX12" y="connsiteY12"/>
+              </a:cxn>
+              <a:cxn ang="0">
+                <a:pos x="connsiteX13" y="connsiteY13"/>
+              </a:cxn>
+              <a:cxn ang="0">
+                <a:pos x="connsiteX14" y="connsiteY14"/>
+              </a:cxn>
+              <a:cxn ang="0">
+                <a:pos x="connsiteX15" y="connsiteY15"/>
+              </a:cxn>
+              <a:cxn ang="0">
+                <a:pos x="connsiteX16" y="connsiteY16"/>
+              </a:cxn>
+              <a:cxn ang="0">
+                <a:pos x="connsiteX17" y="connsiteY17"/>
+              </a:cxn>
+              <a:cxn ang="0">
+                <a:pos x="connsiteX18" y="connsiteY18"/>
+              </a:cxn>
+              <a:cxn ang="0">
+                <a:pos x="connsiteX19" y="connsiteY19"/>
+              </a:cxn>
+              <a:cxn ang="0">
+                <a:pos x="connsiteX20" y="connsiteY20"/>
+              </a:cxn>
+              <a:cxn ang="0">
+                <a:pos x="connsiteX21" y="connsiteY21"/>
+              </a:cxn>
+              <a:cxn ang="0">
+                <a:pos x="connsiteX22" y="connsiteY22"/>
+              </a:cxn>
+              <a:cxn ang="0">
+                <a:pos x="connsiteX23" y="connsiteY23"/>
+              </a:cxn>
+              <a:cxn ang="0">
+                <a:pos x="connsiteX24" y="connsiteY24"/>
+              </a:cxn>
+              <a:cxn ang="0">
+                <a:pos x="connsiteX25" y="connsiteY25"/>
+              </a:cxn>
+              <a:cxn ang="0">
+                <a:pos x="connsiteX26" y="connsiteY26"/>
+              </a:cxn>
+              <a:cxn ang="0">
+                <a:pos x="connsiteX27" y="connsiteY27"/>
+              </a:cxn>
+              <a:cxn ang="0">
+                <a:pos x="connsiteX28" y="connsiteY28"/>
+              </a:cxn>
+              <a:cxn ang="0">
+                <a:pos x="connsiteX29" y="connsiteY29"/>
+              </a:cxn>
+              <a:cxn ang="0">
+                <a:pos x="connsiteX30" y="connsiteY30"/>
+              </a:cxn>
+              <a:cxn ang="0">
+                <a:pos x="connsiteX31" y="connsiteY31"/>
+              </a:cxn>
+              <a:cxn ang="0">
+                <a:pos x="connsiteX32" y="connsiteY32"/>
+              </a:cxn>
+              <a:cxn ang="0">
+                <a:pos x="connsiteX33" y="connsiteY33"/>
+              </a:cxn>
+              <a:cxn ang="0">
+                <a:pos x="connsiteX34" y="connsiteY34"/>
+              </a:cxn>
+              <a:cxn ang="0">
+                <a:pos x="connsiteX35" y="connsiteY35"/>
+              </a:cxn>
+              <a:cxn ang="0">
+                <a:pos x="connsiteX36" y="connsiteY36"/>
+              </a:cxn>
+              <a:cxn ang="0">
+                <a:pos x="connsiteX37" y="connsiteY37"/>
+              </a:cxn>
+              <a:cxn ang="0">
+                <a:pos x="connsiteX38" y="connsiteY38"/>
+              </a:cxn>
+              <a:cxn ang="0">
+                <a:pos x="connsiteX39" y="connsiteY39"/>
+              </a:cxn>
+              <a:cxn ang="0">
+                <a:pos x="connsiteX40" y="connsiteY40"/>
+              </a:cxn>
+              <a:cxn ang="0">
+                <a:pos x="connsiteX41" y="connsiteY41"/>
+              </a:cxn>
+              <a:cxn ang="0">
+                <a:pos x="connsiteX42" y="connsiteY42"/>
+              </a:cxn>
+              <a:cxn ang="0">
+                <a:pos x="connsiteX43" y="connsiteY43"/>
+              </a:cxn>
+              <a:cxn ang="0">
+                <a:pos x="connsiteX44" y="connsiteY44"/>
+              </a:cxn>
+              <a:cxn ang="0">
+                <a:pos x="connsiteX45" y="connsiteY45"/>
+              </a:cxn>
+              <a:cxn ang="0">
+                <a:pos x="connsiteX46" y="connsiteY46"/>
+              </a:cxn>
+            </a:cxnLst>
+            <a:rect l="l" t="t" r="r" b="b"/>
+            <a:pathLst>
+              <a:path w="4381009" h="5892104">
+                <a:moveTo>
+                  <a:pt x="0" y="0"/>
+                </a:moveTo>
+                <a:lnTo>
+                  <a:pt x="4157628" y="0"/>
+                </a:lnTo>
+                <a:lnTo>
+                  <a:pt x="4169302" y="68659"/>
+                </a:lnTo>
+                <a:lnTo>
+                  <a:pt x="4191571" y="205472"/>
+                </a:lnTo>
+                <a:lnTo>
+                  <a:pt x="4213368" y="342890"/>
+                </a:lnTo>
+                <a:lnTo>
+                  <a:pt x="4232030" y="480913"/>
+                </a:lnTo>
+                <a:lnTo>
+                  <a:pt x="4250848" y="618332"/>
+                </a:lnTo>
+                <a:lnTo>
+                  <a:pt x="4268412" y="756355"/>
+                </a:lnTo>
+                <a:lnTo>
+                  <a:pt x="4283467" y="892563"/>
+                </a:lnTo>
+                <a:lnTo>
+                  <a:pt x="4297737" y="1030587"/>
+                </a:lnTo>
+                <a:lnTo>
+                  <a:pt x="4310754" y="1168005"/>
+                </a:lnTo>
+                <a:lnTo>
+                  <a:pt x="4322045" y="1303002"/>
+                </a:lnTo>
+                <a:lnTo>
+                  <a:pt x="4333336" y="1439815"/>
+                </a:lnTo>
+                <a:lnTo>
+                  <a:pt x="4342745" y="1574812"/>
+                </a:lnTo>
+                <a:lnTo>
+                  <a:pt x="4350115" y="1709808"/>
+                </a:lnTo>
+                <a:lnTo>
+                  <a:pt x="4357799" y="1844200"/>
+                </a:lnTo>
+                <a:lnTo>
+                  <a:pt x="4364229" y="1977381"/>
+                </a:lnTo>
+                <a:lnTo>
+                  <a:pt x="4368777" y="2109351"/>
+                </a:lnTo>
+                <a:lnTo>
+                  <a:pt x="4372697" y="2241321"/>
+                </a:lnTo>
+                <a:lnTo>
+                  <a:pt x="4376461" y="2372080"/>
+                </a:lnTo>
+                <a:lnTo>
+                  <a:pt x="4378186" y="2501023"/>
+                </a:lnTo>
+                <a:lnTo>
+                  <a:pt x="4380068" y="2629966"/>
+                </a:lnTo>
+                <a:lnTo>
+                  <a:pt x="4381009" y="2757093"/>
+                </a:lnTo>
+                <a:lnTo>
+                  <a:pt x="4380068" y="2883010"/>
+                </a:lnTo>
+                <a:lnTo>
+                  <a:pt x="4380068" y="3007715"/>
+                </a:lnTo>
+                <a:lnTo>
+                  <a:pt x="4378186" y="3131210"/>
+                </a:lnTo>
+                <a:lnTo>
+                  <a:pt x="4375363" y="3252283"/>
+                </a:lnTo>
+                <a:lnTo>
+                  <a:pt x="4372697" y="3372146"/>
+                </a:lnTo>
+                <a:lnTo>
+                  <a:pt x="4369718" y="3489587"/>
+                </a:lnTo>
+                <a:lnTo>
+                  <a:pt x="4365170" y="3606423"/>
+                </a:lnTo>
+                <a:lnTo>
+                  <a:pt x="4360309" y="3721443"/>
+                </a:lnTo>
+                <a:lnTo>
+                  <a:pt x="4355918" y="3834041"/>
+                </a:lnTo>
+                <a:lnTo>
+                  <a:pt x="4343529" y="4053789"/>
+                </a:lnTo>
+                <a:lnTo>
+                  <a:pt x="4330356" y="4264457"/>
+                </a:lnTo>
+                <a:lnTo>
+                  <a:pt x="4316556" y="4466650"/>
+                </a:lnTo>
+                <a:lnTo>
+                  <a:pt x="4301344" y="4657946"/>
+                </a:lnTo>
+                <a:lnTo>
+                  <a:pt x="4285506" y="4840767"/>
+                </a:lnTo>
+                <a:lnTo>
+                  <a:pt x="4268412" y="5010269"/>
+                </a:lnTo>
+                <a:lnTo>
+                  <a:pt x="4251633" y="5169481"/>
+                </a:lnTo>
+                <a:lnTo>
+                  <a:pt x="4234853" y="5315980"/>
+                </a:lnTo>
+                <a:lnTo>
+                  <a:pt x="4219014" y="5450371"/>
+                </a:lnTo>
+                <a:lnTo>
+                  <a:pt x="4203959" y="5569628"/>
+                </a:lnTo>
+                <a:lnTo>
+                  <a:pt x="4189689" y="5677384"/>
+                </a:lnTo>
+                <a:lnTo>
+                  <a:pt x="4177770" y="5768189"/>
+                </a:lnTo>
+                <a:lnTo>
+                  <a:pt x="4166479" y="5844465"/>
+                </a:lnTo>
+                <a:lnTo>
+                  <a:pt x="4159132" y="5892104"/>
+                </a:lnTo>
+                <a:lnTo>
+                  <a:pt x="0" y="5892104"/>
+                </a:lnTo>
+                <a:close/>
+              </a:path>
+            </a:pathLst>
+          </a:custGeom>
+          <a:solidFill>
+            <a:srgbClr val="404040"/>
+          </a:solidFill>
+          <a:ln>
+            <a:noFill/>
+          </a:ln>
+        </p:spPr>
+        <p:style>
+          <a:lnRef idx="2">
+            <a:schemeClr val="accent1">
+              <a:shade val="50000"/>
+            </a:schemeClr>
+          </a:lnRef>
+          <a:fillRef idx="1">
+            <a:schemeClr val="accent1"/>
+          </a:fillRef>
+          <a:effectRef idx="0">
+            <a:schemeClr val="accent1"/>
+          </a:effectRef>
+          <a:fontRef idx="minor">
+            <a:schemeClr val="lt1"/>
+          </a:fontRef>
+        </p:style>
+        <p:txBody>
+          <a:bodyPr wrap="square" rtlCol="0" anchor="ctr">
+            <a:noAutofit/>
+          </a:bodyPr>
+          <a:lstStyle/>
+          <a:p>
+            <a:pPr marL="0" marR="0" lvl="0" indent="0" algn="ctr" defTabSz="457200" rtl="0" eaLnBrk="1" fontAlgn="auto" latinLnBrk="0" hangingPunct="1">
+              <a:lnSpc>
+                <a:spcPct val="100000"/>
+              </a:lnSpc>
+              <a:spcBef>
+                <a:spcPts val="0"/>
+              </a:spcBef>
+              <a:spcAft>
+                <a:spcPts val="0"/>
+              </a:spcAft>
+              <a:buClrTx/>
+              <a:buSzTx/>
+              <a:buFontTx/>
+              <a:buNone/>
+              <a:tabLst/>
+              <a:defRPr/>
+            </a:pPr>
+            <a:endParaRPr kumimoji="0" lang="en-US" sz="1800" b="0" i="0" u="none" strike="noStrike" kern="1200" cap="none" spc="0" normalizeH="0" baseline="0" noProof="0">
+              <a:ln>
+                <a:noFill/>
+              </a:ln>
+              <a:solidFill>
+                <a:prstClr val="white"/>
+              </a:solidFill>
+              <a:effectLst/>
+              <a:uLnTx/>
+              <a:uFillTx/>
+              <a:latin typeface="Calibri" panose="020F0502020204030204"/>
+              <a:ea typeface="+mn-ea"/>
+              <a:cs typeface="+mn-cs"/>
+            </a:endParaRPr>
+          </a:p>
+        </p:txBody>
+      </p:sp>
+      <p:sp>
+        <p:nvSpPr>
+          <p:cNvPr id="2" name="Title 1">
+            <a:extLst>
+              <a:ext uri="{FF2B5EF4-FFF2-40B4-BE49-F238E27FC236}">
+                <a16:creationId xmlns:a16="http://schemas.microsoft.com/office/drawing/2014/main" id="{9BD9ED5B-7300-499A-BBF6-AE5D925DB064}"/>
+              </a:ext>
+            </a:extLst>
+          </p:cNvPr>
+          <p:cNvSpPr>
+            <a:spLocks noGrp="1"/>
+          </p:cNvSpPr>
+          <p:nvPr>
+            <p:ph type="title"/>
+          </p:nvPr>
+        </p:nvSpPr>
+        <p:spPr>
+          <a:xfrm>
+            <a:off x="863029" y="1012004"/>
+            <a:ext cx="3416158" cy="4795408"/>
+          </a:xfrm>
+        </p:spPr>
+        <p:txBody>
+          <a:bodyPr>
+            <a:normAutofit/>
+          </a:bodyPr>
+          <a:lstStyle/>
+          <a:p>
+            <a:r>
+              <a:rPr lang="en-US" sz="3200" dirty="0">
+                <a:solidFill>
+                  <a:srgbClr val="FFFFFF"/>
+                </a:solidFill>
+              </a:rPr>
+              <a:t>Database Cleanup (Machine Learning)</a:t>
+            </a:r>
+          </a:p>
+        </p:txBody>
+      </p:sp>
+      <p:sp>
+        <p:nvSpPr>
+          <p:cNvPr id="10" name="Content Placeholder 9">
+            <a:extLst>
+              <a:ext uri="{FF2B5EF4-FFF2-40B4-BE49-F238E27FC236}">
+                <a16:creationId xmlns:a16="http://schemas.microsoft.com/office/drawing/2014/main" id="{A511560A-4AF4-4FC0-A53C-E0E41F2E37DD}"/>
+              </a:ext>
+            </a:extLst>
+          </p:cNvPr>
+          <p:cNvSpPr>
+            <a:spLocks noGrp="1"/>
+          </p:cNvSpPr>
+          <p:nvPr>
+            <p:ph idx="1"/>
+          </p:nvPr>
+        </p:nvSpPr>
+        <p:spPr>
+          <a:xfrm>
+            <a:off x="4948806" y="542109"/>
+            <a:ext cx="6938394" cy="5892104"/>
+          </a:xfrm>
+        </p:spPr>
+        <p:txBody>
+          <a:bodyPr>
+            <a:normAutofit/>
+          </a:bodyPr>
+          <a:lstStyle/>
+          <a:p>
+            <a:r>
+              <a:rPr lang="en-US" dirty="0"/>
+              <a:t>Expand dataset</a:t>
+            </a:r>
+          </a:p>
+          <a:p>
+            <a:pPr lvl="1"/>
+            <a:r>
+              <a:rPr lang="en-US" dirty="0"/>
+              <a:t>Original Dataset: USDA, 8, 790 rows/records</a:t>
+            </a:r>
+          </a:p>
+          <a:p>
+            <a:pPr lvl="1"/>
+            <a:r>
+              <a:rPr lang="en-US" dirty="0"/>
+              <a:t>Add: Kaggle nutrition data &amp; Indian DA data</a:t>
+            </a:r>
+          </a:p>
+          <a:p>
+            <a:pPr lvl="1"/>
+            <a:r>
+              <a:rPr lang="en-US" dirty="0"/>
+              <a:t>New Dataset: </a:t>
+            </a:r>
+            <a:r>
+              <a:rPr lang="en-US" b="1" dirty="0">
+                <a:solidFill>
+                  <a:srgbClr val="FF0000"/>
+                </a:solidFill>
+              </a:rPr>
+              <a:t>31,557</a:t>
+            </a:r>
+            <a:r>
+              <a:rPr lang="en-US" dirty="0"/>
+              <a:t> rows/records</a:t>
+            </a:r>
+          </a:p>
+          <a:p>
+            <a:pPr marL="0" indent="0">
+              <a:buNone/>
+            </a:pPr>
+            <a:endParaRPr lang="en-US" dirty="0"/>
+          </a:p>
+          <a:p>
+            <a:r>
+              <a:rPr lang="en-US" dirty="0" err="1"/>
+              <a:t>Sklearn.impute.KNNImputer</a:t>
+            </a:r>
+            <a:endParaRPr lang="en-US" dirty="0"/>
+          </a:p>
+          <a:p>
+            <a:pPr lvl="1"/>
+            <a:r>
+              <a:rPr lang="en-US" dirty="0"/>
+              <a:t>To fill the missing data (blanks)</a:t>
+            </a:r>
+          </a:p>
+          <a:p>
+            <a:pPr lvl="1"/>
+            <a:r>
+              <a:rPr lang="en-US" dirty="0"/>
+              <a:t>K-Nearest Neighbors: 5</a:t>
+            </a:r>
+          </a:p>
+          <a:p>
+            <a:pPr marL="457200" lvl="1" indent="0">
+              <a:buNone/>
+            </a:pPr>
+            <a:endParaRPr lang="en-US" dirty="0"/>
+          </a:p>
+          <a:p>
+            <a:pPr marL="228600" lvl="1">
+              <a:spcBef>
+                <a:spcPts val="1000"/>
+              </a:spcBef>
+            </a:pPr>
+            <a:r>
+              <a:rPr lang="en-US" sz="2800" dirty="0"/>
+              <a:t>Plus manual cleaning up</a:t>
+            </a:r>
+          </a:p>
+          <a:p>
+            <a:pPr marL="457200" lvl="1" indent="0">
+              <a:buNone/>
+            </a:pPr>
+            <a:endParaRPr lang="en-US" dirty="0"/>
+          </a:p>
+          <a:p>
+            <a:pPr lvl="1"/>
+            <a:endParaRPr lang="en-US" dirty="0"/>
+          </a:p>
+          <a:p>
+            <a:pPr lvl="1"/>
+            <a:endParaRPr lang="en-US" dirty="0"/>
+          </a:p>
+          <a:p>
+            <a:pPr lvl="1"/>
+            <a:endParaRPr lang="en-US" dirty="0"/>
+          </a:p>
+        </p:txBody>
+      </p:sp>
+      <p:sp>
+        <p:nvSpPr>
+          <p:cNvPr id="3" name="Right Brace 2">
+            <a:extLst>
+              <a:ext uri="{FF2B5EF4-FFF2-40B4-BE49-F238E27FC236}">
+                <a16:creationId xmlns:a16="http://schemas.microsoft.com/office/drawing/2014/main" id="{A1A1D9EA-DBDE-46DB-8B7A-A0CF52BCF990}"/>
+              </a:ext>
+            </a:extLst>
+          </p:cNvPr>
+          <p:cNvSpPr/>
+          <p:nvPr/>
+        </p:nvSpPr>
+        <p:spPr>
+          <a:xfrm>
+            <a:off x="12762271" y="7325032"/>
+            <a:ext cx="155448" cy="914400"/>
+          </a:xfrm>
+          <a:prstGeom prst="rightBrace">
+            <a:avLst/>
+          </a:prstGeom>
+        </p:spPr>
+        <p:style>
+          <a:lnRef idx="1">
+            <a:schemeClr val="accent1"/>
+          </a:lnRef>
+          <a:fillRef idx="0">
+            <a:schemeClr val="accent1"/>
+          </a:fillRef>
+          <a:effectRef idx="0">
+            <a:schemeClr val="accent1"/>
+          </a:effectRef>
+          <a:fontRef idx="minor">
+            <a:schemeClr val="tx1"/>
+          </a:fontRef>
+        </p:style>
+        <p:txBody>
+          <a:bodyPr rtlCol="0" anchor="ctr"/>
+          <a:lstStyle/>
+          <a:p>
+            <a:pPr algn="ctr"/>
+            <a:endParaRPr lang="en-US"/>
+          </a:p>
+        </p:txBody>
+      </p:sp>
+    </p:spTree>
+    <p:extLst>
+      <p:ext uri="{BB962C8B-B14F-4D97-AF65-F5344CB8AC3E}">
+        <p14:creationId xmlns:p14="http://schemas.microsoft.com/office/powerpoint/2010/main" val="3783254240"/>
+      </p:ext>
+    </p:extLst>
+  </p:cSld>
+  <p:clrMapOvr>
+    <a:masterClrMapping/>
+  </p:clrMapOvr>
+</p:sld>
+</file>
+
 <file path=ppt/slides/slide2.xml><?xml version="1.0" encoding="utf-8"?>
 <p:sld xmlns:a="http://schemas.openxmlformats.org/drawingml/2006/main" xmlns:r="http://schemas.openxmlformats.org/officeDocument/2006/relationships" xmlns:p="http://schemas.openxmlformats.org/presentationml/2006/main">
   <p:cSld>

</xml_diff>